<commit_message>
Add part to ppt and rename png
</commit_message>
<xml_diff>
--- a/Whether Weather Drives Crime.pptx
+++ b/Whether Weather Drives Crime.pptx
@@ -5,7 +5,7 @@
     <p:sldMasterId id="2147483648" r:id="rId1"/>
   </p:sldMasterIdLst>
   <p:notesMasterIdLst>
-    <p:notesMasterId r:id="rId23"/>
+    <p:notesMasterId r:id="rId25"/>
   </p:notesMasterIdLst>
   <p:sldIdLst>
     <p:sldId id="256" r:id="rId2"/>
@@ -24,11 +24,13 @@
     <p:sldId id="592" r:id="rId15"/>
     <p:sldId id="585" r:id="rId16"/>
     <p:sldId id="593" r:id="rId17"/>
-    <p:sldId id="594" r:id="rId18"/>
-    <p:sldId id="586" r:id="rId19"/>
-    <p:sldId id="595" r:id="rId20"/>
-    <p:sldId id="596" r:id="rId21"/>
-    <p:sldId id="579" r:id="rId22"/>
+    <p:sldId id="603" r:id="rId18"/>
+    <p:sldId id="602" r:id="rId19"/>
+    <p:sldId id="594" r:id="rId20"/>
+    <p:sldId id="586" r:id="rId21"/>
+    <p:sldId id="595" r:id="rId22"/>
+    <p:sldId id="596" r:id="rId23"/>
+    <p:sldId id="579" r:id="rId24"/>
   </p:sldIdLst>
   <p:sldSz cx="12192000" cy="6858000"/>
   <p:notesSz cx="6858000" cy="9144000"/>
@@ -676,7 +678,7 @@
           <a:p>
             <a:fld id="{8DCBCD93-C3E5-46FC-9B0B-27DB4F64F588}" type="datetime1">
               <a:rPr lang="en-US" smtClean="0"/>
-              <a:t>11/29/2018</a:t>
+              <a:t>11/29/18</a:t>
             </a:fld>
             <a:endParaRPr lang="en-US" dirty="0"/>
           </a:p>
@@ -1112,7 +1114,7 @@
           <a:p>
             <a:fld id="{19119DBB-E88E-494E-BE06-71AADF8E1F63}" type="datetime1">
               <a:rPr lang="en-US" smtClean="0"/>
-              <a:t>11/29/2018</a:t>
+              <a:t>11/29/18</a:t>
             </a:fld>
             <a:endParaRPr lang="en-US" dirty="0"/>
           </a:p>
@@ -1362,7 +1364,7 @@
           <a:p>
             <a:fld id="{ABD25EE1-8327-44CA-8E6B-93F0B24F7B9A}" type="datetime1">
               <a:rPr lang="en-US" smtClean="0"/>
-              <a:t>11/29/2018</a:t>
+              <a:t>11/29/18</a:t>
             </a:fld>
             <a:endParaRPr lang="en-US" dirty="0"/>
           </a:p>
@@ -1670,7 +1672,7 @@
           <a:p>
             <a:fld id="{B7D8F04B-34F9-464C-8E34-60416916D244}" type="datetime1">
               <a:rPr lang="en-US" smtClean="0"/>
-              <a:t>11/29/2018</a:t>
+              <a:t>11/29/18</a:t>
             </a:fld>
             <a:endParaRPr lang="en-US" dirty="0"/>
           </a:p>
@@ -1988,7 +1990,7 @@
           <a:p>
             <a:fld id="{F7DECD95-2963-40C0-AFE4-24DEE2CB9134}" type="datetime1">
               <a:rPr lang="en-US" smtClean="0"/>
-              <a:t>11/29/2018</a:t>
+              <a:t>11/29/18</a:t>
             </a:fld>
             <a:endParaRPr lang="en-US" dirty="0"/>
           </a:p>
@@ -2290,7 +2292,7 @@
           <a:p>
             <a:fld id="{A05F9C81-2191-4733-924A-4FF1374CFB9C}" type="datetime1">
               <a:rPr lang="en-US" smtClean="0"/>
-              <a:t>11/29/2018</a:t>
+              <a:t>11/29/18</a:t>
             </a:fld>
             <a:endParaRPr lang="en-US" dirty="0"/>
           </a:p>
@@ -2657,7 +2659,7 @@
           <a:p>
             <a:fld id="{BE680B8D-39FB-4ABA-8740-8EF79127FB69}" type="datetime1">
               <a:rPr lang="en-US" smtClean="0"/>
-              <a:t>11/29/2018</a:t>
+              <a:t>11/29/18</a:t>
             </a:fld>
             <a:endParaRPr lang="en-US" dirty="0"/>
           </a:p>
@@ -2831,7 +2833,7 @@
           <a:p>
             <a:fld id="{EEC106FB-526F-4762-B7D8-20576CF64BBA}" type="datetime1">
               <a:rPr lang="en-US" smtClean="0"/>
-              <a:t>11/29/2018</a:t>
+              <a:t>11/29/18</a:t>
             </a:fld>
             <a:endParaRPr lang="en-US" dirty="0"/>
           </a:p>
@@ -3011,7 +3013,7 @@
           <a:p>
             <a:fld id="{3B812B38-160C-4E25-ACCA-B1A8FEAC5094}" type="datetime1">
               <a:rPr lang="en-US" smtClean="0"/>
-              <a:t>11/29/2018</a:t>
+              <a:t>11/29/18</a:t>
             </a:fld>
             <a:endParaRPr lang="en-US" dirty="0"/>
           </a:p>
@@ -3181,7 +3183,7 @@
           <a:p>
             <a:fld id="{04596ACE-F6AE-482F-997F-E6EB41C18315}" type="datetime1">
               <a:rPr lang="en-US" smtClean="0"/>
-              <a:t>11/29/2018</a:t>
+              <a:t>11/29/18</a:t>
             </a:fld>
             <a:endParaRPr lang="en-US" dirty="0"/>
           </a:p>
@@ -3431,7 +3433,7 @@
           <a:p>
             <a:fld id="{059E863D-3178-47BA-90EB-4D04A175E58F}" type="datetime1">
               <a:rPr lang="en-US" smtClean="0"/>
-              <a:t>11/29/2018</a:t>
+              <a:t>11/29/18</a:t>
             </a:fld>
             <a:endParaRPr lang="en-US" dirty="0"/>
           </a:p>
@@ -3667,7 +3669,7 @@
           <a:p>
             <a:fld id="{703A372C-663F-4ED3-AB9A-A26F0D7D39E3}" type="datetime1">
               <a:rPr lang="en-US" smtClean="0"/>
-              <a:t>11/29/2018</a:t>
+              <a:t>11/29/18</a:t>
             </a:fld>
             <a:endParaRPr lang="en-US" dirty="0"/>
           </a:p>
@@ -4049,7 +4051,7 @@
           <a:p>
             <a:fld id="{F0B1B5F7-2E59-4ED6-88E1-E889A1EE2181}" type="datetime1">
               <a:rPr lang="en-US" smtClean="0"/>
-              <a:t>11/29/2018</a:t>
+              <a:t>11/29/18</a:t>
             </a:fld>
             <a:endParaRPr lang="en-US" dirty="0"/>
           </a:p>
@@ -4167,7 +4169,7 @@
           <a:p>
             <a:fld id="{328D71B2-5202-4D0D-812D-7D5712C9099A}" type="datetime1">
               <a:rPr lang="en-US" smtClean="0"/>
-              <a:t>11/29/2018</a:t>
+              <a:t>11/29/18</a:t>
             </a:fld>
             <a:endParaRPr lang="en-US" dirty="0"/>
           </a:p>
@@ -4267,7 +4269,7 @@
           <a:p>
             <a:fld id="{CEFC2F11-FDFB-41F0-A3C1-2ACF9DD7D1FF}" type="datetime1">
               <a:rPr lang="en-US" smtClean="0"/>
-              <a:t>11/29/2018</a:t>
+              <a:t>11/29/18</a:t>
             </a:fld>
             <a:endParaRPr lang="en-US" dirty="0"/>
           </a:p>
@@ -4550,7 +4552,7 @@
           <a:p>
             <a:fld id="{0A11B2C4-6FA6-465C-BFEE-C86BAC813CAF}" type="datetime1">
               <a:rPr lang="en-US" smtClean="0"/>
-              <a:t>11/29/2018</a:t>
+              <a:t>11/29/18</a:t>
             </a:fld>
             <a:endParaRPr lang="en-US" dirty="0"/>
           </a:p>
@@ -4833,7 +4835,7 @@
           <a:p>
             <a:fld id="{3BA3CA60-2599-41FB-8AFA-DC2B3F52F72E}" type="datetime1">
               <a:rPr lang="en-US" smtClean="0"/>
-              <a:t>11/29/2018</a:t>
+              <a:t>11/29/18</a:t>
             </a:fld>
             <a:endParaRPr lang="en-US" dirty="0"/>
           </a:p>
@@ -5247,7 +5249,7 @@
           <a:p>
             <a:fld id="{39EB46CF-0CC5-4AC0-86AB-79049C6026E2}" type="datetime1">
               <a:rPr lang="en-US" smtClean="0"/>
-              <a:t>11/29/2018</a:t>
+              <a:t>11/29/18</a:t>
             </a:fld>
             <a:endParaRPr lang="en-US" dirty="0"/>
           </a:p>
@@ -11720,311 +11722,7 @@
           <a:lstStyle/>
           <a:p>
             <a:pPr algn="ctr"/>
-            <a:endParaRPr lang="en-CA"/>
-          </a:p>
-        </p:txBody>
-      </p:sp>
-      <p:sp>
-        <p:nvSpPr>
-          <p:cNvPr id="10" name="Content Placeholder 2">
-            <a:extLst>
-              <a:ext uri="{FF2B5EF4-FFF2-40B4-BE49-F238E27FC236}">
-                <a16:creationId xmlns:a16="http://schemas.microsoft.com/office/drawing/2014/main" id="{5D2DD52E-8399-4606-A772-EB7CB1BB6A22}"/>
-              </a:ext>
-            </a:extLst>
-          </p:cNvPr>
-          <p:cNvSpPr txBox="1">
-            <a:spLocks/>
-          </p:cNvSpPr>
-          <p:nvPr/>
-        </p:nvSpPr>
-        <p:spPr bwMode="auto">
-          <a:xfrm>
-            <a:off x="548220" y="1417638"/>
-            <a:ext cx="11237382" cy="4525963"/>
-          </a:xfrm>
-          <a:prstGeom prst="rect">
-            <a:avLst/>
-          </a:prstGeom>
-          <a:noFill/>
-          <a:ln>
-            <a:noFill/>
-          </a:ln>
-          <a:extLst>
-            <a:ext uri="{909E8E84-426E-40DD-AFC4-6F175D3DCCD1}">
-              <a14:hiddenFill xmlns:a14="http://schemas.microsoft.com/office/drawing/2010/main">
-                <a:solidFill>
-                  <a:srgbClr val="FFFFFF"/>
-                </a:solidFill>
-              </a14:hiddenFill>
-            </a:ext>
-            <a:ext uri="{91240B29-F687-4F45-9708-019B960494DF}">
-              <a14:hiddenLine xmlns:a14="http://schemas.microsoft.com/office/drawing/2010/main" w="9525">
-                <a:solidFill>
-                  <a:srgbClr val="000000"/>
-                </a:solidFill>
-                <a:miter lim="800000"/>
-                <a:headEnd/>
-                <a:tailEnd/>
-              </a14:hiddenLine>
-            </a:ext>
-          </a:extLst>
-        </p:spPr>
-        <p:txBody>
-          <a:bodyPr vert="horz" wrap="square" lIns="121899" tIns="60949" rIns="121899" bIns="60949" numCol="1" anchor="t" anchorCtr="0" compatLnSpc="1">
-            <a:prstTxWarp prst="textNoShape">
-              <a:avLst/>
-            </a:prstTxWarp>
-            <a:noAutofit/>
-          </a:bodyPr>
-          <a:lstStyle>
-            <a:lvl1pPr marL="308979" indent="-308979" algn="l" rtl="0" eaLnBrk="1" fontAlgn="base" hangingPunct="1">
-              <a:lnSpc>
-                <a:spcPct val="100000"/>
-              </a:lnSpc>
-              <a:spcBef>
-                <a:spcPts val="1600"/>
-              </a:spcBef>
-              <a:spcAft>
-                <a:spcPct val="0"/>
-              </a:spcAft>
-              <a:buClr>
-                <a:srgbClr val="4E84C4"/>
-              </a:buClr>
-              <a:buFont typeface="Wingdings" charset="2"/>
-              <a:buChar char="§"/>
-              <a:defRPr sz="1600" kern="1200">
-                <a:solidFill>
-                  <a:schemeClr val="tx1"/>
-                </a:solidFill>
-                <a:latin typeface="Arial" pitchFamily="34" charset="0"/>
-                <a:ea typeface="+mn-ea"/>
-                <a:cs typeface="Arial" pitchFamily="34" charset="0"/>
-              </a:defRPr>
-            </a:lvl1pPr>
-            <a:lvl2pPr marL="910007" indent="-300514" algn="l" rtl="0" eaLnBrk="1" fontAlgn="base" hangingPunct="1">
-              <a:lnSpc>
-                <a:spcPct val="100000"/>
-              </a:lnSpc>
-              <a:spcBef>
-                <a:spcPts val="512"/>
-              </a:spcBef>
-              <a:spcAft>
-                <a:spcPct val="0"/>
-              </a:spcAft>
-              <a:buClr>
-                <a:srgbClr val="4E84C4"/>
-              </a:buClr>
-              <a:buFont typeface="Myriad Pro" pitchFamily="32" charset="0"/>
-              <a:buChar char="–"/>
-              <a:defRPr sz="1600" kern="1200">
-                <a:solidFill>
-                  <a:schemeClr val="tx1"/>
-                </a:solidFill>
-                <a:latin typeface="Arial" pitchFamily="34" charset="0"/>
-                <a:ea typeface="+mn-ea"/>
-                <a:cs typeface="Arial" pitchFamily="34" charset="0"/>
-              </a:defRPr>
-            </a:lvl2pPr>
-            <a:lvl3pPr marL="1523733" indent="-304747" algn="l" rtl="0" eaLnBrk="1" fontAlgn="base" hangingPunct="1">
-              <a:lnSpc>
-                <a:spcPct val="100000"/>
-              </a:lnSpc>
-              <a:spcBef>
-                <a:spcPts val="512"/>
-              </a:spcBef>
-              <a:spcAft>
-                <a:spcPct val="0"/>
-              </a:spcAft>
-              <a:buClr>
-                <a:srgbClr val="4E84C4"/>
-              </a:buClr>
-              <a:buFont typeface="Courier New" pitchFamily="49" charset="0"/>
-              <a:buChar char="o"/>
-              <a:defRPr sz="1500" kern="1200">
-                <a:solidFill>
-                  <a:schemeClr val="tx1"/>
-                </a:solidFill>
-                <a:latin typeface="Arial" pitchFamily="34" charset="0"/>
-                <a:ea typeface="+mn-ea"/>
-                <a:cs typeface="Arial" pitchFamily="34" charset="0"/>
-              </a:defRPr>
-            </a:lvl3pPr>
-            <a:lvl4pPr marL="2133227" indent="-304747" algn="l" rtl="0" eaLnBrk="1" fontAlgn="base" hangingPunct="1">
-              <a:lnSpc>
-                <a:spcPct val="100000"/>
-              </a:lnSpc>
-              <a:spcBef>
-                <a:spcPts val="512"/>
-              </a:spcBef>
-              <a:spcAft>
-                <a:spcPct val="0"/>
-              </a:spcAft>
-              <a:buClr>
-                <a:srgbClr val="4E84C4"/>
-              </a:buClr>
-              <a:buFont typeface="Arial" charset="0"/>
-              <a:buChar char="•"/>
-              <a:defRPr sz="1300" kern="1200">
-                <a:solidFill>
-                  <a:schemeClr val="tx1"/>
-                </a:solidFill>
-                <a:latin typeface="Arial" pitchFamily="34" charset="0"/>
-                <a:ea typeface="+mn-ea"/>
-                <a:cs typeface="Arial" pitchFamily="34" charset="0"/>
-              </a:defRPr>
-            </a:lvl4pPr>
-            <a:lvl5pPr marL="2742720" indent="-304747" algn="l" rtl="0" eaLnBrk="1" fontAlgn="base" hangingPunct="1">
-              <a:spcBef>
-                <a:spcPct val="20000"/>
-              </a:spcBef>
-              <a:spcAft>
-                <a:spcPct val="0"/>
-              </a:spcAft>
-              <a:buFont typeface="Arial" charset="0"/>
-              <a:buChar char="»"/>
-              <a:defRPr sz="2700" kern="1200">
-                <a:solidFill>
-                  <a:schemeClr val="tx1"/>
-                </a:solidFill>
-                <a:latin typeface="Myriad Pro" pitchFamily="34" charset="0"/>
-                <a:ea typeface="+mn-ea"/>
-                <a:cs typeface="Arial" pitchFamily="34" charset="0"/>
-              </a:defRPr>
-            </a:lvl5pPr>
-            <a:lvl6pPr marL="3352213" indent="-304747" algn="l" defTabSz="1218987" rtl="0" eaLnBrk="1" latinLnBrk="0" hangingPunct="1">
-              <a:spcBef>
-                <a:spcPct val="20000"/>
-              </a:spcBef>
-              <a:buFont typeface="Arial" pitchFamily="34" charset="0"/>
-              <a:buChar char="•"/>
-              <a:defRPr sz="2700" kern="1200">
-                <a:solidFill>
-                  <a:schemeClr val="tx1"/>
-                </a:solidFill>
-                <a:latin typeface="+mn-lt"/>
-                <a:ea typeface="+mn-ea"/>
-                <a:cs typeface="+mn-cs"/>
-              </a:defRPr>
-            </a:lvl6pPr>
-            <a:lvl7pPr marL="3961707" indent="-304747" algn="l" defTabSz="1218987" rtl="0" eaLnBrk="1" latinLnBrk="0" hangingPunct="1">
-              <a:spcBef>
-                <a:spcPct val="20000"/>
-              </a:spcBef>
-              <a:buFont typeface="Arial" pitchFamily="34" charset="0"/>
-              <a:buChar char="•"/>
-              <a:defRPr sz="2700" kern="1200">
-                <a:solidFill>
-                  <a:schemeClr val="tx1"/>
-                </a:solidFill>
-                <a:latin typeface="+mn-lt"/>
-                <a:ea typeface="+mn-ea"/>
-                <a:cs typeface="+mn-cs"/>
-              </a:defRPr>
-            </a:lvl7pPr>
-            <a:lvl8pPr marL="4571200" indent="-304747" algn="l" defTabSz="1218987" rtl="0" eaLnBrk="1" latinLnBrk="0" hangingPunct="1">
-              <a:spcBef>
-                <a:spcPct val="20000"/>
-              </a:spcBef>
-              <a:buFont typeface="Arial" pitchFamily="34" charset="0"/>
-              <a:buChar char="•"/>
-              <a:defRPr sz="2700" kern="1200">
-                <a:solidFill>
-                  <a:schemeClr val="tx1"/>
-                </a:solidFill>
-                <a:latin typeface="+mn-lt"/>
-                <a:ea typeface="+mn-ea"/>
-                <a:cs typeface="+mn-cs"/>
-              </a:defRPr>
-            </a:lvl8pPr>
-            <a:lvl9pPr marL="5180693" indent="-304747" algn="l" defTabSz="1218987" rtl="0" eaLnBrk="1" latinLnBrk="0" hangingPunct="1">
-              <a:spcBef>
-                <a:spcPct val="20000"/>
-              </a:spcBef>
-              <a:buFont typeface="Arial" pitchFamily="34" charset="0"/>
-              <a:buChar char="•"/>
-              <a:defRPr sz="2700" kern="1200">
-                <a:solidFill>
-                  <a:schemeClr val="tx1"/>
-                </a:solidFill>
-                <a:latin typeface="+mn-lt"/>
-                <a:ea typeface="+mn-ea"/>
-                <a:cs typeface="+mn-cs"/>
-              </a:defRPr>
-            </a:lvl9pPr>
-          </a:lstStyle>
-          <a:p>
-            <a:pPr marL="308979" marR="0" lvl="0" indent="-308979" algn="l" defTabSz="914400" rtl="0" eaLnBrk="1" fontAlgn="base" latinLnBrk="0" hangingPunct="1">
-              <a:lnSpc>
-                <a:spcPct val="100000"/>
-              </a:lnSpc>
-              <a:spcBef>
-                <a:spcPts val="600"/>
-              </a:spcBef>
-              <a:spcAft>
-                <a:spcPct val="0"/>
-              </a:spcAft>
-              <a:buClr>
-                <a:srgbClr val="4E84C4"/>
-              </a:buClr>
-              <a:buSzTx/>
-              <a:buFont typeface="Wingdings" charset="2"/>
-              <a:buChar char="§"/>
-              <a:tabLst/>
-              <a:defRPr/>
-            </a:pPr>
-            <a:r>
-              <a:rPr kumimoji="0" lang="en-US" sz="1400" b="0" i="0" u="none" strike="noStrike" kern="1200" cap="none" spc="0" normalizeH="0" baseline="0" noProof="0" dirty="0">
-                <a:ln>
-                  <a:noFill/>
-                </a:ln>
-                <a:solidFill>
-                  <a:srgbClr val="000000"/>
-                </a:solidFill>
-                <a:effectLst/>
-                <a:uLnTx/>
-                <a:uFillTx/>
-                <a:latin typeface="Arial" pitchFamily="34" charset="0"/>
-                <a:ea typeface="+mn-ea"/>
-                <a:cs typeface="Arial" pitchFamily="34" charset="0"/>
-              </a:rPr>
-              <a:t>CONTENT</a:t>
-            </a:r>
-          </a:p>
-          <a:p>
-            <a:pPr marL="0" marR="0" lvl="0" indent="0" algn="l" defTabSz="914400" rtl="0" eaLnBrk="1" fontAlgn="base" latinLnBrk="0" hangingPunct="1">
-              <a:lnSpc>
-                <a:spcPct val="100000"/>
-              </a:lnSpc>
-              <a:spcBef>
-                <a:spcPts val="1600"/>
-              </a:spcBef>
-              <a:spcAft>
-                <a:spcPct val="0"/>
-              </a:spcAft>
-              <a:buClr>
-                <a:srgbClr val="4E84C4"/>
-              </a:buClr>
-              <a:buSzTx/>
-              <a:buFont typeface="Wingdings" charset="2"/>
-              <a:buNone/>
-              <a:tabLst/>
-              <a:defRPr/>
-            </a:pPr>
-            <a:endParaRPr kumimoji="0" lang="en-US" sz="1600" b="0" i="0" u="none" strike="noStrike" kern="1200" cap="none" spc="0" normalizeH="0" baseline="0" noProof="0" dirty="0">
-              <a:ln>
-                <a:noFill/>
-              </a:ln>
-              <a:solidFill>
-                <a:srgbClr val="000000"/>
-              </a:solidFill>
-              <a:effectLst/>
-              <a:uLnTx/>
-              <a:uFillTx/>
-              <a:latin typeface="Arial" pitchFamily="34" charset="0"/>
-              <a:ea typeface="+mn-ea"/>
-              <a:cs typeface="Arial" pitchFamily="34" charset="0"/>
-            </a:endParaRPr>
+            <a:endParaRPr lang="en-CA" dirty="0"/>
           </a:p>
         </p:txBody>
       </p:sp>
@@ -12084,6 +11782,104 @@
               <a:t>16</a:t>
             </a:fld>
             <a:endParaRPr lang="en-US" dirty="0"/>
+          </a:p>
+        </p:txBody>
+      </p:sp>
+      <p:pic>
+        <p:nvPicPr>
+          <p:cNvPr id="14" name="Picture 13">
+            <a:extLst>
+              <a:ext uri="{FF2B5EF4-FFF2-40B4-BE49-F238E27FC236}">
+                <a16:creationId xmlns:a16="http://schemas.microsoft.com/office/drawing/2014/main" id="{D9097B4A-E265-F94B-8CCB-82226EFE4E2F}"/>
+              </a:ext>
+            </a:extLst>
+          </p:cNvPr>
+          <p:cNvPicPr>
+            <a:picLocks noChangeAspect="1"/>
+          </p:cNvPicPr>
+          <p:nvPr/>
+        </p:nvPicPr>
+        <p:blipFill>
+          <a:blip r:embed="rId2"/>
+          <a:stretch>
+            <a:fillRect/>
+          </a:stretch>
+        </p:blipFill>
+        <p:spPr>
+          <a:xfrm>
+            <a:off x="3293207" y="3836349"/>
+            <a:ext cx="4992663" cy="2753728"/>
+          </a:xfrm>
+          <a:prstGeom prst="rect">
+            <a:avLst/>
+          </a:prstGeom>
+        </p:spPr>
+      </p:pic>
+      <p:pic>
+        <p:nvPicPr>
+          <p:cNvPr id="16" name="Picture 15">
+            <a:extLst>
+              <a:ext uri="{FF2B5EF4-FFF2-40B4-BE49-F238E27FC236}">
+                <a16:creationId xmlns:a16="http://schemas.microsoft.com/office/drawing/2014/main" id="{0AFE5A5E-A876-3945-AFF1-13E92380A5F4}"/>
+              </a:ext>
+            </a:extLst>
+          </p:cNvPr>
+          <p:cNvPicPr>
+            <a:picLocks noChangeAspect="1"/>
+          </p:cNvPicPr>
+          <p:nvPr/>
+        </p:nvPicPr>
+        <p:blipFill>
+          <a:blip r:embed="rId3"/>
+          <a:stretch>
+            <a:fillRect/>
+          </a:stretch>
+        </p:blipFill>
+        <p:spPr>
+          <a:xfrm>
+            <a:off x="3293208" y="1071574"/>
+            <a:ext cx="4992663" cy="2674924"/>
+          </a:xfrm>
+          <a:prstGeom prst="rect">
+            <a:avLst/>
+          </a:prstGeom>
+        </p:spPr>
+      </p:pic>
+      <p:sp>
+        <p:nvSpPr>
+          <p:cNvPr id="17" name="TextBox 16">
+            <a:extLst>
+              <a:ext uri="{FF2B5EF4-FFF2-40B4-BE49-F238E27FC236}">
+                <a16:creationId xmlns:a16="http://schemas.microsoft.com/office/drawing/2014/main" id="{0995F16D-0B49-134C-BA70-C1582F76082D}"/>
+              </a:ext>
+            </a:extLst>
+          </p:cNvPr>
+          <p:cNvSpPr txBox="1"/>
+          <p:nvPr/>
+        </p:nvSpPr>
+        <p:spPr>
+          <a:xfrm>
+            <a:off x="8410135" y="2796343"/>
+            <a:ext cx="1828800" cy="707886"/>
+          </a:xfrm>
+          <a:prstGeom prst="rect">
+            <a:avLst/>
+          </a:prstGeom>
+          <a:noFill/>
+        </p:spPr>
+        <p:txBody>
+          <a:bodyPr wrap="square" rtlCol="0">
+            <a:spAutoFit/>
+          </a:bodyPr>
+          <a:lstStyle/>
+          <a:p>
+            <a:r>
+              <a:rPr lang="en-CA" sz="1000" dirty="0"/>
+              <a:t>But there might just be more days with these temperatures!</a:t>
+            </a:r>
+          </a:p>
+          <a:p>
+            <a:endParaRPr lang="en-US" sz="1000" dirty="0"/>
           </a:p>
         </p:txBody>
       </p:sp>
@@ -12316,7 +12112,23 @@
                   <a:sysClr val="window" lastClr="FFFFFF"/>
                 </a:solidFill>
               </a:rPr>
-              <a:t>Temperature vs Crime</a:t>
+              <a:t>Temperature vs </a:t>
+            </a:r>
+            <a:r>
+              <a:rPr lang="en-US" sz="2400" b="1" i="1" dirty="0">
+                <a:solidFill>
+                  <a:sysClr val="window" lastClr="FFFFFF"/>
+                </a:solidFill>
+              </a:rPr>
+              <a:t>Average</a:t>
+            </a:r>
+            <a:r>
+              <a:rPr lang="en-US" sz="2400" b="1" dirty="0">
+                <a:solidFill>
+                  <a:sysClr val="window" lastClr="FFFFFF"/>
+                </a:solidFill>
+              </a:rPr>
+              <a:t> Crime</a:t>
             </a:r>
             <a:br>
               <a:rPr kumimoji="0" lang="en-US" sz="2400" b="0" i="0" u="none" strike="noStrike" kern="1200" cap="none" spc="0" normalizeH="0" baseline="0" noProof="0" dirty="0">
@@ -12349,7 +12161,7 @@
                 <a:ea typeface="+mj-ea"/>
                 <a:cs typeface="Arial" pitchFamily="34" charset="0"/>
               </a:rPr>
-              <a:t>Conclusions</a:t>
+              <a:t>Findings</a:t>
             </a:r>
           </a:p>
         </p:txBody>
@@ -12423,311 +12235,15 @@
           <a:lstStyle/>
           <a:p>
             <a:pPr algn="ctr"/>
-            <a:endParaRPr lang="en-CA"/>
-          </a:p>
-        </p:txBody>
-      </p:sp>
-      <p:sp>
-        <p:nvSpPr>
-          <p:cNvPr id="10" name="Content Placeholder 2">
-            <a:extLst>
-              <a:ext uri="{FF2B5EF4-FFF2-40B4-BE49-F238E27FC236}">
-                <a16:creationId xmlns:a16="http://schemas.microsoft.com/office/drawing/2014/main" id="{5D2DD52E-8399-4606-A772-EB7CB1BB6A22}"/>
-              </a:ext>
-            </a:extLst>
-          </p:cNvPr>
-          <p:cNvSpPr txBox="1">
-            <a:spLocks/>
-          </p:cNvSpPr>
-          <p:nvPr/>
-        </p:nvSpPr>
-        <p:spPr bwMode="auto">
-          <a:xfrm>
-            <a:off x="548220" y="1417638"/>
-            <a:ext cx="11237382" cy="4525963"/>
-          </a:xfrm>
-          <a:prstGeom prst="rect">
-            <a:avLst/>
-          </a:prstGeom>
-          <a:noFill/>
-          <a:ln>
-            <a:noFill/>
-          </a:ln>
-          <a:extLst>
-            <a:ext uri="{909E8E84-426E-40DD-AFC4-6F175D3DCCD1}">
-              <a14:hiddenFill xmlns:a14="http://schemas.microsoft.com/office/drawing/2010/main">
-                <a:solidFill>
-                  <a:srgbClr val="FFFFFF"/>
-                </a:solidFill>
-              </a14:hiddenFill>
-            </a:ext>
-            <a:ext uri="{91240B29-F687-4F45-9708-019B960494DF}">
-              <a14:hiddenLine xmlns:a14="http://schemas.microsoft.com/office/drawing/2010/main" w="9525">
-                <a:solidFill>
-                  <a:srgbClr val="000000"/>
-                </a:solidFill>
-                <a:miter lim="800000"/>
-                <a:headEnd/>
-                <a:tailEnd/>
-              </a14:hiddenLine>
-            </a:ext>
-          </a:extLst>
-        </p:spPr>
-        <p:txBody>
-          <a:bodyPr vert="horz" wrap="square" lIns="121899" tIns="60949" rIns="121899" bIns="60949" numCol="1" anchor="t" anchorCtr="0" compatLnSpc="1">
-            <a:prstTxWarp prst="textNoShape">
-              <a:avLst/>
-            </a:prstTxWarp>
-            <a:noAutofit/>
-          </a:bodyPr>
-          <a:lstStyle>
-            <a:lvl1pPr marL="308979" indent="-308979" algn="l" rtl="0" eaLnBrk="1" fontAlgn="base" hangingPunct="1">
-              <a:lnSpc>
-                <a:spcPct val="100000"/>
-              </a:lnSpc>
-              <a:spcBef>
-                <a:spcPts val="1600"/>
-              </a:spcBef>
-              <a:spcAft>
-                <a:spcPct val="0"/>
-              </a:spcAft>
-              <a:buClr>
-                <a:srgbClr val="4E84C4"/>
-              </a:buClr>
-              <a:buFont typeface="Wingdings" charset="2"/>
-              <a:buChar char="§"/>
-              <a:defRPr sz="1600" kern="1200">
-                <a:solidFill>
-                  <a:schemeClr val="tx1"/>
-                </a:solidFill>
-                <a:latin typeface="Arial" pitchFamily="34" charset="0"/>
-                <a:ea typeface="+mn-ea"/>
-                <a:cs typeface="Arial" pitchFamily="34" charset="0"/>
-              </a:defRPr>
-            </a:lvl1pPr>
-            <a:lvl2pPr marL="910007" indent="-300514" algn="l" rtl="0" eaLnBrk="1" fontAlgn="base" hangingPunct="1">
-              <a:lnSpc>
-                <a:spcPct val="100000"/>
-              </a:lnSpc>
-              <a:spcBef>
-                <a:spcPts val="512"/>
-              </a:spcBef>
-              <a:spcAft>
-                <a:spcPct val="0"/>
-              </a:spcAft>
-              <a:buClr>
-                <a:srgbClr val="4E84C4"/>
-              </a:buClr>
-              <a:buFont typeface="Myriad Pro" pitchFamily="32" charset="0"/>
-              <a:buChar char="–"/>
-              <a:defRPr sz="1600" kern="1200">
-                <a:solidFill>
-                  <a:schemeClr val="tx1"/>
-                </a:solidFill>
-                <a:latin typeface="Arial" pitchFamily="34" charset="0"/>
-                <a:ea typeface="+mn-ea"/>
-                <a:cs typeface="Arial" pitchFamily="34" charset="0"/>
-              </a:defRPr>
-            </a:lvl2pPr>
-            <a:lvl3pPr marL="1523733" indent="-304747" algn="l" rtl="0" eaLnBrk="1" fontAlgn="base" hangingPunct="1">
-              <a:lnSpc>
-                <a:spcPct val="100000"/>
-              </a:lnSpc>
-              <a:spcBef>
-                <a:spcPts val="512"/>
-              </a:spcBef>
-              <a:spcAft>
-                <a:spcPct val="0"/>
-              </a:spcAft>
-              <a:buClr>
-                <a:srgbClr val="4E84C4"/>
-              </a:buClr>
-              <a:buFont typeface="Courier New" pitchFamily="49" charset="0"/>
-              <a:buChar char="o"/>
-              <a:defRPr sz="1500" kern="1200">
-                <a:solidFill>
-                  <a:schemeClr val="tx1"/>
-                </a:solidFill>
-                <a:latin typeface="Arial" pitchFamily="34" charset="0"/>
-                <a:ea typeface="+mn-ea"/>
-                <a:cs typeface="Arial" pitchFamily="34" charset="0"/>
-              </a:defRPr>
-            </a:lvl3pPr>
-            <a:lvl4pPr marL="2133227" indent="-304747" algn="l" rtl="0" eaLnBrk="1" fontAlgn="base" hangingPunct="1">
-              <a:lnSpc>
-                <a:spcPct val="100000"/>
-              </a:lnSpc>
-              <a:spcBef>
-                <a:spcPts val="512"/>
-              </a:spcBef>
-              <a:spcAft>
-                <a:spcPct val="0"/>
-              </a:spcAft>
-              <a:buClr>
-                <a:srgbClr val="4E84C4"/>
-              </a:buClr>
-              <a:buFont typeface="Arial" charset="0"/>
-              <a:buChar char="•"/>
-              <a:defRPr sz="1300" kern="1200">
-                <a:solidFill>
-                  <a:schemeClr val="tx1"/>
-                </a:solidFill>
-                <a:latin typeface="Arial" pitchFamily="34" charset="0"/>
-                <a:ea typeface="+mn-ea"/>
-                <a:cs typeface="Arial" pitchFamily="34" charset="0"/>
-              </a:defRPr>
-            </a:lvl4pPr>
-            <a:lvl5pPr marL="2742720" indent="-304747" algn="l" rtl="0" eaLnBrk="1" fontAlgn="base" hangingPunct="1">
-              <a:spcBef>
-                <a:spcPct val="20000"/>
-              </a:spcBef>
-              <a:spcAft>
-                <a:spcPct val="0"/>
-              </a:spcAft>
-              <a:buFont typeface="Arial" charset="0"/>
-              <a:buChar char="»"/>
-              <a:defRPr sz="2700" kern="1200">
-                <a:solidFill>
-                  <a:schemeClr val="tx1"/>
-                </a:solidFill>
-                <a:latin typeface="Myriad Pro" pitchFamily="34" charset="0"/>
-                <a:ea typeface="+mn-ea"/>
-                <a:cs typeface="Arial" pitchFamily="34" charset="0"/>
-              </a:defRPr>
-            </a:lvl5pPr>
-            <a:lvl6pPr marL="3352213" indent="-304747" algn="l" defTabSz="1218987" rtl="0" eaLnBrk="1" latinLnBrk="0" hangingPunct="1">
-              <a:spcBef>
-                <a:spcPct val="20000"/>
-              </a:spcBef>
-              <a:buFont typeface="Arial" pitchFamily="34" charset="0"/>
-              <a:buChar char="•"/>
-              <a:defRPr sz="2700" kern="1200">
-                <a:solidFill>
-                  <a:schemeClr val="tx1"/>
-                </a:solidFill>
-                <a:latin typeface="+mn-lt"/>
-                <a:ea typeface="+mn-ea"/>
-                <a:cs typeface="+mn-cs"/>
-              </a:defRPr>
-            </a:lvl6pPr>
-            <a:lvl7pPr marL="3961707" indent="-304747" algn="l" defTabSz="1218987" rtl="0" eaLnBrk="1" latinLnBrk="0" hangingPunct="1">
-              <a:spcBef>
-                <a:spcPct val="20000"/>
-              </a:spcBef>
-              <a:buFont typeface="Arial" pitchFamily="34" charset="0"/>
-              <a:buChar char="•"/>
-              <a:defRPr sz="2700" kern="1200">
-                <a:solidFill>
-                  <a:schemeClr val="tx1"/>
-                </a:solidFill>
-                <a:latin typeface="+mn-lt"/>
-                <a:ea typeface="+mn-ea"/>
-                <a:cs typeface="+mn-cs"/>
-              </a:defRPr>
-            </a:lvl7pPr>
-            <a:lvl8pPr marL="4571200" indent="-304747" algn="l" defTabSz="1218987" rtl="0" eaLnBrk="1" latinLnBrk="0" hangingPunct="1">
-              <a:spcBef>
-                <a:spcPct val="20000"/>
-              </a:spcBef>
-              <a:buFont typeface="Arial" pitchFamily="34" charset="0"/>
-              <a:buChar char="•"/>
-              <a:defRPr sz="2700" kern="1200">
-                <a:solidFill>
-                  <a:schemeClr val="tx1"/>
-                </a:solidFill>
-                <a:latin typeface="+mn-lt"/>
-                <a:ea typeface="+mn-ea"/>
-                <a:cs typeface="+mn-cs"/>
-              </a:defRPr>
-            </a:lvl8pPr>
-            <a:lvl9pPr marL="5180693" indent="-304747" algn="l" defTabSz="1218987" rtl="0" eaLnBrk="1" latinLnBrk="0" hangingPunct="1">
-              <a:spcBef>
-                <a:spcPct val="20000"/>
-              </a:spcBef>
-              <a:buFont typeface="Arial" pitchFamily="34" charset="0"/>
-              <a:buChar char="•"/>
-              <a:defRPr sz="2700" kern="1200">
-                <a:solidFill>
-                  <a:schemeClr val="tx1"/>
-                </a:solidFill>
-                <a:latin typeface="+mn-lt"/>
-                <a:ea typeface="+mn-ea"/>
-                <a:cs typeface="+mn-cs"/>
-              </a:defRPr>
-            </a:lvl9pPr>
-          </a:lstStyle>
-          <a:p>
-            <a:pPr marL="308979" marR="0" lvl="0" indent="-308979" algn="l" defTabSz="914400" rtl="0" eaLnBrk="1" fontAlgn="base" latinLnBrk="0" hangingPunct="1">
-              <a:lnSpc>
-                <a:spcPct val="100000"/>
-              </a:lnSpc>
-              <a:spcBef>
-                <a:spcPts val="600"/>
-              </a:spcBef>
-              <a:spcAft>
-                <a:spcPct val="0"/>
-              </a:spcAft>
-              <a:buClr>
-                <a:srgbClr val="4E84C4"/>
-              </a:buClr>
-              <a:buSzTx/>
-              <a:buFont typeface="Wingdings" charset="2"/>
-              <a:buChar char="§"/>
-              <a:tabLst/>
-              <a:defRPr/>
-            </a:pPr>
-            <a:r>
-              <a:rPr kumimoji="0" lang="en-US" sz="1400" b="0" i="0" u="none" strike="noStrike" kern="1200" cap="none" spc="0" normalizeH="0" baseline="0" noProof="0" dirty="0">
-                <a:ln>
-                  <a:noFill/>
-                </a:ln>
-                <a:solidFill>
-                  <a:srgbClr val="000000"/>
-                </a:solidFill>
-                <a:effectLst/>
-                <a:uLnTx/>
-                <a:uFillTx/>
-                <a:latin typeface="Arial" pitchFamily="34" charset="0"/>
-                <a:ea typeface="+mn-ea"/>
-                <a:cs typeface="Arial" pitchFamily="34" charset="0"/>
-              </a:rPr>
-              <a:t>CONTENT</a:t>
-            </a:r>
-          </a:p>
-          <a:p>
-            <a:pPr marL="0" marR="0" lvl="0" indent="0" algn="l" defTabSz="914400" rtl="0" eaLnBrk="1" fontAlgn="base" latinLnBrk="0" hangingPunct="1">
-              <a:lnSpc>
-                <a:spcPct val="100000"/>
-              </a:lnSpc>
-              <a:spcBef>
-                <a:spcPts val="1600"/>
-              </a:spcBef>
-              <a:spcAft>
-                <a:spcPct val="0"/>
-              </a:spcAft>
-              <a:buClr>
-                <a:srgbClr val="4E84C4"/>
-              </a:buClr>
-              <a:buSzTx/>
-              <a:buFont typeface="Wingdings" charset="2"/>
-              <a:buNone/>
-              <a:tabLst/>
-              <a:defRPr/>
-            </a:pPr>
-            <a:endParaRPr kumimoji="0" lang="en-US" sz="1600" b="0" i="0" u="none" strike="noStrike" kern="1200" cap="none" spc="0" normalizeH="0" baseline="0" noProof="0" dirty="0">
-              <a:ln>
-                <a:noFill/>
-              </a:ln>
-              <a:solidFill>
-                <a:srgbClr val="000000"/>
-              </a:solidFill>
-              <a:effectLst/>
-              <a:uLnTx/>
-              <a:uFillTx/>
-              <a:latin typeface="Arial" pitchFamily="34" charset="0"/>
-              <a:ea typeface="+mn-ea"/>
-              <a:cs typeface="Arial" pitchFamily="34" charset="0"/>
-            </a:endParaRPr>
+            <a:r>
+              <a:rPr lang="en-CA" dirty="0"/>
+              <a:t>Average Crime By </a:t>
+            </a:r>
+            <a:r>
+              <a:rPr lang="en-CA" dirty="0" err="1"/>
+              <a:t>Temperature.png</a:t>
+            </a:r>
+            <a:endParaRPr lang="en-CA" dirty="0"/>
           </a:p>
         </p:txBody>
       </p:sp>
@@ -12736,7 +12252,7 @@
           <p:cNvPr id="11" name="Footer Placeholder 10">
             <a:extLst>
               <a:ext uri="{FF2B5EF4-FFF2-40B4-BE49-F238E27FC236}">
-                <a16:creationId xmlns:a16="http://schemas.microsoft.com/office/drawing/2014/main" id="{8AD8C343-5443-41D3-85A8-798FEABF89B8}"/>
+                <a16:creationId xmlns:a16="http://schemas.microsoft.com/office/drawing/2014/main" id="{1E0F36E1-B435-4DF1-AC4B-8CA77B53545D}"/>
               </a:ext>
             </a:extLst>
           </p:cNvPr>
@@ -12765,7 +12281,7 @@
           <p:cNvPr id="12" name="Slide Number Placeholder 11">
             <a:extLst>
               <a:ext uri="{FF2B5EF4-FFF2-40B4-BE49-F238E27FC236}">
-                <a16:creationId xmlns:a16="http://schemas.microsoft.com/office/drawing/2014/main" id="{FA4338B6-962F-4C4F-AA10-92A3071FB905}"/>
+                <a16:creationId xmlns:a16="http://schemas.microsoft.com/office/drawing/2014/main" id="{037F5BD8-2BCD-4E3A-948E-7B70605D952F}"/>
               </a:ext>
             </a:extLst>
           </p:cNvPr>
@@ -12790,10 +12306,40 @@
           </a:p>
         </p:txBody>
       </p:sp>
+      <p:pic>
+        <p:nvPicPr>
+          <p:cNvPr id="9" name="Picture 8">
+            <a:extLst>
+              <a:ext uri="{FF2B5EF4-FFF2-40B4-BE49-F238E27FC236}">
+                <a16:creationId xmlns:a16="http://schemas.microsoft.com/office/drawing/2014/main" id="{6D4C1D73-E3CE-E449-AA4A-87B735935A62}"/>
+              </a:ext>
+            </a:extLst>
+          </p:cNvPr>
+          <p:cNvPicPr>
+            <a:picLocks noChangeAspect="1"/>
+          </p:cNvPicPr>
+          <p:nvPr/>
+        </p:nvPicPr>
+        <p:blipFill>
+          <a:blip r:embed="rId2"/>
+          <a:stretch>
+            <a:fillRect/>
+          </a:stretch>
+        </p:blipFill>
+        <p:spPr>
+          <a:xfrm>
+            <a:off x="1524000" y="1039511"/>
+            <a:ext cx="9144000" cy="5228947"/>
+          </a:xfrm>
+          <a:prstGeom prst="rect">
+            <a:avLst/>
+          </a:prstGeom>
+        </p:spPr>
+      </p:pic>
     </p:spTree>
     <p:extLst>
       <p:ext uri="{BB962C8B-B14F-4D97-AF65-F5344CB8AC3E}">
-        <p14:creationId xmlns:p14="http://schemas.microsoft.com/office/powerpoint/2010/main" val="54760466"/>
+        <p14:creationId xmlns:p14="http://schemas.microsoft.com/office/powerpoint/2010/main" val="92888274"/>
       </p:ext>
     </p:extLst>
   </p:cSld>
@@ -13012,6 +12558,888 @@
             </a:lvl9pPr>
           </a:lstStyle>
           <a:p>
+            <a:pPr lvl="0" defTabSz="914400"/>
+            <a:r>
+              <a:rPr lang="en-US" sz="2400" b="1" dirty="0">
+                <a:solidFill>
+                  <a:sysClr val="window" lastClr="FFFFFF"/>
+                </a:solidFill>
+              </a:rPr>
+              <a:t>Temperature vs </a:t>
+            </a:r>
+            <a:r>
+              <a:rPr lang="en-US" sz="2400" b="1" i="1" dirty="0">
+                <a:solidFill>
+                  <a:sysClr val="window" lastClr="FFFFFF"/>
+                </a:solidFill>
+              </a:rPr>
+              <a:t>Average </a:t>
+            </a:r>
+            <a:r>
+              <a:rPr lang="en-US" sz="2400" b="1" dirty="0">
+                <a:solidFill>
+                  <a:sysClr val="window" lastClr="FFFFFF"/>
+                </a:solidFill>
+              </a:rPr>
+              <a:t>Crime</a:t>
+            </a:r>
+            <a:br>
+              <a:rPr kumimoji="0" lang="en-US" sz="2400" b="0" i="0" u="none" strike="noStrike" kern="1200" cap="none" spc="0" normalizeH="0" baseline="0" noProof="0" dirty="0">
+                <a:ln>
+                  <a:noFill/>
+                </a:ln>
+                <a:solidFill>
+                  <a:sysClr val="window" lastClr="FFFFFF"/>
+                </a:solidFill>
+                <a:effectLst/>
+                <a:uLnTx/>
+                <a:uFillTx/>
+                <a:latin typeface="Arial" pitchFamily="34" charset="0"/>
+                <a:ea typeface="+mj-ea"/>
+                <a:cs typeface="Arial" pitchFamily="34" charset="0"/>
+              </a:rPr>
+            </a:br>
+            <a:r>
+              <a:rPr kumimoji="0" lang="en-GB" b="0" i="0" u="none" strike="noStrike" kern="1200" cap="none" spc="0" normalizeH="0" baseline="0" noProof="0" dirty="0">
+                <a:ln>
+                  <a:noFill/>
+                </a:ln>
+                <a:solidFill>
+                  <a:srgbClr val="FFDD3E"/>
+                </a:solidFill>
+                <a:effectLst/>
+                <a:uLnTx/>
+                <a:uFillTx/>
+                <a:latin typeface="Arial" pitchFamily="34" charset="0"/>
+                <a:ea typeface="+mj-ea"/>
+                <a:cs typeface="Arial" pitchFamily="34" charset="0"/>
+              </a:rPr>
+              <a:t>Findings</a:t>
+            </a:r>
+          </a:p>
+        </p:txBody>
+      </p:sp>
+      <p:sp>
+        <p:nvSpPr>
+          <p:cNvPr id="6" name="Rectangle 5">
+            <a:extLst>
+              <a:ext uri="{FF2B5EF4-FFF2-40B4-BE49-F238E27FC236}">
+                <a16:creationId xmlns:a16="http://schemas.microsoft.com/office/drawing/2014/main" id="{8E48BA95-CB03-4C0F-BD3B-653DBB7534FE}"/>
+              </a:ext>
+            </a:extLst>
+          </p:cNvPr>
+          <p:cNvSpPr/>
+          <p:nvPr/>
+        </p:nvSpPr>
+        <p:spPr>
+          <a:xfrm>
+            <a:off x="0" y="1039511"/>
+            <a:ext cx="12192000" cy="5228948"/>
+          </a:xfrm>
+          <a:prstGeom prst="rect">
+            <a:avLst/>
+          </a:prstGeom>
+          <a:gradFill flip="none" rotWithShape="1">
+            <a:gsLst>
+              <a:gs pos="0">
+                <a:schemeClr val="tx1">
+                  <a:shade val="30000"/>
+                  <a:satMod val="115000"/>
+                </a:schemeClr>
+              </a:gs>
+              <a:gs pos="50000">
+                <a:schemeClr val="tx1">
+                  <a:shade val="67500"/>
+                  <a:satMod val="115000"/>
+                </a:schemeClr>
+              </a:gs>
+              <a:gs pos="100000">
+                <a:schemeClr val="tx1">
+                  <a:shade val="100000"/>
+                  <a:satMod val="115000"/>
+                </a:schemeClr>
+              </a:gs>
+            </a:gsLst>
+            <a:lin ang="13500000" scaled="1"/>
+            <a:tileRect/>
+          </a:gradFill>
+          <a:ln>
+            <a:noFill/>
+          </a:ln>
+        </p:spPr>
+        <p:style>
+          <a:lnRef idx="2">
+            <a:schemeClr val="accent1">
+              <a:shade val="50000"/>
+            </a:schemeClr>
+          </a:lnRef>
+          <a:fillRef idx="1">
+            <a:schemeClr val="accent1"/>
+          </a:fillRef>
+          <a:effectRef idx="0">
+            <a:schemeClr val="accent1"/>
+          </a:effectRef>
+          <a:fontRef idx="minor">
+            <a:schemeClr val="lt1"/>
+          </a:fontRef>
+        </p:style>
+        <p:txBody>
+          <a:bodyPr rtlCol="0" anchor="ctr"/>
+          <a:lstStyle/>
+          <a:p>
+            <a:pPr algn="ctr"/>
+            <a:r>
+              <a:rPr lang="en-CA" dirty="0"/>
+              <a:t>Average Crime By </a:t>
+            </a:r>
+            <a:r>
+              <a:rPr lang="en-CA" dirty="0" err="1"/>
+              <a:t>Temperature.png</a:t>
+            </a:r>
+            <a:endParaRPr lang="en-CA" dirty="0"/>
+          </a:p>
+        </p:txBody>
+      </p:sp>
+      <p:sp>
+        <p:nvSpPr>
+          <p:cNvPr id="11" name="Footer Placeholder 10">
+            <a:extLst>
+              <a:ext uri="{FF2B5EF4-FFF2-40B4-BE49-F238E27FC236}">
+                <a16:creationId xmlns:a16="http://schemas.microsoft.com/office/drawing/2014/main" id="{1E0F36E1-B435-4DF1-AC4B-8CA77B53545D}"/>
+              </a:ext>
+            </a:extLst>
+          </p:cNvPr>
+          <p:cNvSpPr>
+            <a:spLocks noGrp="1"/>
+          </p:cNvSpPr>
+          <p:nvPr>
+            <p:ph type="ftr" sz="quarter" idx="11"/>
+          </p:nvPr>
+        </p:nvSpPr>
+        <p:spPr/>
+        <p:txBody>
+          <a:bodyPr/>
+          <a:lstStyle/>
+          <a:p>
+            <a:r>
+              <a:rPr lang="en-US"/>
+              <a:t>Whether Weather Drives Crime</a:t>
+            </a:r>
+            <a:endParaRPr lang="en-US" dirty="0"/>
+          </a:p>
+        </p:txBody>
+      </p:sp>
+      <p:sp>
+        <p:nvSpPr>
+          <p:cNvPr id="12" name="Slide Number Placeholder 11">
+            <a:extLst>
+              <a:ext uri="{FF2B5EF4-FFF2-40B4-BE49-F238E27FC236}">
+                <a16:creationId xmlns:a16="http://schemas.microsoft.com/office/drawing/2014/main" id="{037F5BD8-2BCD-4E3A-948E-7B70605D952F}"/>
+              </a:ext>
+            </a:extLst>
+          </p:cNvPr>
+          <p:cNvSpPr>
+            <a:spLocks noGrp="1"/>
+          </p:cNvSpPr>
+          <p:nvPr>
+            <p:ph type="sldNum" sz="quarter" idx="12"/>
+          </p:nvPr>
+        </p:nvSpPr>
+        <p:spPr/>
+        <p:txBody>
+          <a:bodyPr/>
+          <a:lstStyle/>
+          <a:p>
+            <a:fld id="{D57F1E4F-1CFF-5643-939E-217C01CDF565}" type="slidenum">
+              <a:rPr lang="en-US" smtClean="0"/>
+              <a:pPr/>
+              <a:t>18</a:t>
+            </a:fld>
+            <a:endParaRPr lang="en-US" dirty="0"/>
+          </a:p>
+        </p:txBody>
+      </p:sp>
+      <p:pic>
+        <p:nvPicPr>
+          <p:cNvPr id="7" name="Picture 6">
+            <a:extLst>
+              <a:ext uri="{FF2B5EF4-FFF2-40B4-BE49-F238E27FC236}">
+                <a16:creationId xmlns:a16="http://schemas.microsoft.com/office/drawing/2014/main" id="{E9F0842C-044D-8E48-8C26-843D7F8FCAD0}"/>
+              </a:ext>
+            </a:extLst>
+          </p:cNvPr>
+          <p:cNvPicPr>
+            <a:picLocks noChangeAspect="1"/>
+          </p:cNvPicPr>
+          <p:nvPr/>
+        </p:nvPicPr>
+        <p:blipFill>
+          <a:blip r:embed="rId2"/>
+          <a:stretch>
+            <a:fillRect/>
+          </a:stretch>
+        </p:blipFill>
+        <p:spPr>
+          <a:xfrm>
+            <a:off x="2730124" y="1044987"/>
+            <a:ext cx="6230995" cy="5223472"/>
+          </a:xfrm>
+          <a:prstGeom prst="rect">
+            <a:avLst/>
+          </a:prstGeom>
+        </p:spPr>
+      </p:pic>
+    </p:spTree>
+    <p:extLst>
+      <p:ext uri="{BB962C8B-B14F-4D97-AF65-F5344CB8AC3E}">
+        <p14:creationId xmlns:p14="http://schemas.microsoft.com/office/powerpoint/2010/main" val="2530384907"/>
+      </p:ext>
+    </p:extLst>
+  </p:cSld>
+  <p:clrMapOvr>
+    <a:masterClrMapping/>
+  </p:clrMapOvr>
+</p:sld>
+</file>
+
+<file path=ppt/slides/slide19.xml><?xml version="1.0" encoding="utf-8"?>
+<p:sld xmlns:a="http://schemas.openxmlformats.org/drawingml/2006/main" xmlns:r="http://schemas.openxmlformats.org/officeDocument/2006/relationships" xmlns:p="http://schemas.openxmlformats.org/presentationml/2006/main">
+  <p:cSld>
+    <p:spTree>
+      <p:nvGrpSpPr>
+        <p:cNvPr id="1" name=""/>
+        <p:cNvGrpSpPr/>
+        <p:nvPr/>
+      </p:nvGrpSpPr>
+      <p:grpSpPr>
+        <a:xfrm>
+          <a:off x="0" y="0"/>
+          <a:ext cx="0" cy="0"/>
+          <a:chOff x="0" y="0"/>
+          <a:chExt cx="0" cy="0"/>
+        </a:xfrm>
+      </p:grpSpPr>
+      <p:sp>
+        <p:nvSpPr>
+          <p:cNvPr id="5" name="Title 1">
+            <a:extLst>
+              <a:ext uri="{FF2B5EF4-FFF2-40B4-BE49-F238E27FC236}">
+                <a16:creationId xmlns:a16="http://schemas.microsoft.com/office/drawing/2014/main" id="{02FB3FF4-C4B1-4F6B-BD55-EC26D607F64C}"/>
+              </a:ext>
+            </a:extLst>
+          </p:cNvPr>
+          <p:cNvSpPr txBox="1">
+            <a:spLocks/>
+          </p:cNvSpPr>
+          <p:nvPr/>
+        </p:nvSpPr>
+        <p:spPr bwMode="auto">
+          <a:xfrm>
+            <a:off x="1727200" y="274320"/>
+            <a:ext cx="10058400" cy="487363"/>
+          </a:xfrm>
+          <a:prstGeom prst="rect">
+            <a:avLst/>
+          </a:prstGeom>
+          <a:noFill/>
+          <a:ln>
+            <a:noFill/>
+          </a:ln>
+          <a:extLst>
+            <a:ext uri="{909E8E84-426E-40DD-AFC4-6F175D3DCCD1}">
+              <a14:hiddenFill xmlns:a14="http://schemas.microsoft.com/office/drawing/2010/main">
+                <a:solidFill>
+                  <a:srgbClr val="FFFFFF"/>
+                </a:solidFill>
+              </a14:hiddenFill>
+            </a:ext>
+            <a:ext uri="{91240B29-F687-4F45-9708-019B960494DF}">
+              <a14:hiddenLine xmlns:a14="http://schemas.microsoft.com/office/drawing/2010/main" w="9525">
+                <a:solidFill>
+                  <a:srgbClr val="000000"/>
+                </a:solidFill>
+                <a:miter lim="800000"/>
+                <a:headEnd/>
+                <a:tailEnd/>
+              </a14:hiddenLine>
+            </a:ext>
+          </a:extLst>
+        </p:spPr>
+        <p:txBody>
+          <a:bodyPr vert="horz" wrap="square" lIns="121899" tIns="60949" rIns="121899" bIns="60949" numCol="1" anchor="ctr" anchorCtr="0" compatLnSpc="1">
+            <a:prstTxWarp prst="textNoShape">
+              <a:avLst/>
+            </a:prstTxWarp>
+            <a:noAutofit/>
+          </a:bodyPr>
+          <a:lstStyle>
+            <a:lvl1pPr algn="l" rtl="0" eaLnBrk="1" fontAlgn="base" hangingPunct="1">
+              <a:spcBef>
+                <a:spcPct val="0"/>
+              </a:spcBef>
+              <a:spcAft>
+                <a:spcPct val="0"/>
+              </a:spcAft>
+              <a:defRPr sz="2200" kern="1200">
+                <a:solidFill>
+                  <a:schemeClr val="bg1"/>
+                </a:solidFill>
+                <a:latin typeface="Arial" pitchFamily="34" charset="0"/>
+                <a:ea typeface="+mj-ea"/>
+                <a:cs typeface="Arial" pitchFamily="34" charset="0"/>
+              </a:defRPr>
+            </a:lvl1pPr>
+            <a:lvl2pPr algn="l" rtl="0" eaLnBrk="1" fontAlgn="base" hangingPunct="1">
+              <a:spcBef>
+                <a:spcPct val="0"/>
+              </a:spcBef>
+              <a:spcAft>
+                <a:spcPct val="0"/>
+              </a:spcAft>
+              <a:defRPr sz="2900">
+                <a:solidFill>
+                  <a:schemeClr val="bg1"/>
+                </a:solidFill>
+                <a:latin typeface="Arial" pitchFamily="34" charset="0"/>
+                <a:cs typeface="Arial" pitchFamily="34" charset="0"/>
+              </a:defRPr>
+            </a:lvl2pPr>
+            <a:lvl3pPr algn="l" rtl="0" eaLnBrk="1" fontAlgn="base" hangingPunct="1">
+              <a:spcBef>
+                <a:spcPct val="0"/>
+              </a:spcBef>
+              <a:spcAft>
+                <a:spcPct val="0"/>
+              </a:spcAft>
+              <a:defRPr sz="2900">
+                <a:solidFill>
+                  <a:schemeClr val="bg1"/>
+                </a:solidFill>
+                <a:latin typeface="Arial" pitchFamily="34" charset="0"/>
+                <a:cs typeface="Arial" pitchFamily="34" charset="0"/>
+              </a:defRPr>
+            </a:lvl3pPr>
+            <a:lvl4pPr algn="l" rtl="0" eaLnBrk="1" fontAlgn="base" hangingPunct="1">
+              <a:spcBef>
+                <a:spcPct val="0"/>
+              </a:spcBef>
+              <a:spcAft>
+                <a:spcPct val="0"/>
+              </a:spcAft>
+              <a:defRPr sz="2900">
+                <a:solidFill>
+                  <a:schemeClr val="bg1"/>
+                </a:solidFill>
+                <a:latin typeface="Arial" pitchFamily="34" charset="0"/>
+                <a:cs typeface="Arial" pitchFamily="34" charset="0"/>
+              </a:defRPr>
+            </a:lvl4pPr>
+            <a:lvl5pPr algn="l" rtl="0" eaLnBrk="1" fontAlgn="base" hangingPunct="1">
+              <a:spcBef>
+                <a:spcPct val="0"/>
+              </a:spcBef>
+              <a:spcAft>
+                <a:spcPct val="0"/>
+              </a:spcAft>
+              <a:defRPr sz="2900">
+                <a:solidFill>
+                  <a:schemeClr val="bg1"/>
+                </a:solidFill>
+                <a:latin typeface="Arial" pitchFamily="34" charset="0"/>
+                <a:cs typeface="Arial" pitchFamily="34" charset="0"/>
+              </a:defRPr>
+            </a:lvl5pPr>
+            <a:lvl6pPr marL="609493" algn="l" rtl="0" eaLnBrk="1" fontAlgn="base" hangingPunct="1">
+              <a:spcBef>
+                <a:spcPct val="0"/>
+              </a:spcBef>
+              <a:spcAft>
+                <a:spcPct val="0"/>
+              </a:spcAft>
+              <a:defRPr sz="3700">
+                <a:solidFill>
+                  <a:schemeClr val="bg1"/>
+                </a:solidFill>
+                <a:latin typeface="Arial" pitchFamily="34" charset="0"/>
+                <a:cs typeface="Arial" pitchFamily="34" charset="0"/>
+              </a:defRPr>
+            </a:lvl6pPr>
+            <a:lvl7pPr marL="1218987" algn="l" rtl="0" eaLnBrk="1" fontAlgn="base" hangingPunct="1">
+              <a:spcBef>
+                <a:spcPct val="0"/>
+              </a:spcBef>
+              <a:spcAft>
+                <a:spcPct val="0"/>
+              </a:spcAft>
+              <a:defRPr sz="3700">
+                <a:solidFill>
+                  <a:schemeClr val="bg1"/>
+                </a:solidFill>
+                <a:latin typeface="Arial" pitchFamily="34" charset="0"/>
+                <a:cs typeface="Arial" pitchFamily="34" charset="0"/>
+              </a:defRPr>
+            </a:lvl7pPr>
+            <a:lvl8pPr marL="1828480" algn="l" rtl="0" eaLnBrk="1" fontAlgn="base" hangingPunct="1">
+              <a:spcBef>
+                <a:spcPct val="0"/>
+              </a:spcBef>
+              <a:spcAft>
+                <a:spcPct val="0"/>
+              </a:spcAft>
+              <a:defRPr sz="3700">
+                <a:solidFill>
+                  <a:schemeClr val="bg1"/>
+                </a:solidFill>
+                <a:latin typeface="Arial" pitchFamily="34" charset="0"/>
+                <a:cs typeface="Arial" pitchFamily="34" charset="0"/>
+              </a:defRPr>
+            </a:lvl8pPr>
+            <a:lvl9pPr marL="2437973" algn="l" rtl="0" eaLnBrk="1" fontAlgn="base" hangingPunct="1">
+              <a:spcBef>
+                <a:spcPct val="0"/>
+              </a:spcBef>
+              <a:spcAft>
+                <a:spcPct val="0"/>
+              </a:spcAft>
+              <a:defRPr sz="3700">
+                <a:solidFill>
+                  <a:schemeClr val="bg1"/>
+                </a:solidFill>
+                <a:latin typeface="Arial" pitchFamily="34" charset="0"/>
+                <a:cs typeface="Arial" pitchFamily="34" charset="0"/>
+              </a:defRPr>
+            </a:lvl9pPr>
+          </a:lstStyle>
+          <a:p>
+            <a:pPr lvl="0" defTabSz="914400"/>
+            <a:r>
+              <a:rPr lang="en-US" sz="2400" b="1" dirty="0">
+                <a:solidFill>
+                  <a:sysClr val="window" lastClr="FFFFFF"/>
+                </a:solidFill>
+              </a:rPr>
+              <a:t>Temperature vs Crime</a:t>
+            </a:r>
+            <a:br>
+              <a:rPr kumimoji="0" lang="en-US" sz="2400" b="0" i="0" u="none" strike="noStrike" kern="1200" cap="none" spc="0" normalizeH="0" baseline="0" noProof="0" dirty="0">
+                <a:ln>
+                  <a:noFill/>
+                </a:ln>
+                <a:solidFill>
+                  <a:sysClr val="window" lastClr="FFFFFF"/>
+                </a:solidFill>
+                <a:effectLst/>
+                <a:uLnTx/>
+                <a:uFillTx/>
+                <a:latin typeface="Arial" pitchFamily="34" charset="0"/>
+                <a:ea typeface="+mj-ea"/>
+                <a:cs typeface="Arial" pitchFamily="34" charset="0"/>
+              </a:rPr>
+            </a:br>
+            <a:r>
+              <a:rPr kumimoji="0" lang="en-GB" b="0" i="0" u="none" strike="noStrike" kern="1200" cap="none" spc="0" normalizeH="0" baseline="0" noProof="0" dirty="0">
+                <a:ln>
+                  <a:noFill/>
+                </a:ln>
+                <a:solidFill>
+                  <a:srgbClr val="FFDD3E"/>
+                </a:solidFill>
+                <a:effectLst/>
+                <a:uLnTx/>
+                <a:uFillTx/>
+                <a:latin typeface="Arial" pitchFamily="34" charset="0"/>
+                <a:ea typeface="+mj-ea"/>
+                <a:cs typeface="Arial" pitchFamily="34" charset="0"/>
+              </a:rPr>
+              <a:t>Conclusions and Limitations</a:t>
+            </a:r>
+          </a:p>
+        </p:txBody>
+      </p:sp>
+      <p:sp>
+        <p:nvSpPr>
+          <p:cNvPr id="6" name="Rectangle 5">
+            <a:extLst>
+              <a:ext uri="{FF2B5EF4-FFF2-40B4-BE49-F238E27FC236}">
+                <a16:creationId xmlns:a16="http://schemas.microsoft.com/office/drawing/2014/main" id="{8E48BA95-CB03-4C0F-BD3B-653DBB7534FE}"/>
+              </a:ext>
+            </a:extLst>
+          </p:cNvPr>
+          <p:cNvSpPr/>
+          <p:nvPr/>
+        </p:nvSpPr>
+        <p:spPr>
+          <a:xfrm>
+            <a:off x="0" y="1039511"/>
+            <a:ext cx="12192000" cy="5228948"/>
+          </a:xfrm>
+          <a:prstGeom prst="rect">
+            <a:avLst/>
+          </a:prstGeom>
+          <a:gradFill flip="none" rotWithShape="1">
+            <a:gsLst>
+              <a:gs pos="0">
+                <a:schemeClr val="tx1">
+                  <a:shade val="30000"/>
+                  <a:satMod val="115000"/>
+                </a:schemeClr>
+              </a:gs>
+              <a:gs pos="50000">
+                <a:schemeClr val="tx1">
+                  <a:shade val="67500"/>
+                  <a:satMod val="115000"/>
+                </a:schemeClr>
+              </a:gs>
+              <a:gs pos="100000">
+                <a:schemeClr val="tx1">
+                  <a:shade val="100000"/>
+                  <a:satMod val="115000"/>
+                </a:schemeClr>
+              </a:gs>
+            </a:gsLst>
+            <a:lin ang="13500000" scaled="1"/>
+            <a:tileRect/>
+          </a:gradFill>
+          <a:ln>
+            <a:noFill/>
+          </a:ln>
+        </p:spPr>
+        <p:style>
+          <a:lnRef idx="2">
+            <a:schemeClr val="accent1">
+              <a:shade val="50000"/>
+            </a:schemeClr>
+          </a:lnRef>
+          <a:fillRef idx="1">
+            <a:schemeClr val="accent1"/>
+          </a:fillRef>
+          <a:effectRef idx="0">
+            <a:schemeClr val="accent1"/>
+          </a:effectRef>
+          <a:fontRef idx="minor">
+            <a:schemeClr val="lt1"/>
+          </a:fontRef>
+        </p:style>
+        <p:txBody>
+          <a:bodyPr rtlCol="0" anchor="ctr"/>
+          <a:lstStyle/>
+          <a:p>
+            <a:pPr algn="ctr"/>
+            <a:endParaRPr lang="en-CA"/>
+          </a:p>
+        </p:txBody>
+      </p:sp>
+      <p:sp>
+        <p:nvSpPr>
+          <p:cNvPr id="11" name="Footer Placeholder 10">
+            <a:extLst>
+              <a:ext uri="{FF2B5EF4-FFF2-40B4-BE49-F238E27FC236}">
+                <a16:creationId xmlns:a16="http://schemas.microsoft.com/office/drawing/2014/main" id="{8AD8C343-5443-41D3-85A8-798FEABF89B8}"/>
+              </a:ext>
+            </a:extLst>
+          </p:cNvPr>
+          <p:cNvSpPr>
+            <a:spLocks noGrp="1"/>
+          </p:cNvSpPr>
+          <p:nvPr>
+            <p:ph type="ftr" sz="quarter" idx="11"/>
+          </p:nvPr>
+        </p:nvSpPr>
+        <p:spPr/>
+        <p:txBody>
+          <a:bodyPr/>
+          <a:lstStyle/>
+          <a:p>
+            <a:r>
+              <a:rPr lang="en-US"/>
+              <a:t>Whether Weather Drives Crime</a:t>
+            </a:r>
+            <a:endParaRPr lang="en-US" dirty="0"/>
+          </a:p>
+        </p:txBody>
+      </p:sp>
+      <p:sp>
+        <p:nvSpPr>
+          <p:cNvPr id="12" name="Slide Number Placeholder 11">
+            <a:extLst>
+              <a:ext uri="{FF2B5EF4-FFF2-40B4-BE49-F238E27FC236}">
+                <a16:creationId xmlns:a16="http://schemas.microsoft.com/office/drawing/2014/main" id="{FA4338B6-962F-4C4F-AA10-92A3071FB905}"/>
+              </a:ext>
+            </a:extLst>
+          </p:cNvPr>
+          <p:cNvSpPr>
+            <a:spLocks noGrp="1"/>
+          </p:cNvSpPr>
+          <p:nvPr>
+            <p:ph type="sldNum" sz="quarter" idx="12"/>
+          </p:nvPr>
+        </p:nvSpPr>
+        <p:spPr/>
+        <p:txBody>
+          <a:bodyPr/>
+          <a:lstStyle/>
+          <a:p>
+            <a:fld id="{D57F1E4F-1CFF-5643-939E-217C01CDF565}" type="slidenum">
+              <a:rPr lang="en-US" smtClean="0"/>
+              <a:pPr/>
+              <a:t>19</a:t>
+            </a:fld>
+            <a:endParaRPr lang="en-US" dirty="0"/>
+          </a:p>
+        </p:txBody>
+      </p:sp>
+      <p:pic>
+        <p:nvPicPr>
+          <p:cNvPr id="3" name="Picture 2">
+            <a:extLst>
+              <a:ext uri="{FF2B5EF4-FFF2-40B4-BE49-F238E27FC236}">
+                <a16:creationId xmlns:a16="http://schemas.microsoft.com/office/drawing/2014/main" id="{986604E0-D93D-D14B-A37F-1C558AA356E8}"/>
+              </a:ext>
+            </a:extLst>
+          </p:cNvPr>
+          <p:cNvPicPr>
+            <a:picLocks noChangeAspect="1"/>
+          </p:cNvPicPr>
+          <p:nvPr/>
+        </p:nvPicPr>
+        <p:blipFill>
+          <a:blip r:embed="rId2"/>
+          <a:stretch>
+            <a:fillRect/>
+          </a:stretch>
+        </p:blipFill>
+        <p:spPr>
+          <a:xfrm>
+            <a:off x="689287" y="2203553"/>
+            <a:ext cx="10846498" cy="2458387"/>
+          </a:xfrm>
+          <a:prstGeom prst="rect">
+            <a:avLst/>
+          </a:prstGeom>
+        </p:spPr>
+      </p:pic>
+    </p:spTree>
+    <p:extLst>
+      <p:ext uri="{BB962C8B-B14F-4D97-AF65-F5344CB8AC3E}">
+        <p14:creationId xmlns:p14="http://schemas.microsoft.com/office/powerpoint/2010/main" val="54760466"/>
+      </p:ext>
+    </p:extLst>
+  </p:cSld>
+  <p:clrMapOvr>
+    <a:masterClrMapping/>
+  </p:clrMapOvr>
+</p:sld>
+</file>
+
+<file path=ppt/slides/slide2.xml><?xml version="1.0" encoding="utf-8"?>
+<p:sld xmlns:a="http://schemas.openxmlformats.org/drawingml/2006/main" xmlns:r="http://schemas.openxmlformats.org/officeDocument/2006/relationships" xmlns:p="http://schemas.openxmlformats.org/presentationml/2006/main">
+  <p:cSld>
+    <p:spTree>
+      <p:nvGrpSpPr>
+        <p:cNvPr id="1" name=""/>
+        <p:cNvGrpSpPr/>
+        <p:nvPr/>
+      </p:nvGrpSpPr>
+      <p:grpSpPr>
+        <a:xfrm>
+          <a:off x="0" y="0"/>
+          <a:ext cx="0" cy="0"/>
+          <a:chOff x="0" y="0"/>
+          <a:chExt cx="0" cy="0"/>
+        </a:xfrm>
+      </p:grpSpPr>
+      <p:sp>
+        <p:nvSpPr>
+          <p:cNvPr id="5" name="Title 1">
+            <a:extLst>
+              <a:ext uri="{FF2B5EF4-FFF2-40B4-BE49-F238E27FC236}">
+                <a16:creationId xmlns:a16="http://schemas.microsoft.com/office/drawing/2014/main" id="{02FB3FF4-C4B1-4F6B-BD55-EC26D607F64C}"/>
+              </a:ext>
+            </a:extLst>
+          </p:cNvPr>
+          <p:cNvSpPr txBox="1">
+            <a:spLocks/>
+          </p:cNvSpPr>
+          <p:nvPr/>
+        </p:nvSpPr>
+        <p:spPr bwMode="auto">
+          <a:xfrm>
+            <a:off x="1727200" y="274320"/>
+            <a:ext cx="10058400" cy="487363"/>
+          </a:xfrm>
+          <a:prstGeom prst="rect">
+            <a:avLst/>
+          </a:prstGeom>
+          <a:noFill/>
+          <a:ln>
+            <a:noFill/>
+          </a:ln>
+          <a:extLst>
+            <a:ext uri="{909E8E84-426E-40DD-AFC4-6F175D3DCCD1}">
+              <a14:hiddenFill xmlns:a14="http://schemas.microsoft.com/office/drawing/2010/main">
+                <a:solidFill>
+                  <a:srgbClr val="FFFFFF"/>
+                </a:solidFill>
+              </a14:hiddenFill>
+            </a:ext>
+            <a:ext uri="{91240B29-F687-4F45-9708-019B960494DF}">
+              <a14:hiddenLine xmlns:a14="http://schemas.microsoft.com/office/drawing/2010/main" w="9525">
+                <a:solidFill>
+                  <a:srgbClr val="000000"/>
+                </a:solidFill>
+                <a:miter lim="800000"/>
+                <a:headEnd/>
+                <a:tailEnd/>
+              </a14:hiddenLine>
+            </a:ext>
+          </a:extLst>
+        </p:spPr>
+        <p:txBody>
+          <a:bodyPr vert="horz" wrap="square" lIns="121899" tIns="60949" rIns="121899" bIns="60949" numCol="1" anchor="ctr" anchorCtr="0" compatLnSpc="1">
+            <a:prstTxWarp prst="textNoShape">
+              <a:avLst/>
+            </a:prstTxWarp>
+            <a:noAutofit/>
+          </a:bodyPr>
+          <a:lstStyle>
+            <a:lvl1pPr algn="l" rtl="0" eaLnBrk="1" fontAlgn="base" hangingPunct="1">
+              <a:spcBef>
+                <a:spcPct val="0"/>
+              </a:spcBef>
+              <a:spcAft>
+                <a:spcPct val="0"/>
+              </a:spcAft>
+              <a:defRPr sz="2200" kern="1200">
+                <a:solidFill>
+                  <a:schemeClr val="bg1"/>
+                </a:solidFill>
+                <a:latin typeface="Arial" pitchFamily="34" charset="0"/>
+                <a:ea typeface="+mj-ea"/>
+                <a:cs typeface="Arial" pitchFamily="34" charset="0"/>
+              </a:defRPr>
+            </a:lvl1pPr>
+            <a:lvl2pPr algn="l" rtl="0" eaLnBrk="1" fontAlgn="base" hangingPunct="1">
+              <a:spcBef>
+                <a:spcPct val="0"/>
+              </a:spcBef>
+              <a:spcAft>
+                <a:spcPct val="0"/>
+              </a:spcAft>
+              <a:defRPr sz="2900">
+                <a:solidFill>
+                  <a:schemeClr val="bg1"/>
+                </a:solidFill>
+                <a:latin typeface="Arial" pitchFamily="34" charset="0"/>
+                <a:cs typeface="Arial" pitchFamily="34" charset="0"/>
+              </a:defRPr>
+            </a:lvl2pPr>
+            <a:lvl3pPr algn="l" rtl="0" eaLnBrk="1" fontAlgn="base" hangingPunct="1">
+              <a:spcBef>
+                <a:spcPct val="0"/>
+              </a:spcBef>
+              <a:spcAft>
+                <a:spcPct val="0"/>
+              </a:spcAft>
+              <a:defRPr sz="2900">
+                <a:solidFill>
+                  <a:schemeClr val="bg1"/>
+                </a:solidFill>
+                <a:latin typeface="Arial" pitchFamily="34" charset="0"/>
+                <a:cs typeface="Arial" pitchFamily="34" charset="0"/>
+              </a:defRPr>
+            </a:lvl3pPr>
+            <a:lvl4pPr algn="l" rtl="0" eaLnBrk="1" fontAlgn="base" hangingPunct="1">
+              <a:spcBef>
+                <a:spcPct val="0"/>
+              </a:spcBef>
+              <a:spcAft>
+                <a:spcPct val="0"/>
+              </a:spcAft>
+              <a:defRPr sz="2900">
+                <a:solidFill>
+                  <a:schemeClr val="bg1"/>
+                </a:solidFill>
+                <a:latin typeface="Arial" pitchFamily="34" charset="0"/>
+                <a:cs typeface="Arial" pitchFamily="34" charset="0"/>
+              </a:defRPr>
+            </a:lvl4pPr>
+            <a:lvl5pPr algn="l" rtl="0" eaLnBrk="1" fontAlgn="base" hangingPunct="1">
+              <a:spcBef>
+                <a:spcPct val="0"/>
+              </a:spcBef>
+              <a:spcAft>
+                <a:spcPct val="0"/>
+              </a:spcAft>
+              <a:defRPr sz="2900">
+                <a:solidFill>
+                  <a:schemeClr val="bg1"/>
+                </a:solidFill>
+                <a:latin typeface="Arial" pitchFamily="34" charset="0"/>
+                <a:cs typeface="Arial" pitchFamily="34" charset="0"/>
+              </a:defRPr>
+            </a:lvl5pPr>
+            <a:lvl6pPr marL="609493" algn="l" rtl="0" eaLnBrk="1" fontAlgn="base" hangingPunct="1">
+              <a:spcBef>
+                <a:spcPct val="0"/>
+              </a:spcBef>
+              <a:spcAft>
+                <a:spcPct val="0"/>
+              </a:spcAft>
+              <a:defRPr sz="3700">
+                <a:solidFill>
+                  <a:schemeClr val="bg1"/>
+                </a:solidFill>
+                <a:latin typeface="Arial" pitchFamily="34" charset="0"/>
+                <a:cs typeface="Arial" pitchFamily="34" charset="0"/>
+              </a:defRPr>
+            </a:lvl6pPr>
+            <a:lvl7pPr marL="1218987" algn="l" rtl="0" eaLnBrk="1" fontAlgn="base" hangingPunct="1">
+              <a:spcBef>
+                <a:spcPct val="0"/>
+              </a:spcBef>
+              <a:spcAft>
+                <a:spcPct val="0"/>
+              </a:spcAft>
+              <a:defRPr sz="3700">
+                <a:solidFill>
+                  <a:schemeClr val="bg1"/>
+                </a:solidFill>
+                <a:latin typeface="Arial" pitchFamily="34" charset="0"/>
+                <a:cs typeface="Arial" pitchFamily="34" charset="0"/>
+              </a:defRPr>
+            </a:lvl7pPr>
+            <a:lvl8pPr marL="1828480" algn="l" rtl="0" eaLnBrk="1" fontAlgn="base" hangingPunct="1">
+              <a:spcBef>
+                <a:spcPct val="0"/>
+              </a:spcBef>
+              <a:spcAft>
+                <a:spcPct val="0"/>
+              </a:spcAft>
+              <a:defRPr sz="3700">
+                <a:solidFill>
+                  <a:schemeClr val="bg1"/>
+                </a:solidFill>
+                <a:latin typeface="Arial" pitchFamily="34" charset="0"/>
+                <a:cs typeface="Arial" pitchFamily="34" charset="0"/>
+              </a:defRPr>
+            </a:lvl8pPr>
+            <a:lvl9pPr marL="2437973" algn="l" rtl="0" eaLnBrk="1" fontAlgn="base" hangingPunct="1">
+              <a:spcBef>
+                <a:spcPct val="0"/>
+              </a:spcBef>
+              <a:spcAft>
+                <a:spcPct val="0"/>
+              </a:spcAft>
+              <a:defRPr sz="3700">
+                <a:solidFill>
+                  <a:schemeClr val="bg1"/>
+                </a:solidFill>
+                <a:latin typeface="Arial" pitchFamily="34" charset="0"/>
+                <a:cs typeface="Arial" pitchFamily="34" charset="0"/>
+              </a:defRPr>
+            </a:lvl9pPr>
+          </a:lstStyle>
+          <a:p>
             <a:pPr marL="0" marR="0" lvl="0" indent="0" algn="l" defTabSz="914400" rtl="0" eaLnBrk="1" fontAlgn="base" latinLnBrk="0" hangingPunct="1">
               <a:lnSpc>
                 <a:spcPct val="100000"/>
@@ -13030,7 +13458,7 @@
               <a:defRPr/>
             </a:pPr>
             <a:r>
-              <a:rPr kumimoji="0" lang="en-US" sz="2400" b="1" i="0" u="none" strike="noStrike" kern="1200" cap="none" spc="0" normalizeH="0" baseline="0" noProof="0">
+              <a:rPr kumimoji="0" lang="en-US" sz="2400" b="1" i="0" u="none" strike="noStrike" kern="1200" cap="none" spc="0" normalizeH="0" baseline="0" noProof="0" dirty="0">
                 <a:ln>
                   <a:noFill/>
                 </a:ln>
@@ -13047,7 +13475,7 @@
               <a:t>Whether Weather Drives Crime</a:t>
             </a:r>
             <a:br>
-              <a:rPr kumimoji="0" lang="en-US" sz="2400" b="0" i="0" u="none" strike="noStrike" kern="1200" cap="none" spc="0" normalizeH="0" baseline="0" noProof="0">
+              <a:rPr kumimoji="0" lang="en-US" sz="2400" b="0" i="0" u="none" strike="noStrike" kern="1200" cap="none" spc="0" normalizeH="0" baseline="0" noProof="0" dirty="0">
                 <a:ln>
                   <a:noFill/>
                 </a:ln>
@@ -13063,7 +13491,7 @@
               </a:rPr>
             </a:br>
             <a:r>
-              <a:rPr kumimoji="0" lang="en-GB" sz="2200" b="0" i="0" u="none" strike="noStrike" kern="1200" cap="none" spc="0" normalizeH="0" baseline="0" noProof="0">
+              <a:rPr kumimoji="0" lang="en-GB" sz="2200" b="0" i="0" u="none" strike="noStrike" kern="1200" cap="none" spc="0" normalizeH="0" baseline="0" noProof="0" dirty="0">
                 <a:ln>
                   <a:noFill/>
                 </a:ln>
@@ -13079,20 +13507,6 @@
               </a:rPr>
               <a:t>Agenda</a:t>
             </a:r>
-            <a:endParaRPr kumimoji="0" lang="en-GB" sz="2200" b="0" i="0" u="none" strike="noStrike" kern="1200" cap="none" spc="0" normalizeH="0" baseline="0" noProof="0" dirty="0">
-              <a:ln>
-                <a:noFill/>
-              </a:ln>
-              <a:solidFill>
-                <a:srgbClr val="FFDD3E"/>
-              </a:solidFill>
-              <a:effectLst/>
-              <a:uLnTx/>
-              <a:uFillTx/>
-              <a:latin typeface="Arial" pitchFamily="34" charset="0"/>
-              <a:ea typeface="+mj-ea"/>
-              <a:cs typeface="Arial" pitchFamily="34" charset="0"/>
-            </a:endParaRPr>
           </a:p>
         </p:txBody>
       </p:sp>
@@ -13164,6 +13578,1436 @@
           <a:bodyPr rtlCol="0" anchor="ctr"/>
           <a:lstStyle/>
           <a:p>
+            <a:pPr algn="ctr"/>
+            <a:endParaRPr lang="en-CA"/>
+          </a:p>
+        </p:txBody>
+      </p:sp>
+      <p:sp>
+        <p:nvSpPr>
+          <p:cNvPr id="9" name="Rectangle 10">
+            <a:extLst>
+              <a:ext uri="{FF2B5EF4-FFF2-40B4-BE49-F238E27FC236}">
+                <a16:creationId xmlns:a16="http://schemas.microsoft.com/office/drawing/2014/main" id="{96F2C020-DA3F-4FB8-8899-23C1B2BDFC04}"/>
+              </a:ext>
+            </a:extLst>
+          </p:cNvPr>
+          <p:cNvSpPr>
+            <a:spLocks noChangeArrowheads="1"/>
+          </p:cNvSpPr>
+          <p:nvPr/>
+        </p:nvSpPr>
+        <p:spPr bwMode="auto">
+          <a:xfrm>
+            <a:off x="457200" y="1432028"/>
+            <a:ext cx="11049000" cy="299118"/>
+          </a:xfrm>
+          <a:prstGeom prst="rect">
+            <a:avLst/>
+          </a:prstGeom>
+          <a:gradFill flip="none" rotWithShape="1">
+            <a:gsLst>
+              <a:gs pos="0">
+                <a:srgbClr val="6CCFF6">
+                  <a:shade val="30000"/>
+                  <a:satMod val="115000"/>
+                </a:srgbClr>
+              </a:gs>
+              <a:gs pos="50000">
+                <a:srgbClr val="6CCFF6">
+                  <a:shade val="67500"/>
+                  <a:satMod val="115000"/>
+                </a:srgbClr>
+              </a:gs>
+              <a:gs pos="100000">
+                <a:srgbClr val="6CCFF6">
+                  <a:shade val="100000"/>
+                  <a:satMod val="115000"/>
+                </a:srgbClr>
+              </a:gs>
+            </a:gsLst>
+            <a:path path="circle">
+              <a:fillToRect l="100000" b="100000"/>
+            </a:path>
+            <a:tileRect t="-100000" r="-100000"/>
+          </a:gradFill>
+          <a:ln>
+            <a:noFill/>
+          </a:ln>
+          <a:extLst/>
+        </p:spPr>
+        <p:txBody>
+          <a:bodyPr wrap="none" lIns="121899" tIns="60949" rIns="121899" bIns="60949" anchor="ctr"/>
+          <a:lstStyle>
+            <a:lvl1pPr eaLnBrk="0" hangingPunct="0">
+              <a:spcBef>
+                <a:spcPct val="20000"/>
+              </a:spcBef>
+              <a:buClr>
+                <a:srgbClr val="4E84C4"/>
+              </a:buClr>
+              <a:buFont typeface="Wingdings" charset="2"/>
+              <a:buChar char="§"/>
+              <a:defRPr sz="1600">
+                <a:solidFill>
+                  <a:schemeClr val="tx1"/>
+                </a:solidFill>
+                <a:latin typeface="Arial" charset="0"/>
+                <a:cs typeface="Arial" charset="0"/>
+              </a:defRPr>
+            </a:lvl1pPr>
+            <a:lvl2pPr marL="742950" indent="-285750" eaLnBrk="0" hangingPunct="0">
+              <a:spcBef>
+                <a:spcPct val="20000"/>
+              </a:spcBef>
+              <a:buClr>
+                <a:srgbClr val="4E84C4"/>
+              </a:buClr>
+              <a:buFont typeface="Myriad Pro" pitchFamily="32" charset="0"/>
+              <a:buChar char="–"/>
+              <a:defRPr sz="1600">
+                <a:solidFill>
+                  <a:schemeClr val="tx1"/>
+                </a:solidFill>
+                <a:latin typeface="Arial" charset="0"/>
+                <a:cs typeface="Arial" charset="0"/>
+              </a:defRPr>
+            </a:lvl2pPr>
+            <a:lvl3pPr marL="1143000" indent="-228600" eaLnBrk="0" hangingPunct="0">
+              <a:spcBef>
+                <a:spcPct val="20000"/>
+              </a:spcBef>
+              <a:buClr>
+                <a:srgbClr val="4E84C4"/>
+              </a:buClr>
+              <a:buFont typeface="Courier New" pitchFamily="49" charset="0"/>
+              <a:buChar char="o"/>
+              <a:defRPr sz="1400">
+                <a:solidFill>
+                  <a:schemeClr val="tx1"/>
+                </a:solidFill>
+                <a:latin typeface="Arial" charset="0"/>
+                <a:cs typeface="Arial" charset="0"/>
+              </a:defRPr>
+            </a:lvl3pPr>
+            <a:lvl4pPr marL="1600200" indent="-228600" eaLnBrk="0" hangingPunct="0">
+              <a:spcBef>
+                <a:spcPct val="20000"/>
+              </a:spcBef>
+              <a:buClr>
+                <a:srgbClr val="4E84C4"/>
+              </a:buClr>
+              <a:buFont typeface="Arial" charset="0"/>
+              <a:buChar char="•"/>
+              <a:defRPr sz="1400">
+                <a:solidFill>
+                  <a:schemeClr val="tx1"/>
+                </a:solidFill>
+                <a:latin typeface="Arial" charset="0"/>
+                <a:cs typeface="Arial" charset="0"/>
+              </a:defRPr>
+            </a:lvl4pPr>
+            <a:lvl5pPr marL="2057400" indent="-228600" eaLnBrk="0" hangingPunct="0">
+              <a:spcBef>
+                <a:spcPct val="20000"/>
+              </a:spcBef>
+              <a:buFont typeface="Arial" charset="0"/>
+              <a:buChar char="»"/>
+              <a:defRPr sz="2000">
+                <a:solidFill>
+                  <a:schemeClr val="tx1"/>
+                </a:solidFill>
+                <a:latin typeface="Myriad Pro" pitchFamily="32" charset="0"/>
+                <a:cs typeface="Arial" charset="0"/>
+              </a:defRPr>
+            </a:lvl5pPr>
+            <a:lvl6pPr marL="2514600" indent="-228600" eaLnBrk="0" fontAlgn="base" hangingPunct="0">
+              <a:spcBef>
+                <a:spcPct val="20000"/>
+              </a:spcBef>
+              <a:spcAft>
+                <a:spcPct val="0"/>
+              </a:spcAft>
+              <a:buFont typeface="Arial" charset="0"/>
+              <a:buChar char="»"/>
+              <a:defRPr sz="2000">
+                <a:solidFill>
+                  <a:schemeClr val="tx1"/>
+                </a:solidFill>
+                <a:latin typeface="Myriad Pro" pitchFamily="32" charset="0"/>
+                <a:cs typeface="Arial" charset="0"/>
+              </a:defRPr>
+            </a:lvl6pPr>
+            <a:lvl7pPr marL="2971800" indent="-228600" eaLnBrk="0" fontAlgn="base" hangingPunct="0">
+              <a:spcBef>
+                <a:spcPct val="20000"/>
+              </a:spcBef>
+              <a:spcAft>
+                <a:spcPct val="0"/>
+              </a:spcAft>
+              <a:buFont typeface="Arial" charset="0"/>
+              <a:buChar char="»"/>
+              <a:defRPr sz="2000">
+                <a:solidFill>
+                  <a:schemeClr val="tx1"/>
+                </a:solidFill>
+                <a:latin typeface="Myriad Pro" pitchFamily="32" charset="0"/>
+                <a:cs typeface="Arial" charset="0"/>
+              </a:defRPr>
+            </a:lvl7pPr>
+            <a:lvl8pPr marL="3429000" indent="-228600" eaLnBrk="0" fontAlgn="base" hangingPunct="0">
+              <a:spcBef>
+                <a:spcPct val="20000"/>
+              </a:spcBef>
+              <a:spcAft>
+                <a:spcPct val="0"/>
+              </a:spcAft>
+              <a:buFont typeface="Arial" charset="0"/>
+              <a:buChar char="»"/>
+              <a:defRPr sz="2000">
+                <a:solidFill>
+                  <a:schemeClr val="tx1"/>
+                </a:solidFill>
+                <a:latin typeface="Myriad Pro" pitchFamily="32" charset="0"/>
+                <a:cs typeface="Arial" charset="0"/>
+              </a:defRPr>
+            </a:lvl8pPr>
+            <a:lvl9pPr marL="3886200" indent="-228600" eaLnBrk="0" fontAlgn="base" hangingPunct="0">
+              <a:spcBef>
+                <a:spcPct val="20000"/>
+              </a:spcBef>
+              <a:spcAft>
+                <a:spcPct val="0"/>
+              </a:spcAft>
+              <a:buFont typeface="Arial" charset="0"/>
+              <a:buChar char="»"/>
+              <a:defRPr sz="2000">
+                <a:solidFill>
+                  <a:schemeClr val="tx1"/>
+                </a:solidFill>
+                <a:latin typeface="Myriad Pro" pitchFamily="32" charset="0"/>
+                <a:cs typeface="Arial" charset="0"/>
+              </a:defRPr>
+            </a:lvl9pPr>
+          </a:lstStyle>
+          <a:p>
+            <a:pPr algn="ctr" defTabSz="914400" eaLnBrk="1" fontAlgn="base" hangingPunct="1">
+              <a:spcBef>
+                <a:spcPct val="0"/>
+              </a:spcBef>
+              <a:spcAft>
+                <a:spcPct val="0"/>
+              </a:spcAft>
+              <a:buClrTx/>
+              <a:buFont typeface="Wingdings" charset="2"/>
+              <a:buNone/>
+            </a:pPr>
+            <a:endParaRPr lang="en-US" altLang="en-US" dirty="0">
+              <a:solidFill>
+                <a:srgbClr val="000000"/>
+              </a:solidFill>
+              <a:latin typeface="Myriad Pro" pitchFamily="32" charset="0"/>
+            </a:endParaRPr>
+          </a:p>
+        </p:txBody>
+      </p:sp>
+      <p:sp>
+        <p:nvSpPr>
+          <p:cNvPr id="10" name="Content Placeholder 2">
+            <a:extLst>
+              <a:ext uri="{FF2B5EF4-FFF2-40B4-BE49-F238E27FC236}">
+                <a16:creationId xmlns:a16="http://schemas.microsoft.com/office/drawing/2014/main" id="{5D2DD52E-8399-4606-A772-EB7CB1BB6A22}"/>
+              </a:ext>
+            </a:extLst>
+          </p:cNvPr>
+          <p:cNvSpPr txBox="1">
+            <a:spLocks/>
+          </p:cNvSpPr>
+          <p:nvPr/>
+        </p:nvSpPr>
+        <p:spPr bwMode="auto">
+          <a:xfrm>
+            <a:off x="548220" y="1417638"/>
+            <a:ext cx="11237382" cy="4525963"/>
+          </a:xfrm>
+          <a:prstGeom prst="rect">
+            <a:avLst/>
+          </a:prstGeom>
+          <a:noFill/>
+          <a:ln>
+            <a:noFill/>
+          </a:ln>
+          <a:extLst>
+            <a:ext uri="{909E8E84-426E-40DD-AFC4-6F175D3DCCD1}">
+              <a14:hiddenFill xmlns:a14="http://schemas.microsoft.com/office/drawing/2010/main">
+                <a:solidFill>
+                  <a:srgbClr val="FFFFFF"/>
+                </a:solidFill>
+              </a14:hiddenFill>
+            </a:ext>
+            <a:ext uri="{91240B29-F687-4F45-9708-019B960494DF}">
+              <a14:hiddenLine xmlns:a14="http://schemas.microsoft.com/office/drawing/2010/main" w="9525">
+                <a:solidFill>
+                  <a:srgbClr val="000000"/>
+                </a:solidFill>
+                <a:miter lim="800000"/>
+                <a:headEnd/>
+                <a:tailEnd/>
+              </a14:hiddenLine>
+            </a:ext>
+          </a:extLst>
+        </p:spPr>
+        <p:txBody>
+          <a:bodyPr vert="horz" wrap="square" lIns="121899" tIns="60949" rIns="121899" bIns="60949" numCol="1" anchor="t" anchorCtr="0" compatLnSpc="1">
+            <a:prstTxWarp prst="textNoShape">
+              <a:avLst/>
+            </a:prstTxWarp>
+            <a:noAutofit/>
+          </a:bodyPr>
+          <a:lstStyle>
+            <a:lvl1pPr marL="308979" indent="-308979" algn="l" rtl="0" eaLnBrk="1" fontAlgn="base" hangingPunct="1">
+              <a:lnSpc>
+                <a:spcPct val="100000"/>
+              </a:lnSpc>
+              <a:spcBef>
+                <a:spcPts val="1600"/>
+              </a:spcBef>
+              <a:spcAft>
+                <a:spcPct val="0"/>
+              </a:spcAft>
+              <a:buClr>
+                <a:srgbClr val="4E84C4"/>
+              </a:buClr>
+              <a:buFont typeface="Wingdings" charset="2"/>
+              <a:buChar char="§"/>
+              <a:defRPr sz="1600" kern="1200">
+                <a:solidFill>
+                  <a:schemeClr val="tx1"/>
+                </a:solidFill>
+                <a:latin typeface="Arial" pitchFamily="34" charset="0"/>
+                <a:ea typeface="+mn-ea"/>
+                <a:cs typeface="Arial" pitchFamily="34" charset="0"/>
+              </a:defRPr>
+            </a:lvl1pPr>
+            <a:lvl2pPr marL="910007" indent="-300514" algn="l" rtl="0" eaLnBrk="1" fontAlgn="base" hangingPunct="1">
+              <a:lnSpc>
+                <a:spcPct val="100000"/>
+              </a:lnSpc>
+              <a:spcBef>
+                <a:spcPts val="512"/>
+              </a:spcBef>
+              <a:spcAft>
+                <a:spcPct val="0"/>
+              </a:spcAft>
+              <a:buClr>
+                <a:srgbClr val="4E84C4"/>
+              </a:buClr>
+              <a:buFont typeface="Myriad Pro" pitchFamily="32" charset="0"/>
+              <a:buChar char="–"/>
+              <a:defRPr sz="1600" kern="1200">
+                <a:solidFill>
+                  <a:schemeClr val="tx1"/>
+                </a:solidFill>
+                <a:latin typeface="Arial" pitchFamily="34" charset="0"/>
+                <a:ea typeface="+mn-ea"/>
+                <a:cs typeface="Arial" pitchFamily="34" charset="0"/>
+              </a:defRPr>
+            </a:lvl2pPr>
+            <a:lvl3pPr marL="1523733" indent="-304747" algn="l" rtl="0" eaLnBrk="1" fontAlgn="base" hangingPunct="1">
+              <a:lnSpc>
+                <a:spcPct val="100000"/>
+              </a:lnSpc>
+              <a:spcBef>
+                <a:spcPts val="512"/>
+              </a:spcBef>
+              <a:spcAft>
+                <a:spcPct val="0"/>
+              </a:spcAft>
+              <a:buClr>
+                <a:srgbClr val="4E84C4"/>
+              </a:buClr>
+              <a:buFont typeface="Courier New" pitchFamily="49" charset="0"/>
+              <a:buChar char="o"/>
+              <a:defRPr sz="1500" kern="1200">
+                <a:solidFill>
+                  <a:schemeClr val="tx1"/>
+                </a:solidFill>
+                <a:latin typeface="Arial" pitchFamily="34" charset="0"/>
+                <a:ea typeface="+mn-ea"/>
+                <a:cs typeface="Arial" pitchFamily="34" charset="0"/>
+              </a:defRPr>
+            </a:lvl3pPr>
+            <a:lvl4pPr marL="2133227" indent="-304747" algn="l" rtl="0" eaLnBrk="1" fontAlgn="base" hangingPunct="1">
+              <a:lnSpc>
+                <a:spcPct val="100000"/>
+              </a:lnSpc>
+              <a:spcBef>
+                <a:spcPts val="512"/>
+              </a:spcBef>
+              <a:spcAft>
+                <a:spcPct val="0"/>
+              </a:spcAft>
+              <a:buClr>
+                <a:srgbClr val="4E84C4"/>
+              </a:buClr>
+              <a:buFont typeface="Arial" charset="0"/>
+              <a:buChar char="•"/>
+              <a:defRPr sz="1300" kern="1200">
+                <a:solidFill>
+                  <a:schemeClr val="tx1"/>
+                </a:solidFill>
+                <a:latin typeface="Arial" pitchFamily="34" charset="0"/>
+                <a:ea typeface="+mn-ea"/>
+                <a:cs typeface="Arial" pitchFamily="34" charset="0"/>
+              </a:defRPr>
+            </a:lvl4pPr>
+            <a:lvl5pPr marL="2742720" indent="-304747" algn="l" rtl="0" eaLnBrk="1" fontAlgn="base" hangingPunct="1">
+              <a:spcBef>
+                <a:spcPct val="20000"/>
+              </a:spcBef>
+              <a:spcAft>
+                <a:spcPct val="0"/>
+              </a:spcAft>
+              <a:buFont typeface="Arial" charset="0"/>
+              <a:buChar char="»"/>
+              <a:defRPr sz="2700" kern="1200">
+                <a:solidFill>
+                  <a:schemeClr val="tx1"/>
+                </a:solidFill>
+                <a:latin typeface="Myriad Pro" pitchFamily="34" charset="0"/>
+                <a:ea typeface="+mn-ea"/>
+                <a:cs typeface="Arial" pitchFamily="34" charset="0"/>
+              </a:defRPr>
+            </a:lvl5pPr>
+            <a:lvl6pPr marL="3352213" indent="-304747" algn="l" defTabSz="1218987" rtl="0" eaLnBrk="1" latinLnBrk="0" hangingPunct="1">
+              <a:spcBef>
+                <a:spcPct val="20000"/>
+              </a:spcBef>
+              <a:buFont typeface="Arial" pitchFamily="34" charset="0"/>
+              <a:buChar char="•"/>
+              <a:defRPr sz="2700" kern="1200">
+                <a:solidFill>
+                  <a:schemeClr val="tx1"/>
+                </a:solidFill>
+                <a:latin typeface="+mn-lt"/>
+                <a:ea typeface="+mn-ea"/>
+                <a:cs typeface="+mn-cs"/>
+              </a:defRPr>
+            </a:lvl6pPr>
+            <a:lvl7pPr marL="3961707" indent="-304747" algn="l" defTabSz="1218987" rtl="0" eaLnBrk="1" latinLnBrk="0" hangingPunct="1">
+              <a:spcBef>
+                <a:spcPct val="20000"/>
+              </a:spcBef>
+              <a:buFont typeface="Arial" pitchFamily="34" charset="0"/>
+              <a:buChar char="•"/>
+              <a:defRPr sz="2700" kern="1200">
+                <a:solidFill>
+                  <a:schemeClr val="tx1"/>
+                </a:solidFill>
+                <a:latin typeface="+mn-lt"/>
+                <a:ea typeface="+mn-ea"/>
+                <a:cs typeface="+mn-cs"/>
+              </a:defRPr>
+            </a:lvl7pPr>
+            <a:lvl8pPr marL="4571200" indent="-304747" algn="l" defTabSz="1218987" rtl="0" eaLnBrk="1" latinLnBrk="0" hangingPunct="1">
+              <a:spcBef>
+                <a:spcPct val="20000"/>
+              </a:spcBef>
+              <a:buFont typeface="Arial" pitchFamily="34" charset="0"/>
+              <a:buChar char="•"/>
+              <a:defRPr sz="2700" kern="1200">
+                <a:solidFill>
+                  <a:schemeClr val="tx1"/>
+                </a:solidFill>
+                <a:latin typeface="+mn-lt"/>
+                <a:ea typeface="+mn-ea"/>
+                <a:cs typeface="+mn-cs"/>
+              </a:defRPr>
+            </a:lvl8pPr>
+            <a:lvl9pPr marL="5180693" indent="-304747" algn="l" defTabSz="1218987" rtl="0" eaLnBrk="1" latinLnBrk="0" hangingPunct="1">
+              <a:spcBef>
+                <a:spcPct val="20000"/>
+              </a:spcBef>
+              <a:buFont typeface="Arial" pitchFamily="34" charset="0"/>
+              <a:buChar char="•"/>
+              <a:defRPr sz="2700" kern="1200">
+                <a:solidFill>
+                  <a:schemeClr val="tx1"/>
+                </a:solidFill>
+                <a:latin typeface="+mn-lt"/>
+                <a:ea typeface="+mn-ea"/>
+                <a:cs typeface="+mn-cs"/>
+              </a:defRPr>
+            </a:lvl9pPr>
+          </a:lstStyle>
+          <a:p>
+            <a:pPr marL="308979" marR="0" lvl="0" indent="-308979" algn="l" defTabSz="914400" rtl="0" eaLnBrk="1" fontAlgn="base" latinLnBrk="0" hangingPunct="1">
+              <a:lnSpc>
+                <a:spcPct val="100000"/>
+              </a:lnSpc>
+              <a:spcBef>
+                <a:spcPts val="600"/>
+              </a:spcBef>
+              <a:spcAft>
+                <a:spcPct val="0"/>
+              </a:spcAft>
+              <a:buClr>
+                <a:srgbClr val="4E84C4"/>
+              </a:buClr>
+              <a:buSzTx/>
+              <a:buFont typeface="Wingdings" charset="2"/>
+              <a:buChar char="§"/>
+              <a:tabLst/>
+              <a:defRPr/>
+            </a:pPr>
+            <a:r>
+              <a:rPr kumimoji="0" lang="en-US" sz="1400" b="0" i="0" u="none" strike="noStrike" kern="1200" cap="none" spc="0" normalizeH="0" baseline="0" noProof="0" dirty="0">
+                <a:ln>
+                  <a:noFill/>
+                </a:ln>
+                <a:solidFill>
+                  <a:srgbClr val="000000"/>
+                </a:solidFill>
+                <a:effectLst/>
+                <a:uLnTx/>
+                <a:uFillTx/>
+                <a:latin typeface="Arial" pitchFamily="34" charset="0"/>
+                <a:ea typeface="+mn-ea"/>
+                <a:cs typeface="Arial" pitchFamily="34" charset="0"/>
+              </a:rPr>
+              <a:t>Introduction, Problem Statement and Scope</a:t>
+            </a:r>
+          </a:p>
+          <a:p>
+            <a:pPr marL="308979" marR="0" lvl="0" indent="-308979" algn="l" defTabSz="914400" rtl="0" eaLnBrk="1" fontAlgn="base" latinLnBrk="0" hangingPunct="1">
+              <a:lnSpc>
+                <a:spcPct val="100000"/>
+              </a:lnSpc>
+              <a:spcBef>
+                <a:spcPts val="600"/>
+              </a:spcBef>
+              <a:spcAft>
+                <a:spcPct val="0"/>
+              </a:spcAft>
+              <a:buClr>
+                <a:srgbClr val="4E84C4"/>
+              </a:buClr>
+              <a:buSzTx/>
+              <a:buFont typeface="Wingdings" charset="2"/>
+              <a:buChar char="§"/>
+              <a:tabLst/>
+              <a:defRPr/>
+            </a:pPr>
+            <a:r>
+              <a:rPr kumimoji="0" lang="en-US" sz="1400" b="0" i="0" u="none" strike="noStrike" kern="1200" cap="none" spc="0" normalizeH="0" baseline="0" noProof="0" dirty="0">
+                <a:ln>
+                  <a:noFill/>
+                </a:ln>
+                <a:solidFill>
+                  <a:srgbClr val="000000"/>
+                </a:solidFill>
+                <a:effectLst/>
+                <a:uLnTx/>
+                <a:uFillTx/>
+                <a:latin typeface="Arial" pitchFamily="34" charset="0"/>
+                <a:ea typeface="+mn-ea"/>
+                <a:cs typeface="Arial" pitchFamily="34" charset="0"/>
+              </a:rPr>
+              <a:t>Methodology </a:t>
+            </a:r>
+          </a:p>
+          <a:p>
+            <a:pPr marL="308979" marR="0" lvl="0" indent="-308979" algn="l" defTabSz="914400" rtl="0" eaLnBrk="1" fontAlgn="base" latinLnBrk="0" hangingPunct="1">
+              <a:lnSpc>
+                <a:spcPct val="100000"/>
+              </a:lnSpc>
+              <a:spcBef>
+                <a:spcPts val="600"/>
+              </a:spcBef>
+              <a:spcAft>
+                <a:spcPct val="0"/>
+              </a:spcAft>
+              <a:buClr>
+                <a:srgbClr val="4E84C4"/>
+              </a:buClr>
+              <a:buSzTx/>
+              <a:buFont typeface="Wingdings" charset="2"/>
+              <a:buChar char="§"/>
+              <a:tabLst/>
+              <a:defRPr/>
+            </a:pPr>
+            <a:r>
+              <a:rPr kumimoji="0" lang="en-US" sz="1400" b="0" i="0" u="none" strike="noStrike" kern="1200" cap="none" spc="0" normalizeH="0" baseline="0" noProof="0" dirty="0">
+                <a:ln>
+                  <a:noFill/>
+                </a:ln>
+                <a:solidFill>
+                  <a:srgbClr val="000000"/>
+                </a:solidFill>
+                <a:effectLst/>
+                <a:uLnTx/>
+                <a:uFillTx/>
+                <a:latin typeface="Arial" pitchFamily="34" charset="0"/>
+                <a:ea typeface="+mn-ea"/>
+                <a:cs typeface="Arial" pitchFamily="34" charset="0"/>
+              </a:rPr>
+              <a:t>Day of </a:t>
+            </a:r>
+            <a:r>
+              <a:rPr lang="en-US" sz="1400" dirty="0">
+                <a:solidFill>
+                  <a:srgbClr val="000000"/>
+                </a:solidFill>
+              </a:rPr>
+              <a:t>Week </a:t>
+            </a:r>
+            <a:r>
+              <a:rPr kumimoji="0" lang="en-US" sz="1400" b="0" i="0" u="none" strike="noStrike" kern="1200" cap="none" spc="0" normalizeH="0" baseline="0" noProof="0" dirty="0">
+                <a:ln>
+                  <a:noFill/>
+                </a:ln>
+                <a:solidFill>
+                  <a:srgbClr val="000000"/>
+                </a:solidFill>
+                <a:effectLst/>
+                <a:uLnTx/>
+                <a:uFillTx/>
+                <a:latin typeface="Arial" pitchFamily="34" charset="0"/>
+                <a:ea typeface="+mn-ea"/>
+                <a:cs typeface="Arial" pitchFamily="34" charset="0"/>
+              </a:rPr>
+              <a:t>vs Crime</a:t>
+            </a:r>
+          </a:p>
+          <a:p>
+            <a:pPr marL="910007" marR="0" lvl="1" indent="-300514" algn="l" defTabSz="914400" rtl="0" eaLnBrk="1" fontAlgn="base" latinLnBrk="0" hangingPunct="1">
+              <a:lnSpc>
+                <a:spcPct val="100000"/>
+              </a:lnSpc>
+              <a:spcBef>
+                <a:spcPts val="600"/>
+              </a:spcBef>
+              <a:spcAft>
+                <a:spcPct val="0"/>
+              </a:spcAft>
+              <a:buClr>
+                <a:srgbClr val="4E84C4"/>
+              </a:buClr>
+              <a:buSzTx/>
+              <a:buFont typeface="Myriad Pro" pitchFamily="32" charset="0"/>
+              <a:buChar char="–"/>
+              <a:tabLst/>
+              <a:defRPr/>
+            </a:pPr>
+            <a:r>
+              <a:rPr kumimoji="0" lang="en-US" sz="1400" b="0" i="0" u="none" strike="noStrike" kern="1200" cap="none" spc="0" normalizeH="0" baseline="0" noProof="0" dirty="0">
+                <a:ln>
+                  <a:noFill/>
+                </a:ln>
+                <a:solidFill>
+                  <a:srgbClr val="000000"/>
+                </a:solidFill>
+                <a:effectLst/>
+                <a:uLnTx/>
+                <a:uFillTx/>
+                <a:latin typeface="Arial" pitchFamily="34" charset="0"/>
+                <a:ea typeface="+mn-ea"/>
+                <a:cs typeface="Arial" pitchFamily="34" charset="0"/>
+              </a:rPr>
+              <a:t>Findings</a:t>
+            </a:r>
+          </a:p>
+          <a:p>
+            <a:pPr marL="910007" marR="0" lvl="1" indent="-300514" algn="l" defTabSz="914400" rtl="0" eaLnBrk="1" fontAlgn="base" latinLnBrk="0" hangingPunct="1">
+              <a:lnSpc>
+                <a:spcPct val="100000"/>
+              </a:lnSpc>
+              <a:spcBef>
+                <a:spcPts val="600"/>
+              </a:spcBef>
+              <a:spcAft>
+                <a:spcPct val="0"/>
+              </a:spcAft>
+              <a:buClr>
+                <a:srgbClr val="4E84C4"/>
+              </a:buClr>
+              <a:buSzTx/>
+              <a:buFont typeface="Myriad Pro" pitchFamily="32" charset="0"/>
+              <a:buChar char="–"/>
+              <a:tabLst/>
+              <a:defRPr/>
+            </a:pPr>
+            <a:r>
+              <a:rPr kumimoji="0" lang="en-US" sz="1400" b="0" i="0" u="none" strike="noStrike" kern="1200" cap="none" spc="0" normalizeH="0" baseline="0" noProof="0" dirty="0">
+                <a:ln>
+                  <a:noFill/>
+                </a:ln>
+                <a:solidFill>
+                  <a:srgbClr val="000000"/>
+                </a:solidFill>
+                <a:effectLst/>
+                <a:uLnTx/>
+                <a:uFillTx/>
+                <a:latin typeface="Arial" pitchFamily="34" charset="0"/>
+                <a:ea typeface="+mn-ea"/>
+                <a:cs typeface="Arial" pitchFamily="34" charset="0"/>
+              </a:rPr>
+              <a:t>Conclusions</a:t>
+            </a:r>
+          </a:p>
+          <a:p>
+            <a:pPr marL="308979" marR="0" lvl="0" indent="-308979" algn="l" defTabSz="914400" rtl="0" eaLnBrk="1" fontAlgn="base" latinLnBrk="0" hangingPunct="1">
+              <a:lnSpc>
+                <a:spcPct val="100000"/>
+              </a:lnSpc>
+              <a:spcBef>
+                <a:spcPts val="600"/>
+              </a:spcBef>
+              <a:spcAft>
+                <a:spcPct val="0"/>
+              </a:spcAft>
+              <a:buClr>
+                <a:srgbClr val="4E84C4"/>
+              </a:buClr>
+              <a:buSzTx/>
+              <a:buFont typeface="Wingdings" charset="2"/>
+              <a:buChar char="§"/>
+              <a:tabLst/>
+              <a:defRPr/>
+            </a:pPr>
+            <a:r>
+              <a:rPr kumimoji="0" lang="en-US" sz="1400" b="0" i="0" u="none" strike="noStrike" kern="1200" cap="none" spc="0" normalizeH="0" baseline="0" noProof="0" dirty="0">
+                <a:ln>
+                  <a:noFill/>
+                </a:ln>
+                <a:solidFill>
+                  <a:srgbClr val="000000"/>
+                </a:solidFill>
+                <a:effectLst/>
+                <a:uLnTx/>
+                <a:uFillTx/>
+                <a:latin typeface="Arial" pitchFamily="34" charset="0"/>
+                <a:ea typeface="+mn-ea"/>
+                <a:cs typeface="Arial" pitchFamily="34" charset="0"/>
+              </a:rPr>
+              <a:t>Precipitation vs Crime</a:t>
+            </a:r>
+          </a:p>
+          <a:p>
+            <a:pPr marL="910007" marR="0" lvl="1" indent="-300514" algn="l" defTabSz="914400" rtl="0" eaLnBrk="1" fontAlgn="base" latinLnBrk="0" hangingPunct="1">
+              <a:lnSpc>
+                <a:spcPct val="100000"/>
+              </a:lnSpc>
+              <a:spcBef>
+                <a:spcPts val="600"/>
+              </a:spcBef>
+              <a:spcAft>
+                <a:spcPct val="0"/>
+              </a:spcAft>
+              <a:buClr>
+                <a:srgbClr val="4E84C4"/>
+              </a:buClr>
+              <a:buSzTx/>
+              <a:buFont typeface="Myriad Pro" pitchFamily="32" charset="0"/>
+              <a:buChar char="–"/>
+              <a:tabLst/>
+              <a:defRPr/>
+            </a:pPr>
+            <a:r>
+              <a:rPr kumimoji="0" lang="en-US" sz="1400" b="0" i="0" u="none" strike="noStrike" kern="1200" cap="none" spc="0" normalizeH="0" baseline="0" noProof="0" dirty="0">
+                <a:ln>
+                  <a:noFill/>
+                </a:ln>
+                <a:solidFill>
+                  <a:srgbClr val="000000"/>
+                </a:solidFill>
+                <a:effectLst/>
+                <a:uLnTx/>
+                <a:uFillTx/>
+                <a:latin typeface="Arial" pitchFamily="34" charset="0"/>
+                <a:ea typeface="+mn-ea"/>
+                <a:cs typeface="Arial" pitchFamily="34" charset="0"/>
+              </a:rPr>
+              <a:t>Findings</a:t>
+            </a:r>
+          </a:p>
+          <a:p>
+            <a:pPr marL="910007" marR="0" lvl="1" indent="-300514" algn="l" defTabSz="914400" rtl="0" eaLnBrk="1" fontAlgn="base" latinLnBrk="0" hangingPunct="1">
+              <a:lnSpc>
+                <a:spcPct val="100000"/>
+              </a:lnSpc>
+              <a:spcBef>
+                <a:spcPts val="600"/>
+              </a:spcBef>
+              <a:spcAft>
+                <a:spcPct val="0"/>
+              </a:spcAft>
+              <a:buClr>
+                <a:srgbClr val="4E84C4"/>
+              </a:buClr>
+              <a:buSzTx/>
+              <a:buFont typeface="Myriad Pro" pitchFamily="32" charset="0"/>
+              <a:buChar char="–"/>
+              <a:tabLst/>
+              <a:defRPr/>
+            </a:pPr>
+            <a:r>
+              <a:rPr kumimoji="0" lang="en-US" sz="1400" b="0" i="0" u="none" strike="noStrike" kern="1200" cap="none" spc="0" normalizeH="0" baseline="0" noProof="0" dirty="0">
+                <a:ln>
+                  <a:noFill/>
+                </a:ln>
+                <a:solidFill>
+                  <a:srgbClr val="000000"/>
+                </a:solidFill>
+                <a:effectLst/>
+                <a:uLnTx/>
+                <a:uFillTx/>
+                <a:latin typeface="Arial" pitchFamily="34" charset="0"/>
+                <a:ea typeface="+mn-ea"/>
+                <a:cs typeface="Arial" pitchFamily="34" charset="0"/>
+              </a:rPr>
+              <a:t>Conclusions</a:t>
+            </a:r>
+          </a:p>
+          <a:p>
+            <a:pPr marL="308979" marR="0" lvl="0" indent="-308979" algn="l" defTabSz="914400" rtl="0" eaLnBrk="1" fontAlgn="base" latinLnBrk="0" hangingPunct="1">
+              <a:lnSpc>
+                <a:spcPct val="100000"/>
+              </a:lnSpc>
+              <a:spcBef>
+                <a:spcPts val="600"/>
+              </a:spcBef>
+              <a:spcAft>
+                <a:spcPct val="0"/>
+              </a:spcAft>
+              <a:buClr>
+                <a:srgbClr val="4E84C4"/>
+              </a:buClr>
+              <a:buSzTx/>
+              <a:buFont typeface="Wingdings" charset="2"/>
+              <a:buChar char="§"/>
+              <a:tabLst/>
+              <a:defRPr/>
+            </a:pPr>
+            <a:r>
+              <a:rPr kumimoji="0" lang="en-US" sz="1400" b="0" i="0" u="none" strike="noStrike" kern="1200" cap="none" spc="0" normalizeH="0" baseline="0" noProof="0" dirty="0">
+                <a:ln>
+                  <a:noFill/>
+                </a:ln>
+                <a:solidFill>
+                  <a:srgbClr val="000000"/>
+                </a:solidFill>
+                <a:effectLst/>
+                <a:uLnTx/>
+                <a:uFillTx/>
+                <a:latin typeface="Arial" pitchFamily="34" charset="0"/>
+                <a:ea typeface="+mn-ea"/>
+                <a:cs typeface="Arial" pitchFamily="34" charset="0"/>
+              </a:rPr>
+              <a:t>Temperature vs Crime</a:t>
+            </a:r>
+          </a:p>
+          <a:p>
+            <a:pPr marL="910007" marR="0" lvl="1" indent="-300514" algn="l" defTabSz="914400" rtl="0" eaLnBrk="1" fontAlgn="base" latinLnBrk="0" hangingPunct="1">
+              <a:lnSpc>
+                <a:spcPct val="100000"/>
+              </a:lnSpc>
+              <a:spcBef>
+                <a:spcPts val="600"/>
+              </a:spcBef>
+              <a:spcAft>
+                <a:spcPct val="0"/>
+              </a:spcAft>
+              <a:buClr>
+                <a:srgbClr val="4E84C4"/>
+              </a:buClr>
+              <a:buSzTx/>
+              <a:buFont typeface="Myriad Pro" pitchFamily="32" charset="0"/>
+              <a:buChar char="–"/>
+              <a:tabLst/>
+              <a:defRPr/>
+            </a:pPr>
+            <a:r>
+              <a:rPr kumimoji="0" lang="en-US" sz="1400" b="0" i="0" u="none" strike="noStrike" kern="1200" cap="none" spc="0" normalizeH="0" baseline="0" noProof="0" dirty="0">
+                <a:ln>
+                  <a:noFill/>
+                </a:ln>
+                <a:solidFill>
+                  <a:srgbClr val="000000"/>
+                </a:solidFill>
+                <a:effectLst/>
+                <a:uLnTx/>
+                <a:uFillTx/>
+                <a:latin typeface="Arial" pitchFamily="34" charset="0"/>
+                <a:ea typeface="+mn-ea"/>
+                <a:cs typeface="Arial" pitchFamily="34" charset="0"/>
+              </a:rPr>
+              <a:t>Findings</a:t>
+            </a:r>
+          </a:p>
+          <a:p>
+            <a:pPr marL="910007" marR="0" lvl="1" indent="-300514" algn="l" defTabSz="914400" rtl="0" eaLnBrk="1" fontAlgn="base" latinLnBrk="0" hangingPunct="1">
+              <a:lnSpc>
+                <a:spcPct val="100000"/>
+              </a:lnSpc>
+              <a:spcBef>
+                <a:spcPts val="600"/>
+              </a:spcBef>
+              <a:spcAft>
+                <a:spcPct val="0"/>
+              </a:spcAft>
+              <a:buClr>
+                <a:srgbClr val="4E84C4"/>
+              </a:buClr>
+              <a:buSzTx/>
+              <a:buFont typeface="Myriad Pro" pitchFamily="32" charset="0"/>
+              <a:buChar char="–"/>
+              <a:tabLst/>
+              <a:defRPr/>
+            </a:pPr>
+            <a:r>
+              <a:rPr kumimoji="0" lang="en-US" sz="1400" b="0" i="0" u="none" strike="noStrike" kern="1200" cap="none" spc="0" normalizeH="0" baseline="0" noProof="0" dirty="0">
+                <a:ln>
+                  <a:noFill/>
+                </a:ln>
+                <a:solidFill>
+                  <a:srgbClr val="000000"/>
+                </a:solidFill>
+                <a:effectLst/>
+                <a:uLnTx/>
+                <a:uFillTx/>
+                <a:latin typeface="Arial" pitchFamily="34" charset="0"/>
+                <a:ea typeface="+mn-ea"/>
+                <a:cs typeface="Arial" pitchFamily="34" charset="0"/>
+              </a:rPr>
+              <a:t>Conclusions</a:t>
+            </a:r>
+          </a:p>
+          <a:p>
+            <a:pPr marL="308979" marR="0" lvl="0" indent="-308979" algn="l" defTabSz="914400" rtl="0" eaLnBrk="1" fontAlgn="base" latinLnBrk="0" hangingPunct="1">
+              <a:lnSpc>
+                <a:spcPct val="100000"/>
+              </a:lnSpc>
+              <a:spcBef>
+                <a:spcPts val="600"/>
+              </a:spcBef>
+              <a:spcAft>
+                <a:spcPct val="0"/>
+              </a:spcAft>
+              <a:buClr>
+                <a:srgbClr val="4E84C4"/>
+              </a:buClr>
+              <a:buSzTx/>
+              <a:buFont typeface="Wingdings" charset="2"/>
+              <a:buChar char="§"/>
+              <a:tabLst/>
+              <a:defRPr/>
+            </a:pPr>
+            <a:r>
+              <a:rPr kumimoji="0" lang="en-US" sz="1400" b="0" i="0" u="none" strike="noStrike" kern="1200" cap="none" spc="0" normalizeH="0" baseline="0" noProof="0" dirty="0">
+                <a:ln>
+                  <a:noFill/>
+                </a:ln>
+                <a:solidFill>
+                  <a:srgbClr val="000000"/>
+                </a:solidFill>
+                <a:effectLst/>
+                <a:uLnTx/>
+                <a:uFillTx/>
+                <a:latin typeface="Arial" pitchFamily="34" charset="0"/>
+                <a:ea typeface="+mn-ea"/>
+                <a:cs typeface="Arial" pitchFamily="34" charset="0"/>
+              </a:rPr>
+              <a:t>Moon Phase vs Crime</a:t>
+            </a:r>
+          </a:p>
+          <a:p>
+            <a:pPr marL="910007" marR="0" lvl="1" indent="-300514" algn="l" defTabSz="914400" rtl="0" eaLnBrk="1" fontAlgn="base" latinLnBrk="0" hangingPunct="1">
+              <a:lnSpc>
+                <a:spcPct val="100000"/>
+              </a:lnSpc>
+              <a:spcBef>
+                <a:spcPts val="600"/>
+              </a:spcBef>
+              <a:spcAft>
+                <a:spcPct val="0"/>
+              </a:spcAft>
+              <a:buClr>
+                <a:srgbClr val="4E84C4"/>
+              </a:buClr>
+              <a:buSzTx/>
+              <a:buFont typeface="Myriad Pro" pitchFamily="32" charset="0"/>
+              <a:buChar char="–"/>
+              <a:tabLst/>
+              <a:defRPr/>
+            </a:pPr>
+            <a:r>
+              <a:rPr kumimoji="0" lang="en-US" sz="1400" b="0" i="0" u="none" strike="noStrike" kern="1200" cap="none" spc="0" normalizeH="0" baseline="0" noProof="0" dirty="0">
+                <a:ln>
+                  <a:noFill/>
+                </a:ln>
+                <a:solidFill>
+                  <a:srgbClr val="000000"/>
+                </a:solidFill>
+                <a:effectLst/>
+                <a:uLnTx/>
+                <a:uFillTx/>
+                <a:latin typeface="Arial" pitchFamily="34" charset="0"/>
+                <a:ea typeface="+mn-ea"/>
+                <a:cs typeface="Arial" pitchFamily="34" charset="0"/>
+              </a:rPr>
+              <a:t>Findings</a:t>
+            </a:r>
+          </a:p>
+          <a:p>
+            <a:pPr marL="910007" marR="0" lvl="1" indent="-300514" algn="l" defTabSz="914400" rtl="0" eaLnBrk="1" fontAlgn="base" latinLnBrk="0" hangingPunct="1">
+              <a:lnSpc>
+                <a:spcPct val="100000"/>
+              </a:lnSpc>
+              <a:spcBef>
+                <a:spcPts val="600"/>
+              </a:spcBef>
+              <a:spcAft>
+                <a:spcPct val="0"/>
+              </a:spcAft>
+              <a:buClr>
+                <a:srgbClr val="4E84C4"/>
+              </a:buClr>
+              <a:buSzTx/>
+              <a:buFont typeface="Myriad Pro" pitchFamily="32" charset="0"/>
+              <a:buChar char="–"/>
+              <a:tabLst/>
+              <a:defRPr/>
+            </a:pPr>
+            <a:r>
+              <a:rPr kumimoji="0" lang="en-US" sz="1400" b="0" i="0" u="none" strike="noStrike" kern="1200" cap="none" spc="0" normalizeH="0" baseline="0" noProof="0" dirty="0">
+                <a:ln>
+                  <a:noFill/>
+                </a:ln>
+                <a:solidFill>
+                  <a:srgbClr val="000000"/>
+                </a:solidFill>
+                <a:effectLst/>
+                <a:uLnTx/>
+                <a:uFillTx/>
+                <a:latin typeface="Arial" pitchFamily="34" charset="0"/>
+                <a:ea typeface="+mn-ea"/>
+                <a:cs typeface="Arial" pitchFamily="34" charset="0"/>
+              </a:rPr>
+              <a:t>Conclusions</a:t>
+            </a:r>
+          </a:p>
+          <a:p>
+            <a:pPr marL="0" marR="0" lvl="0" indent="0" algn="l" defTabSz="914400" rtl="0" eaLnBrk="1" fontAlgn="base" latinLnBrk="0" hangingPunct="1">
+              <a:lnSpc>
+                <a:spcPct val="100000"/>
+              </a:lnSpc>
+              <a:spcBef>
+                <a:spcPts val="1600"/>
+              </a:spcBef>
+              <a:spcAft>
+                <a:spcPct val="0"/>
+              </a:spcAft>
+              <a:buClr>
+                <a:srgbClr val="4E84C4"/>
+              </a:buClr>
+              <a:buSzTx/>
+              <a:buFont typeface="Wingdings" charset="2"/>
+              <a:buNone/>
+              <a:tabLst/>
+              <a:defRPr/>
+            </a:pPr>
+            <a:endParaRPr kumimoji="0" lang="en-US" sz="1600" b="0" i="0" u="none" strike="noStrike" kern="1200" cap="none" spc="0" normalizeH="0" baseline="0" noProof="0" dirty="0">
+              <a:ln>
+                <a:noFill/>
+              </a:ln>
+              <a:solidFill>
+                <a:srgbClr val="000000"/>
+              </a:solidFill>
+              <a:effectLst/>
+              <a:uLnTx/>
+              <a:uFillTx/>
+              <a:latin typeface="Arial" pitchFamily="34" charset="0"/>
+              <a:ea typeface="+mn-ea"/>
+              <a:cs typeface="Arial" pitchFamily="34" charset="0"/>
+            </a:endParaRPr>
+          </a:p>
+        </p:txBody>
+      </p:sp>
+    </p:spTree>
+    <p:extLst>
+      <p:ext uri="{BB962C8B-B14F-4D97-AF65-F5344CB8AC3E}">
+        <p14:creationId xmlns:p14="http://schemas.microsoft.com/office/powerpoint/2010/main" val="2978358348"/>
+      </p:ext>
+    </p:extLst>
+  </p:cSld>
+  <p:clrMapOvr>
+    <a:masterClrMapping/>
+  </p:clrMapOvr>
+</p:sld>
+</file>
+
+<file path=ppt/slides/slide20.xml><?xml version="1.0" encoding="utf-8"?>
+<p:sld xmlns:a="http://schemas.openxmlformats.org/drawingml/2006/main" xmlns:r="http://schemas.openxmlformats.org/officeDocument/2006/relationships" xmlns:p="http://schemas.openxmlformats.org/presentationml/2006/main">
+  <p:cSld>
+    <p:spTree>
+      <p:nvGrpSpPr>
+        <p:cNvPr id="1" name=""/>
+        <p:cNvGrpSpPr/>
+        <p:nvPr/>
+      </p:nvGrpSpPr>
+      <p:grpSpPr>
+        <a:xfrm>
+          <a:off x="0" y="0"/>
+          <a:ext cx="0" cy="0"/>
+          <a:chOff x="0" y="0"/>
+          <a:chExt cx="0" cy="0"/>
+        </a:xfrm>
+      </p:grpSpPr>
+      <p:sp>
+        <p:nvSpPr>
+          <p:cNvPr id="5" name="Title 1">
+            <a:extLst>
+              <a:ext uri="{FF2B5EF4-FFF2-40B4-BE49-F238E27FC236}">
+                <a16:creationId xmlns:a16="http://schemas.microsoft.com/office/drawing/2014/main" id="{02FB3FF4-C4B1-4F6B-BD55-EC26D607F64C}"/>
+              </a:ext>
+            </a:extLst>
+          </p:cNvPr>
+          <p:cNvSpPr txBox="1">
+            <a:spLocks/>
+          </p:cNvSpPr>
+          <p:nvPr/>
+        </p:nvSpPr>
+        <p:spPr bwMode="auto">
+          <a:xfrm>
+            <a:off x="1727200" y="274320"/>
+            <a:ext cx="10058400" cy="487363"/>
+          </a:xfrm>
+          <a:prstGeom prst="rect">
+            <a:avLst/>
+          </a:prstGeom>
+          <a:noFill/>
+          <a:ln>
+            <a:noFill/>
+          </a:ln>
+          <a:extLst>
+            <a:ext uri="{909E8E84-426E-40DD-AFC4-6F175D3DCCD1}">
+              <a14:hiddenFill xmlns:a14="http://schemas.microsoft.com/office/drawing/2010/main">
+                <a:solidFill>
+                  <a:srgbClr val="FFFFFF"/>
+                </a:solidFill>
+              </a14:hiddenFill>
+            </a:ext>
+            <a:ext uri="{91240B29-F687-4F45-9708-019B960494DF}">
+              <a14:hiddenLine xmlns:a14="http://schemas.microsoft.com/office/drawing/2010/main" w="9525">
+                <a:solidFill>
+                  <a:srgbClr val="000000"/>
+                </a:solidFill>
+                <a:miter lim="800000"/>
+                <a:headEnd/>
+                <a:tailEnd/>
+              </a14:hiddenLine>
+            </a:ext>
+          </a:extLst>
+        </p:spPr>
+        <p:txBody>
+          <a:bodyPr vert="horz" wrap="square" lIns="121899" tIns="60949" rIns="121899" bIns="60949" numCol="1" anchor="ctr" anchorCtr="0" compatLnSpc="1">
+            <a:prstTxWarp prst="textNoShape">
+              <a:avLst/>
+            </a:prstTxWarp>
+            <a:noAutofit/>
+          </a:bodyPr>
+          <a:lstStyle>
+            <a:lvl1pPr algn="l" rtl="0" eaLnBrk="1" fontAlgn="base" hangingPunct="1">
+              <a:spcBef>
+                <a:spcPct val="0"/>
+              </a:spcBef>
+              <a:spcAft>
+                <a:spcPct val="0"/>
+              </a:spcAft>
+              <a:defRPr sz="2200" kern="1200">
+                <a:solidFill>
+                  <a:schemeClr val="bg1"/>
+                </a:solidFill>
+                <a:latin typeface="Arial" pitchFamily="34" charset="0"/>
+                <a:ea typeface="+mj-ea"/>
+                <a:cs typeface="Arial" pitchFamily="34" charset="0"/>
+              </a:defRPr>
+            </a:lvl1pPr>
+            <a:lvl2pPr algn="l" rtl="0" eaLnBrk="1" fontAlgn="base" hangingPunct="1">
+              <a:spcBef>
+                <a:spcPct val="0"/>
+              </a:spcBef>
+              <a:spcAft>
+                <a:spcPct val="0"/>
+              </a:spcAft>
+              <a:defRPr sz="2900">
+                <a:solidFill>
+                  <a:schemeClr val="bg1"/>
+                </a:solidFill>
+                <a:latin typeface="Arial" pitchFamily="34" charset="0"/>
+                <a:cs typeface="Arial" pitchFamily="34" charset="0"/>
+              </a:defRPr>
+            </a:lvl2pPr>
+            <a:lvl3pPr algn="l" rtl="0" eaLnBrk="1" fontAlgn="base" hangingPunct="1">
+              <a:spcBef>
+                <a:spcPct val="0"/>
+              </a:spcBef>
+              <a:spcAft>
+                <a:spcPct val="0"/>
+              </a:spcAft>
+              <a:defRPr sz="2900">
+                <a:solidFill>
+                  <a:schemeClr val="bg1"/>
+                </a:solidFill>
+                <a:latin typeface="Arial" pitchFamily="34" charset="0"/>
+                <a:cs typeface="Arial" pitchFamily="34" charset="0"/>
+              </a:defRPr>
+            </a:lvl3pPr>
+            <a:lvl4pPr algn="l" rtl="0" eaLnBrk="1" fontAlgn="base" hangingPunct="1">
+              <a:spcBef>
+                <a:spcPct val="0"/>
+              </a:spcBef>
+              <a:spcAft>
+                <a:spcPct val="0"/>
+              </a:spcAft>
+              <a:defRPr sz="2900">
+                <a:solidFill>
+                  <a:schemeClr val="bg1"/>
+                </a:solidFill>
+                <a:latin typeface="Arial" pitchFamily="34" charset="0"/>
+                <a:cs typeface="Arial" pitchFamily="34" charset="0"/>
+              </a:defRPr>
+            </a:lvl4pPr>
+            <a:lvl5pPr algn="l" rtl="0" eaLnBrk="1" fontAlgn="base" hangingPunct="1">
+              <a:spcBef>
+                <a:spcPct val="0"/>
+              </a:spcBef>
+              <a:spcAft>
+                <a:spcPct val="0"/>
+              </a:spcAft>
+              <a:defRPr sz="2900">
+                <a:solidFill>
+                  <a:schemeClr val="bg1"/>
+                </a:solidFill>
+                <a:latin typeface="Arial" pitchFamily="34" charset="0"/>
+                <a:cs typeface="Arial" pitchFamily="34" charset="0"/>
+              </a:defRPr>
+            </a:lvl5pPr>
+            <a:lvl6pPr marL="609493" algn="l" rtl="0" eaLnBrk="1" fontAlgn="base" hangingPunct="1">
+              <a:spcBef>
+                <a:spcPct val="0"/>
+              </a:spcBef>
+              <a:spcAft>
+                <a:spcPct val="0"/>
+              </a:spcAft>
+              <a:defRPr sz="3700">
+                <a:solidFill>
+                  <a:schemeClr val="bg1"/>
+                </a:solidFill>
+                <a:latin typeface="Arial" pitchFamily="34" charset="0"/>
+                <a:cs typeface="Arial" pitchFamily="34" charset="0"/>
+              </a:defRPr>
+            </a:lvl6pPr>
+            <a:lvl7pPr marL="1218987" algn="l" rtl="0" eaLnBrk="1" fontAlgn="base" hangingPunct="1">
+              <a:spcBef>
+                <a:spcPct val="0"/>
+              </a:spcBef>
+              <a:spcAft>
+                <a:spcPct val="0"/>
+              </a:spcAft>
+              <a:defRPr sz="3700">
+                <a:solidFill>
+                  <a:schemeClr val="bg1"/>
+                </a:solidFill>
+                <a:latin typeface="Arial" pitchFamily="34" charset="0"/>
+                <a:cs typeface="Arial" pitchFamily="34" charset="0"/>
+              </a:defRPr>
+            </a:lvl7pPr>
+            <a:lvl8pPr marL="1828480" algn="l" rtl="0" eaLnBrk="1" fontAlgn="base" hangingPunct="1">
+              <a:spcBef>
+                <a:spcPct val="0"/>
+              </a:spcBef>
+              <a:spcAft>
+                <a:spcPct val="0"/>
+              </a:spcAft>
+              <a:defRPr sz="3700">
+                <a:solidFill>
+                  <a:schemeClr val="bg1"/>
+                </a:solidFill>
+                <a:latin typeface="Arial" pitchFamily="34" charset="0"/>
+                <a:cs typeface="Arial" pitchFamily="34" charset="0"/>
+              </a:defRPr>
+            </a:lvl8pPr>
+            <a:lvl9pPr marL="2437973" algn="l" rtl="0" eaLnBrk="1" fontAlgn="base" hangingPunct="1">
+              <a:spcBef>
+                <a:spcPct val="0"/>
+              </a:spcBef>
+              <a:spcAft>
+                <a:spcPct val="0"/>
+              </a:spcAft>
+              <a:defRPr sz="3700">
+                <a:solidFill>
+                  <a:schemeClr val="bg1"/>
+                </a:solidFill>
+                <a:latin typeface="Arial" pitchFamily="34" charset="0"/>
+                <a:cs typeface="Arial" pitchFamily="34" charset="0"/>
+              </a:defRPr>
+            </a:lvl9pPr>
+          </a:lstStyle>
+          <a:p>
+            <a:pPr marL="0" marR="0" lvl="0" indent="0" algn="l" defTabSz="914400" rtl="0" eaLnBrk="1" fontAlgn="base" latinLnBrk="0" hangingPunct="1">
+              <a:lnSpc>
+                <a:spcPct val="100000"/>
+              </a:lnSpc>
+              <a:spcBef>
+                <a:spcPct val="0"/>
+              </a:spcBef>
+              <a:spcAft>
+                <a:spcPct val="0"/>
+              </a:spcAft>
+              <a:buClrTx/>
+              <a:buSzTx/>
+              <a:buFontTx/>
+              <a:buNone/>
+              <a:tabLst/>
+              <a:defRPr/>
+            </a:pPr>
+            <a:r>
+              <a:rPr kumimoji="0" lang="en-US" sz="2400" b="1" i="0" u="none" strike="noStrike" kern="1200" cap="none" spc="0" normalizeH="0" baseline="0" noProof="0">
+                <a:ln>
+                  <a:noFill/>
+                </a:ln>
+                <a:solidFill>
+                  <a:sysClr val="window" lastClr="FFFFFF"/>
+                </a:solidFill>
+                <a:effectLst/>
+                <a:uLnTx/>
+                <a:uFillTx/>
+                <a:latin typeface="Arial" pitchFamily="34" charset="0"/>
+                <a:ea typeface="+mj-ea"/>
+                <a:cs typeface="Arial" pitchFamily="34" charset="0"/>
+              </a:rPr>
+              <a:t>Whether Weather Drives Crime</a:t>
+            </a:r>
+            <a:br>
+              <a:rPr kumimoji="0" lang="en-US" sz="2400" b="0" i="0" u="none" strike="noStrike" kern="1200" cap="none" spc="0" normalizeH="0" baseline="0" noProof="0">
+                <a:ln>
+                  <a:noFill/>
+                </a:ln>
+                <a:solidFill>
+                  <a:sysClr val="window" lastClr="FFFFFF"/>
+                </a:solidFill>
+                <a:effectLst/>
+                <a:uLnTx/>
+                <a:uFillTx/>
+                <a:latin typeface="Arial" pitchFamily="34" charset="0"/>
+                <a:ea typeface="+mj-ea"/>
+                <a:cs typeface="Arial" pitchFamily="34" charset="0"/>
+              </a:rPr>
+            </a:br>
+            <a:r>
+              <a:rPr kumimoji="0" lang="en-GB" sz="2200" b="0" i="0" u="none" strike="noStrike" kern="1200" cap="none" spc="0" normalizeH="0" baseline="0" noProof="0">
+                <a:ln>
+                  <a:noFill/>
+                </a:ln>
+                <a:solidFill>
+                  <a:srgbClr val="FFDD3E"/>
+                </a:solidFill>
+                <a:effectLst/>
+                <a:uLnTx/>
+                <a:uFillTx/>
+                <a:latin typeface="Arial" pitchFamily="34" charset="0"/>
+                <a:ea typeface="+mj-ea"/>
+                <a:cs typeface="Arial" pitchFamily="34" charset="0"/>
+              </a:rPr>
+              <a:t>Agenda</a:t>
+            </a:r>
+            <a:endParaRPr kumimoji="0" lang="en-GB" sz="2200" b="0" i="0" u="none" strike="noStrike" kern="1200" cap="none" spc="0" normalizeH="0" baseline="0" noProof="0" dirty="0">
+              <a:ln>
+                <a:noFill/>
+              </a:ln>
+              <a:solidFill>
+                <a:srgbClr val="FFDD3E"/>
+              </a:solidFill>
+              <a:effectLst/>
+              <a:uLnTx/>
+              <a:uFillTx/>
+              <a:latin typeface="Arial" pitchFamily="34" charset="0"/>
+              <a:ea typeface="+mj-ea"/>
+              <a:cs typeface="Arial" pitchFamily="34" charset="0"/>
+            </a:endParaRPr>
+          </a:p>
+        </p:txBody>
+      </p:sp>
+      <p:sp>
+        <p:nvSpPr>
+          <p:cNvPr id="6" name="Rectangle 5">
+            <a:extLst>
+              <a:ext uri="{FF2B5EF4-FFF2-40B4-BE49-F238E27FC236}">
+                <a16:creationId xmlns:a16="http://schemas.microsoft.com/office/drawing/2014/main" id="{8E48BA95-CB03-4C0F-BD3B-653DBB7534FE}"/>
+              </a:ext>
+            </a:extLst>
+          </p:cNvPr>
+          <p:cNvSpPr/>
+          <p:nvPr/>
+        </p:nvSpPr>
+        <p:spPr>
+          <a:xfrm>
+            <a:off x="0" y="1038688"/>
+            <a:ext cx="12192000" cy="5228948"/>
+          </a:xfrm>
+          <a:prstGeom prst="rect">
+            <a:avLst/>
+          </a:prstGeom>
+          <a:gradFill flip="none" rotWithShape="1">
+            <a:gsLst>
+              <a:gs pos="0">
+                <a:schemeClr val="tx1">
+                  <a:shade val="30000"/>
+                  <a:satMod val="115000"/>
+                </a:schemeClr>
+              </a:gs>
+              <a:gs pos="50000">
+                <a:schemeClr val="tx1">
+                  <a:shade val="67500"/>
+                  <a:satMod val="115000"/>
+                </a:schemeClr>
+              </a:gs>
+              <a:gs pos="100000">
+                <a:schemeClr val="tx1">
+                  <a:shade val="100000"/>
+                  <a:satMod val="115000"/>
+                </a:schemeClr>
+              </a:gs>
+            </a:gsLst>
+            <a:lin ang="13500000" scaled="1"/>
+            <a:tileRect/>
+          </a:gradFill>
+          <a:ln>
+            <a:noFill/>
+          </a:ln>
+        </p:spPr>
+        <p:style>
+          <a:lnRef idx="2">
+            <a:schemeClr val="accent1">
+              <a:shade val="50000"/>
+            </a:schemeClr>
+          </a:lnRef>
+          <a:fillRef idx="1">
+            <a:schemeClr val="accent1"/>
+          </a:fillRef>
+          <a:effectRef idx="0">
+            <a:schemeClr val="accent1"/>
+          </a:effectRef>
+          <a:fontRef idx="minor">
+            <a:schemeClr val="lt1"/>
+          </a:fontRef>
+        </p:style>
+        <p:txBody>
+          <a:bodyPr rtlCol="0" anchor="ctr"/>
+          <a:lstStyle/>
+          <a:p>
             <a:pPr marL="0" marR="0" lvl="0" indent="0" algn="ctr" defTabSz="457200" rtl="0" eaLnBrk="1" fontAlgn="auto" latinLnBrk="0" hangingPunct="1">
               <a:lnSpc>
                 <a:spcPct val="100000"/>
@@ -13919,7 +15763,7 @@
 </p:sld>
 </file>
 
-<file path=ppt/slides/slide19.xml><?xml version="1.0" encoding="utf-8"?>
+<file path=ppt/slides/slide21.xml><?xml version="1.0" encoding="utf-8"?>
 <p:sld xmlns:a="http://schemas.openxmlformats.org/drawingml/2006/main" xmlns:r="http://schemas.openxmlformats.org/officeDocument/2006/relationships" xmlns:p="http://schemas.openxmlformats.org/presentationml/2006/main">
   <p:cSld>
     <p:spTree>
@@ -14603,7 +16447,7 @@
             <a:fld id="{D57F1E4F-1CFF-5643-939E-217C01CDF565}" type="slidenum">
               <a:rPr lang="en-US" smtClean="0"/>
               <a:pPr/>
-              <a:t>19</a:t>
+              <a:t>21</a:t>
             </a:fld>
             <a:endParaRPr lang="en-US" dirty="0"/>
           </a:p>
@@ -14622,1423 +16466,7 @@
 </p:sld>
 </file>
 
-<file path=ppt/slides/slide2.xml><?xml version="1.0" encoding="utf-8"?>
-<p:sld xmlns:a="http://schemas.openxmlformats.org/drawingml/2006/main" xmlns:r="http://schemas.openxmlformats.org/officeDocument/2006/relationships" xmlns:p="http://schemas.openxmlformats.org/presentationml/2006/main">
-  <p:cSld>
-    <p:spTree>
-      <p:nvGrpSpPr>
-        <p:cNvPr id="1" name=""/>
-        <p:cNvGrpSpPr/>
-        <p:nvPr/>
-      </p:nvGrpSpPr>
-      <p:grpSpPr>
-        <a:xfrm>
-          <a:off x="0" y="0"/>
-          <a:ext cx="0" cy="0"/>
-          <a:chOff x="0" y="0"/>
-          <a:chExt cx="0" cy="0"/>
-        </a:xfrm>
-      </p:grpSpPr>
-      <p:sp>
-        <p:nvSpPr>
-          <p:cNvPr id="5" name="Title 1">
-            <a:extLst>
-              <a:ext uri="{FF2B5EF4-FFF2-40B4-BE49-F238E27FC236}">
-                <a16:creationId xmlns:a16="http://schemas.microsoft.com/office/drawing/2014/main" id="{02FB3FF4-C4B1-4F6B-BD55-EC26D607F64C}"/>
-              </a:ext>
-            </a:extLst>
-          </p:cNvPr>
-          <p:cNvSpPr txBox="1">
-            <a:spLocks/>
-          </p:cNvSpPr>
-          <p:nvPr/>
-        </p:nvSpPr>
-        <p:spPr bwMode="auto">
-          <a:xfrm>
-            <a:off x="1727200" y="274320"/>
-            <a:ext cx="10058400" cy="487363"/>
-          </a:xfrm>
-          <a:prstGeom prst="rect">
-            <a:avLst/>
-          </a:prstGeom>
-          <a:noFill/>
-          <a:ln>
-            <a:noFill/>
-          </a:ln>
-          <a:extLst>
-            <a:ext uri="{909E8E84-426E-40DD-AFC4-6F175D3DCCD1}">
-              <a14:hiddenFill xmlns:a14="http://schemas.microsoft.com/office/drawing/2010/main">
-                <a:solidFill>
-                  <a:srgbClr val="FFFFFF"/>
-                </a:solidFill>
-              </a14:hiddenFill>
-            </a:ext>
-            <a:ext uri="{91240B29-F687-4F45-9708-019B960494DF}">
-              <a14:hiddenLine xmlns:a14="http://schemas.microsoft.com/office/drawing/2010/main" w="9525">
-                <a:solidFill>
-                  <a:srgbClr val="000000"/>
-                </a:solidFill>
-                <a:miter lim="800000"/>
-                <a:headEnd/>
-                <a:tailEnd/>
-              </a14:hiddenLine>
-            </a:ext>
-          </a:extLst>
-        </p:spPr>
-        <p:txBody>
-          <a:bodyPr vert="horz" wrap="square" lIns="121899" tIns="60949" rIns="121899" bIns="60949" numCol="1" anchor="ctr" anchorCtr="0" compatLnSpc="1">
-            <a:prstTxWarp prst="textNoShape">
-              <a:avLst/>
-            </a:prstTxWarp>
-            <a:noAutofit/>
-          </a:bodyPr>
-          <a:lstStyle>
-            <a:lvl1pPr algn="l" rtl="0" eaLnBrk="1" fontAlgn="base" hangingPunct="1">
-              <a:spcBef>
-                <a:spcPct val="0"/>
-              </a:spcBef>
-              <a:spcAft>
-                <a:spcPct val="0"/>
-              </a:spcAft>
-              <a:defRPr sz="2200" kern="1200">
-                <a:solidFill>
-                  <a:schemeClr val="bg1"/>
-                </a:solidFill>
-                <a:latin typeface="Arial" pitchFamily="34" charset="0"/>
-                <a:ea typeface="+mj-ea"/>
-                <a:cs typeface="Arial" pitchFamily="34" charset="0"/>
-              </a:defRPr>
-            </a:lvl1pPr>
-            <a:lvl2pPr algn="l" rtl="0" eaLnBrk="1" fontAlgn="base" hangingPunct="1">
-              <a:spcBef>
-                <a:spcPct val="0"/>
-              </a:spcBef>
-              <a:spcAft>
-                <a:spcPct val="0"/>
-              </a:spcAft>
-              <a:defRPr sz="2900">
-                <a:solidFill>
-                  <a:schemeClr val="bg1"/>
-                </a:solidFill>
-                <a:latin typeface="Arial" pitchFamily="34" charset="0"/>
-                <a:cs typeface="Arial" pitchFamily="34" charset="0"/>
-              </a:defRPr>
-            </a:lvl2pPr>
-            <a:lvl3pPr algn="l" rtl="0" eaLnBrk="1" fontAlgn="base" hangingPunct="1">
-              <a:spcBef>
-                <a:spcPct val="0"/>
-              </a:spcBef>
-              <a:spcAft>
-                <a:spcPct val="0"/>
-              </a:spcAft>
-              <a:defRPr sz="2900">
-                <a:solidFill>
-                  <a:schemeClr val="bg1"/>
-                </a:solidFill>
-                <a:latin typeface="Arial" pitchFamily="34" charset="0"/>
-                <a:cs typeface="Arial" pitchFamily="34" charset="0"/>
-              </a:defRPr>
-            </a:lvl3pPr>
-            <a:lvl4pPr algn="l" rtl="0" eaLnBrk="1" fontAlgn="base" hangingPunct="1">
-              <a:spcBef>
-                <a:spcPct val="0"/>
-              </a:spcBef>
-              <a:spcAft>
-                <a:spcPct val="0"/>
-              </a:spcAft>
-              <a:defRPr sz="2900">
-                <a:solidFill>
-                  <a:schemeClr val="bg1"/>
-                </a:solidFill>
-                <a:latin typeface="Arial" pitchFamily="34" charset="0"/>
-                <a:cs typeface="Arial" pitchFamily="34" charset="0"/>
-              </a:defRPr>
-            </a:lvl4pPr>
-            <a:lvl5pPr algn="l" rtl="0" eaLnBrk="1" fontAlgn="base" hangingPunct="1">
-              <a:spcBef>
-                <a:spcPct val="0"/>
-              </a:spcBef>
-              <a:spcAft>
-                <a:spcPct val="0"/>
-              </a:spcAft>
-              <a:defRPr sz="2900">
-                <a:solidFill>
-                  <a:schemeClr val="bg1"/>
-                </a:solidFill>
-                <a:latin typeface="Arial" pitchFamily="34" charset="0"/>
-                <a:cs typeface="Arial" pitchFamily="34" charset="0"/>
-              </a:defRPr>
-            </a:lvl5pPr>
-            <a:lvl6pPr marL="609493" algn="l" rtl="0" eaLnBrk="1" fontAlgn="base" hangingPunct="1">
-              <a:spcBef>
-                <a:spcPct val="0"/>
-              </a:spcBef>
-              <a:spcAft>
-                <a:spcPct val="0"/>
-              </a:spcAft>
-              <a:defRPr sz="3700">
-                <a:solidFill>
-                  <a:schemeClr val="bg1"/>
-                </a:solidFill>
-                <a:latin typeface="Arial" pitchFamily="34" charset="0"/>
-                <a:cs typeface="Arial" pitchFamily="34" charset="0"/>
-              </a:defRPr>
-            </a:lvl6pPr>
-            <a:lvl7pPr marL="1218987" algn="l" rtl="0" eaLnBrk="1" fontAlgn="base" hangingPunct="1">
-              <a:spcBef>
-                <a:spcPct val="0"/>
-              </a:spcBef>
-              <a:spcAft>
-                <a:spcPct val="0"/>
-              </a:spcAft>
-              <a:defRPr sz="3700">
-                <a:solidFill>
-                  <a:schemeClr val="bg1"/>
-                </a:solidFill>
-                <a:latin typeface="Arial" pitchFamily="34" charset="0"/>
-                <a:cs typeface="Arial" pitchFamily="34" charset="0"/>
-              </a:defRPr>
-            </a:lvl7pPr>
-            <a:lvl8pPr marL="1828480" algn="l" rtl="0" eaLnBrk="1" fontAlgn="base" hangingPunct="1">
-              <a:spcBef>
-                <a:spcPct val="0"/>
-              </a:spcBef>
-              <a:spcAft>
-                <a:spcPct val="0"/>
-              </a:spcAft>
-              <a:defRPr sz="3700">
-                <a:solidFill>
-                  <a:schemeClr val="bg1"/>
-                </a:solidFill>
-                <a:latin typeface="Arial" pitchFamily="34" charset="0"/>
-                <a:cs typeface="Arial" pitchFamily="34" charset="0"/>
-              </a:defRPr>
-            </a:lvl8pPr>
-            <a:lvl9pPr marL="2437973" algn="l" rtl="0" eaLnBrk="1" fontAlgn="base" hangingPunct="1">
-              <a:spcBef>
-                <a:spcPct val="0"/>
-              </a:spcBef>
-              <a:spcAft>
-                <a:spcPct val="0"/>
-              </a:spcAft>
-              <a:defRPr sz="3700">
-                <a:solidFill>
-                  <a:schemeClr val="bg1"/>
-                </a:solidFill>
-                <a:latin typeface="Arial" pitchFamily="34" charset="0"/>
-                <a:cs typeface="Arial" pitchFamily="34" charset="0"/>
-              </a:defRPr>
-            </a:lvl9pPr>
-          </a:lstStyle>
-          <a:p>
-            <a:pPr marL="0" marR="0" lvl="0" indent="0" algn="l" defTabSz="914400" rtl="0" eaLnBrk="1" fontAlgn="base" latinLnBrk="0" hangingPunct="1">
-              <a:lnSpc>
-                <a:spcPct val="100000"/>
-              </a:lnSpc>
-              <a:spcBef>
-                <a:spcPct val="0"/>
-              </a:spcBef>
-              <a:spcAft>
-                <a:spcPct val="0"/>
-              </a:spcAft>
-              <a:buClrTx/>
-              <a:buSzTx/>
-              <a:buFontTx/>
-              <a:buNone/>
-              <a:tabLst/>
-              <a:defRPr/>
-            </a:pPr>
-            <a:r>
-              <a:rPr kumimoji="0" lang="en-US" sz="2400" b="1" i="0" u="none" strike="noStrike" kern="1200" cap="none" spc="0" normalizeH="0" baseline="0" noProof="0" dirty="0">
-                <a:ln>
-                  <a:noFill/>
-                </a:ln>
-                <a:solidFill>
-                  <a:sysClr val="window" lastClr="FFFFFF"/>
-                </a:solidFill>
-                <a:effectLst/>
-                <a:uLnTx/>
-                <a:uFillTx/>
-                <a:latin typeface="Arial" pitchFamily="34" charset="0"/>
-                <a:ea typeface="+mj-ea"/>
-                <a:cs typeface="Arial" pitchFamily="34" charset="0"/>
-              </a:rPr>
-              <a:t>Whether Weather Drives Crime</a:t>
-            </a:r>
-            <a:br>
-              <a:rPr kumimoji="0" lang="en-US" sz="2400" b="0" i="0" u="none" strike="noStrike" kern="1200" cap="none" spc="0" normalizeH="0" baseline="0" noProof="0" dirty="0">
-                <a:ln>
-                  <a:noFill/>
-                </a:ln>
-                <a:solidFill>
-                  <a:sysClr val="window" lastClr="FFFFFF"/>
-                </a:solidFill>
-                <a:effectLst/>
-                <a:uLnTx/>
-                <a:uFillTx/>
-                <a:latin typeface="Arial" pitchFamily="34" charset="0"/>
-                <a:ea typeface="+mj-ea"/>
-                <a:cs typeface="Arial" pitchFamily="34" charset="0"/>
-              </a:rPr>
-            </a:br>
-            <a:r>
-              <a:rPr kumimoji="0" lang="en-GB" sz="2200" b="0" i="0" u="none" strike="noStrike" kern="1200" cap="none" spc="0" normalizeH="0" baseline="0" noProof="0" dirty="0">
-                <a:ln>
-                  <a:noFill/>
-                </a:ln>
-                <a:solidFill>
-                  <a:srgbClr val="FFDD3E"/>
-                </a:solidFill>
-                <a:effectLst/>
-                <a:uLnTx/>
-                <a:uFillTx/>
-                <a:latin typeface="Arial" pitchFamily="34" charset="0"/>
-                <a:ea typeface="+mj-ea"/>
-                <a:cs typeface="Arial" pitchFamily="34" charset="0"/>
-              </a:rPr>
-              <a:t>Agenda</a:t>
-            </a:r>
-          </a:p>
-        </p:txBody>
-      </p:sp>
-      <p:sp>
-        <p:nvSpPr>
-          <p:cNvPr id="6" name="Rectangle 5">
-            <a:extLst>
-              <a:ext uri="{FF2B5EF4-FFF2-40B4-BE49-F238E27FC236}">
-                <a16:creationId xmlns:a16="http://schemas.microsoft.com/office/drawing/2014/main" id="{8E48BA95-CB03-4C0F-BD3B-653DBB7534FE}"/>
-              </a:ext>
-            </a:extLst>
-          </p:cNvPr>
-          <p:cNvSpPr/>
-          <p:nvPr/>
-        </p:nvSpPr>
-        <p:spPr>
-          <a:xfrm>
-            <a:off x="0" y="1038688"/>
-            <a:ext cx="12192000" cy="5228948"/>
-          </a:xfrm>
-          <a:prstGeom prst="rect">
-            <a:avLst/>
-          </a:prstGeom>
-          <a:gradFill flip="none" rotWithShape="1">
-            <a:gsLst>
-              <a:gs pos="0">
-                <a:schemeClr val="tx1">
-                  <a:shade val="30000"/>
-                  <a:satMod val="115000"/>
-                </a:schemeClr>
-              </a:gs>
-              <a:gs pos="50000">
-                <a:schemeClr val="tx1">
-                  <a:shade val="67500"/>
-                  <a:satMod val="115000"/>
-                </a:schemeClr>
-              </a:gs>
-              <a:gs pos="100000">
-                <a:schemeClr val="tx1">
-                  <a:shade val="100000"/>
-                  <a:satMod val="115000"/>
-                </a:schemeClr>
-              </a:gs>
-            </a:gsLst>
-            <a:lin ang="13500000" scaled="1"/>
-            <a:tileRect/>
-          </a:gradFill>
-          <a:ln>
-            <a:noFill/>
-          </a:ln>
-        </p:spPr>
-        <p:style>
-          <a:lnRef idx="2">
-            <a:schemeClr val="accent1">
-              <a:shade val="50000"/>
-            </a:schemeClr>
-          </a:lnRef>
-          <a:fillRef idx="1">
-            <a:schemeClr val="accent1"/>
-          </a:fillRef>
-          <a:effectRef idx="0">
-            <a:schemeClr val="accent1"/>
-          </a:effectRef>
-          <a:fontRef idx="minor">
-            <a:schemeClr val="lt1"/>
-          </a:fontRef>
-        </p:style>
-        <p:txBody>
-          <a:bodyPr rtlCol="0" anchor="ctr"/>
-          <a:lstStyle/>
-          <a:p>
-            <a:pPr algn="ctr"/>
-            <a:endParaRPr lang="en-CA"/>
-          </a:p>
-        </p:txBody>
-      </p:sp>
-      <p:sp>
-        <p:nvSpPr>
-          <p:cNvPr id="9" name="Rectangle 10">
-            <a:extLst>
-              <a:ext uri="{FF2B5EF4-FFF2-40B4-BE49-F238E27FC236}">
-                <a16:creationId xmlns:a16="http://schemas.microsoft.com/office/drawing/2014/main" id="{96F2C020-DA3F-4FB8-8899-23C1B2BDFC04}"/>
-              </a:ext>
-            </a:extLst>
-          </p:cNvPr>
-          <p:cNvSpPr>
-            <a:spLocks noChangeArrowheads="1"/>
-          </p:cNvSpPr>
-          <p:nvPr/>
-        </p:nvSpPr>
-        <p:spPr bwMode="auto">
-          <a:xfrm>
-            <a:off x="457200" y="1432028"/>
-            <a:ext cx="11049000" cy="299118"/>
-          </a:xfrm>
-          <a:prstGeom prst="rect">
-            <a:avLst/>
-          </a:prstGeom>
-          <a:gradFill flip="none" rotWithShape="1">
-            <a:gsLst>
-              <a:gs pos="0">
-                <a:srgbClr val="6CCFF6">
-                  <a:shade val="30000"/>
-                  <a:satMod val="115000"/>
-                </a:srgbClr>
-              </a:gs>
-              <a:gs pos="50000">
-                <a:srgbClr val="6CCFF6">
-                  <a:shade val="67500"/>
-                  <a:satMod val="115000"/>
-                </a:srgbClr>
-              </a:gs>
-              <a:gs pos="100000">
-                <a:srgbClr val="6CCFF6">
-                  <a:shade val="100000"/>
-                  <a:satMod val="115000"/>
-                </a:srgbClr>
-              </a:gs>
-            </a:gsLst>
-            <a:path path="circle">
-              <a:fillToRect l="100000" b="100000"/>
-            </a:path>
-            <a:tileRect t="-100000" r="-100000"/>
-          </a:gradFill>
-          <a:ln>
-            <a:noFill/>
-          </a:ln>
-          <a:extLst/>
-        </p:spPr>
-        <p:txBody>
-          <a:bodyPr wrap="none" lIns="121899" tIns="60949" rIns="121899" bIns="60949" anchor="ctr"/>
-          <a:lstStyle>
-            <a:lvl1pPr eaLnBrk="0" hangingPunct="0">
-              <a:spcBef>
-                <a:spcPct val="20000"/>
-              </a:spcBef>
-              <a:buClr>
-                <a:srgbClr val="4E84C4"/>
-              </a:buClr>
-              <a:buFont typeface="Wingdings" charset="2"/>
-              <a:buChar char="§"/>
-              <a:defRPr sz="1600">
-                <a:solidFill>
-                  <a:schemeClr val="tx1"/>
-                </a:solidFill>
-                <a:latin typeface="Arial" charset="0"/>
-                <a:cs typeface="Arial" charset="0"/>
-              </a:defRPr>
-            </a:lvl1pPr>
-            <a:lvl2pPr marL="742950" indent="-285750" eaLnBrk="0" hangingPunct="0">
-              <a:spcBef>
-                <a:spcPct val="20000"/>
-              </a:spcBef>
-              <a:buClr>
-                <a:srgbClr val="4E84C4"/>
-              </a:buClr>
-              <a:buFont typeface="Myriad Pro" pitchFamily="32" charset="0"/>
-              <a:buChar char="–"/>
-              <a:defRPr sz="1600">
-                <a:solidFill>
-                  <a:schemeClr val="tx1"/>
-                </a:solidFill>
-                <a:latin typeface="Arial" charset="0"/>
-                <a:cs typeface="Arial" charset="0"/>
-              </a:defRPr>
-            </a:lvl2pPr>
-            <a:lvl3pPr marL="1143000" indent="-228600" eaLnBrk="0" hangingPunct="0">
-              <a:spcBef>
-                <a:spcPct val="20000"/>
-              </a:spcBef>
-              <a:buClr>
-                <a:srgbClr val="4E84C4"/>
-              </a:buClr>
-              <a:buFont typeface="Courier New" pitchFamily="49" charset="0"/>
-              <a:buChar char="o"/>
-              <a:defRPr sz="1400">
-                <a:solidFill>
-                  <a:schemeClr val="tx1"/>
-                </a:solidFill>
-                <a:latin typeface="Arial" charset="0"/>
-                <a:cs typeface="Arial" charset="0"/>
-              </a:defRPr>
-            </a:lvl3pPr>
-            <a:lvl4pPr marL="1600200" indent="-228600" eaLnBrk="0" hangingPunct="0">
-              <a:spcBef>
-                <a:spcPct val="20000"/>
-              </a:spcBef>
-              <a:buClr>
-                <a:srgbClr val="4E84C4"/>
-              </a:buClr>
-              <a:buFont typeface="Arial" charset="0"/>
-              <a:buChar char="•"/>
-              <a:defRPr sz="1400">
-                <a:solidFill>
-                  <a:schemeClr val="tx1"/>
-                </a:solidFill>
-                <a:latin typeface="Arial" charset="0"/>
-                <a:cs typeface="Arial" charset="0"/>
-              </a:defRPr>
-            </a:lvl4pPr>
-            <a:lvl5pPr marL="2057400" indent="-228600" eaLnBrk="0" hangingPunct="0">
-              <a:spcBef>
-                <a:spcPct val="20000"/>
-              </a:spcBef>
-              <a:buFont typeface="Arial" charset="0"/>
-              <a:buChar char="»"/>
-              <a:defRPr sz="2000">
-                <a:solidFill>
-                  <a:schemeClr val="tx1"/>
-                </a:solidFill>
-                <a:latin typeface="Myriad Pro" pitchFamily="32" charset="0"/>
-                <a:cs typeface="Arial" charset="0"/>
-              </a:defRPr>
-            </a:lvl5pPr>
-            <a:lvl6pPr marL="2514600" indent="-228600" eaLnBrk="0" fontAlgn="base" hangingPunct="0">
-              <a:spcBef>
-                <a:spcPct val="20000"/>
-              </a:spcBef>
-              <a:spcAft>
-                <a:spcPct val="0"/>
-              </a:spcAft>
-              <a:buFont typeface="Arial" charset="0"/>
-              <a:buChar char="»"/>
-              <a:defRPr sz="2000">
-                <a:solidFill>
-                  <a:schemeClr val="tx1"/>
-                </a:solidFill>
-                <a:latin typeface="Myriad Pro" pitchFamily="32" charset="0"/>
-                <a:cs typeface="Arial" charset="0"/>
-              </a:defRPr>
-            </a:lvl6pPr>
-            <a:lvl7pPr marL="2971800" indent="-228600" eaLnBrk="0" fontAlgn="base" hangingPunct="0">
-              <a:spcBef>
-                <a:spcPct val="20000"/>
-              </a:spcBef>
-              <a:spcAft>
-                <a:spcPct val="0"/>
-              </a:spcAft>
-              <a:buFont typeface="Arial" charset="0"/>
-              <a:buChar char="»"/>
-              <a:defRPr sz="2000">
-                <a:solidFill>
-                  <a:schemeClr val="tx1"/>
-                </a:solidFill>
-                <a:latin typeface="Myriad Pro" pitchFamily="32" charset="0"/>
-                <a:cs typeface="Arial" charset="0"/>
-              </a:defRPr>
-            </a:lvl7pPr>
-            <a:lvl8pPr marL="3429000" indent="-228600" eaLnBrk="0" fontAlgn="base" hangingPunct="0">
-              <a:spcBef>
-                <a:spcPct val="20000"/>
-              </a:spcBef>
-              <a:spcAft>
-                <a:spcPct val="0"/>
-              </a:spcAft>
-              <a:buFont typeface="Arial" charset="0"/>
-              <a:buChar char="»"/>
-              <a:defRPr sz="2000">
-                <a:solidFill>
-                  <a:schemeClr val="tx1"/>
-                </a:solidFill>
-                <a:latin typeface="Myriad Pro" pitchFamily="32" charset="0"/>
-                <a:cs typeface="Arial" charset="0"/>
-              </a:defRPr>
-            </a:lvl8pPr>
-            <a:lvl9pPr marL="3886200" indent="-228600" eaLnBrk="0" fontAlgn="base" hangingPunct="0">
-              <a:spcBef>
-                <a:spcPct val="20000"/>
-              </a:spcBef>
-              <a:spcAft>
-                <a:spcPct val="0"/>
-              </a:spcAft>
-              <a:buFont typeface="Arial" charset="0"/>
-              <a:buChar char="»"/>
-              <a:defRPr sz="2000">
-                <a:solidFill>
-                  <a:schemeClr val="tx1"/>
-                </a:solidFill>
-                <a:latin typeface="Myriad Pro" pitchFamily="32" charset="0"/>
-                <a:cs typeface="Arial" charset="0"/>
-              </a:defRPr>
-            </a:lvl9pPr>
-          </a:lstStyle>
-          <a:p>
-            <a:pPr algn="ctr" defTabSz="914400" eaLnBrk="1" fontAlgn="base" hangingPunct="1">
-              <a:spcBef>
-                <a:spcPct val="0"/>
-              </a:spcBef>
-              <a:spcAft>
-                <a:spcPct val="0"/>
-              </a:spcAft>
-              <a:buClrTx/>
-              <a:buFont typeface="Wingdings" charset="2"/>
-              <a:buNone/>
-            </a:pPr>
-            <a:endParaRPr lang="en-US" altLang="en-US" dirty="0">
-              <a:solidFill>
-                <a:srgbClr val="000000"/>
-              </a:solidFill>
-              <a:latin typeface="Myriad Pro" pitchFamily="32" charset="0"/>
-            </a:endParaRPr>
-          </a:p>
-        </p:txBody>
-      </p:sp>
-      <p:sp>
-        <p:nvSpPr>
-          <p:cNvPr id="10" name="Content Placeholder 2">
-            <a:extLst>
-              <a:ext uri="{FF2B5EF4-FFF2-40B4-BE49-F238E27FC236}">
-                <a16:creationId xmlns:a16="http://schemas.microsoft.com/office/drawing/2014/main" id="{5D2DD52E-8399-4606-A772-EB7CB1BB6A22}"/>
-              </a:ext>
-            </a:extLst>
-          </p:cNvPr>
-          <p:cNvSpPr txBox="1">
-            <a:spLocks/>
-          </p:cNvSpPr>
-          <p:nvPr/>
-        </p:nvSpPr>
-        <p:spPr bwMode="auto">
-          <a:xfrm>
-            <a:off x="548220" y="1417638"/>
-            <a:ext cx="11237382" cy="4525963"/>
-          </a:xfrm>
-          <a:prstGeom prst="rect">
-            <a:avLst/>
-          </a:prstGeom>
-          <a:noFill/>
-          <a:ln>
-            <a:noFill/>
-          </a:ln>
-          <a:extLst>
-            <a:ext uri="{909E8E84-426E-40DD-AFC4-6F175D3DCCD1}">
-              <a14:hiddenFill xmlns:a14="http://schemas.microsoft.com/office/drawing/2010/main">
-                <a:solidFill>
-                  <a:srgbClr val="FFFFFF"/>
-                </a:solidFill>
-              </a14:hiddenFill>
-            </a:ext>
-            <a:ext uri="{91240B29-F687-4F45-9708-019B960494DF}">
-              <a14:hiddenLine xmlns:a14="http://schemas.microsoft.com/office/drawing/2010/main" w="9525">
-                <a:solidFill>
-                  <a:srgbClr val="000000"/>
-                </a:solidFill>
-                <a:miter lim="800000"/>
-                <a:headEnd/>
-                <a:tailEnd/>
-              </a14:hiddenLine>
-            </a:ext>
-          </a:extLst>
-        </p:spPr>
-        <p:txBody>
-          <a:bodyPr vert="horz" wrap="square" lIns="121899" tIns="60949" rIns="121899" bIns="60949" numCol="1" anchor="t" anchorCtr="0" compatLnSpc="1">
-            <a:prstTxWarp prst="textNoShape">
-              <a:avLst/>
-            </a:prstTxWarp>
-            <a:noAutofit/>
-          </a:bodyPr>
-          <a:lstStyle>
-            <a:lvl1pPr marL="308979" indent="-308979" algn="l" rtl="0" eaLnBrk="1" fontAlgn="base" hangingPunct="1">
-              <a:lnSpc>
-                <a:spcPct val="100000"/>
-              </a:lnSpc>
-              <a:spcBef>
-                <a:spcPts val="1600"/>
-              </a:spcBef>
-              <a:spcAft>
-                <a:spcPct val="0"/>
-              </a:spcAft>
-              <a:buClr>
-                <a:srgbClr val="4E84C4"/>
-              </a:buClr>
-              <a:buFont typeface="Wingdings" charset="2"/>
-              <a:buChar char="§"/>
-              <a:defRPr sz="1600" kern="1200">
-                <a:solidFill>
-                  <a:schemeClr val="tx1"/>
-                </a:solidFill>
-                <a:latin typeface="Arial" pitchFamily="34" charset="0"/>
-                <a:ea typeface="+mn-ea"/>
-                <a:cs typeface="Arial" pitchFamily="34" charset="0"/>
-              </a:defRPr>
-            </a:lvl1pPr>
-            <a:lvl2pPr marL="910007" indent="-300514" algn="l" rtl="0" eaLnBrk="1" fontAlgn="base" hangingPunct="1">
-              <a:lnSpc>
-                <a:spcPct val="100000"/>
-              </a:lnSpc>
-              <a:spcBef>
-                <a:spcPts val="512"/>
-              </a:spcBef>
-              <a:spcAft>
-                <a:spcPct val="0"/>
-              </a:spcAft>
-              <a:buClr>
-                <a:srgbClr val="4E84C4"/>
-              </a:buClr>
-              <a:buFont typeface="Myriad Pro" pitchFamily="32" charset="0"/>
-              <a:buChar char="–"/>
-              <a:defRPr sz="1600" kern="1200">
-                <a:solidFill>
-                  <a:schemeClr val="tx1"/>
-                </a:solidFill>
-                <a:latin typeface="Arial" pitchFamily="34" charset="0"/>
-                <a:ea typeface="+mn-ea"/>
-                <a:cs typeface="Arial" pitchFamily="34" charset="0"/>
-              </a:defRPr>
-            </a:lvl2pPr>
-            <a:lvl3pPr marL="1523733" indent="-304747" algn="l" rtl="0" eaLnBrk="1" fontAlgn="base" hangingPunct="1">
-              <a:lnSpc>
-                <a:spcPct val="100000"/>
-              </a:lnSpc>
-              <a:spcBef>
-                <a:spcPts val="512"/>
-              </a:spcBef>
-              <a:spcAft>
-                <a:spcPct val="0"/>
-              </a:spcAft>
-              <a:buClr>
-                <a:srgbClr val="4E84C4"/>
-              </a:buClr>
-              <a:buFont typeface="Courier New" pitchFamily="49" charset="0"/>
-              <a:buChar char="o"/>
-              <a:defRPr sz="1500" kern="1200">
-                <a:solidFill>
-                  <a:schemeClr val="tx1"/>
-                </a:solidFill>
-                <a:latin typeface="Arial" pitchFamily="34" charset="0"/>
-                <a:ea typeface="+mn-ea"/>
-                <a:cs typeface="Arial" pitchFamily="34" charset="0"/>
-              </a:defRPr>
-            </a:lvl3pPr>
-            <a:lvl4pPr marL="2133227" indent="-304747" algn="l" rtl="0" eaLnBrk="1" fontAlgn="base" hangingPunct="1">
-              <a:lnSpc>
-                <a:spcPct val="100000"/>
-              </a:lnSpc>
-              <a:spcBef>
-                <a:spcPts val="512"/>
-              </a:spcBef>
-              <a:spcAft>
-                <a:spcPct val="0"/>
-              </a:spcAft>
-              <a:buClr>
-                <a:srgbClr val="4E84C4"/>
-              </a:buClr>
-              <a:buFont typeface="Arial" charset="0"/>
-              <a:buChar char="•"/>
-              <a:defRPr sz="1300" kern="1200">
-                <a:solidFill>
-                  <a:schemeClr val="tx1"/>
-                </a:solidFill>
-                <a:latin typeface="Arial" pitchFamily="34" charset="0"/>
-                <a:ea typeface="+mn-ea"/>
-                <a:cs typeface="Arial" pitchFamily="34" charset="0"/>
-              </a:defRPr>
-            </a:lvl4pPr>
-            <a:lvl5pPr marL="2742720" indent="-304747" algn="l" rtl="0" eaLnBrk="1" fontAlgn="base" hangingPunct="1">
-              <a:spcBef>
-                <a:spcPct val="20000"/>
-              </a:spcBef>
-              <a:spcAft>
-                <a:spcPct val="0"/>
-              </a:spcAft>
-              <a:buFont typeface="Arial" charset="0"/>
-              <a:buChar char="»"/>
-              <a:defRPr sz="2700" kern="1200">
-                <a:solidFill>
-                  <a:schemeClr val="tx1"/>
-                </a:solidFill>
-                <a:latin typeface="Myriad Pro" pitchFamily="34" charset="0"/>
-                <a:ea typeface="+mn-ea"/>
-                <a:cs typeface="Arial" pitchFamily="34" charset="0"/>
-              </a:defRPr>
-            </a:lvl5pPr>
-            <a:lvl6pPr marL="3352213" indent="-304747" algn="l" defTabSz="1218987" rtl="0" eaLnBrk="1" latinLnBrk="0" hangingPunct="1">
-              <a:spcBef>
-                <a:spcPct val="20000"/>
-              </a:spcBef>
-              <a:buFont typeface="Arial" pitchFamily="34" charset="0"/>
-              <a:buChar char="•"/>
-              <a:defRPr sz="2700" kern="1200">
-                <a:solidFill>
-                  <a:schemeClr val="tx1"/>
-                </a:solidFill>
-                <a:latin typeface="+mn-lt"/>
-                <a:ea typeface="+mn-ea"/>
-                <a:cs typeface="+mn-cs"/>
-              </a:defRPr>
-            </a:lvl6pPr>
-            <a:lvl7pPr marL="3961707" indent="-304747" algn="l" defTabSz="1218987" rtl="0" eaLnBrk="1" latinLnBrk="0" hangingPunct="1">
-              <a:spcBef>
-                <a:spcPct val="20000"/>
-              </a:spcBef>
-              <a:buFont typeface="Arial" pitchFamily="34" charset="0"/>
-              <a:buChar char="•"/>
-              <a:defRPr sz="2700" kern="1200">
-                <a:solidFill>
-                  <a:schemeClr val="tx1"/>
-                </a:solidFill>
-                <a:latin typeface="+mn-lt"/>
-                <a:ea typeface="+mn-ea"/>
-                <a:cs typeface="+mn-cs"/>
-              </a:defRPr>
-            </a:lvl7pPr>
-            <a:lvl8pPr marL="4571200" indent="-304747" algn="l" defTabSz="1218987" rtl="0" eaLnBrk="1" latinLnBrk="0" hangingPunct="1">
-              <a:spcBef>
-                <a:spcPct val="20000"/>
-              </a:spcBef>
-              <a:buFont typeface="Arial" pitchFamily="34" charset="0"/>
-              <a:buChar char="•"/>
-              <a:defRPr sz="2700" kern="1200">
-                <a:solidFill>
-                  <a:schemeClr val="tx1"/>
-                </a:solidFill>
-                <a:latin typeface="+mn-lt"/>
-                <a:ea typeface="+mn-ea"/>
-                <a:cs typeface="+mn-cs"/>
-              </a:defRPr>
-            </a:lvl8pPr>
-            <a:lvl9pPr marL="5180693" indent="-304747" algn="l" defTabSz="1218987" rtl="0" eaLnBrk="1" latinLnBrk="0" hangingPunct="1">
-              <a:spcBef>
-                <a:spcPct val="20000"/>
-              </a:spcBef>
-              <a:buFont typeface="Arial" pitchFamily="34" charset="0"/>
-              <a:buChar char="•"/>
-              <a:defRPr sz="2700" kern="1200">
-                <a:solidFill>
-                  <a:schemeClr val="tx1"/>
-                </a:solidFill>
-                <a:latin typeface="+mn-lt"/>
-                <a:ea typeface="+mn-ea"/>
-                <a:cs typeface="+mn-cs"/>
-              </a:defRPr>
-            </a:lvl9pPr>
-          </a:lstStyle>
-          <a:p>
-            <a:pPr marL="308979" marR="0" lvl="0" indent="-308979" algn="l" defTabSz="914400" rtl="0" eaLnBrk="1" fontAlgn="base" latinLnBrk="0" hangingPunct="1">
-              <a:lnSpc>
-                <a:spcPct val="100000"/>
-              </a:lnSpc>
-              <a:spcBef>
-                <a:spcPts val="600"/>
-              </a:spcBef>
-              <a:spcAft>
-                <a:spcPct val="0"/>
-              </a:spcAft>
-              <a:buClr>
-                <a:srgbClr val="4E84C4"/>
-              </a:buClr>
-              <a:buSzTx/>
-              <a:buFont typeface="Wingdings" charset="2"/>
-              <a:buChar char="§"/>
-              <a:tabLst/>
-              <a:defRPr/>
-            </a:pPr>
-            <a:r>
-              <a:rPr kumimoji="0" lang="en-US" sz="1400" b="0" i="0" u="none" strike="noStrike" kern="1200" cap="none" spc="0" normalizeH="0" baseline="0" noProof="0" dirty="0">
-                <a:ln>
-                  <a:noFill/>
-                </a:ln>
-                <a:solidFill>
-                  <a:srgbClr val="000000"/>
-                </a:solidFill>
-                <a:effectLst/>
-                <a:uLnTx/>
-                <a:uFillTx/>
-                <a:latin typeface="Arial" pitchFamily="34" charset="0"/>
-                <a:ea typeface="+mn-ea"/>
-                <a:cs typeface="Arial" pitchFamily="34" charset="0"/>
-              </a:rPr>
-              <a:t>Introduction, Problem Statement and Scope</a:t>
-            </a:r>
-          </a:p>
-          <a:p>
-            <a:pPr marL="308979" marR="0" lvl="0" indent="-308979" algn="l" defTabSz="914400" rtl="0" eaLnBrk="1" fontAlgn="base" latinLnBrk="0" hangingPunct="1">
-              <a:lnSpc>
-                <a:spcPct val="100000"/>
-              </a:lnSpc>
-              <a:spcBef>
-                <a:spcPts val="600"/>
-              </a:spcBef>
-              <a:spcAft>
-                <a:spcPct val="0"/>
-              </a:spcAft>
-              <a:buClr>
-                <a:srgbClr val="4E84C4"/>
-              </a:buClr>
-              <a:buSzTx/>
-              <a:buFont typeface="Wingdings" charset="2"/>
-              <a:buChar char="§"/>
-              <a:tabLst/>
-              <a:defRPr/>
-            </a:pPr>
-            <a:r>
-              <a:rPr kumimoji="0" lang="en-US" sz="1400" b="0" i="0" u="none" strike="noStrike" kern="1200" cap="none" spc="0" normalizeH="0" baseline="0" noProof="0" dirty="0">
-                <a:ln>
-                  <a:noFill/>
-                </a:ln>
-                <a:solidFill>
-                  <a:srgbClr val="000000"/>
-                </a:solidFill>
-                <a:effectLst/>
-                <a:uLnTx/>
-                <a:uFillTx/>
-                <a:latin typeface="Arial" pitchFamily="34" charset="0"/>
-                <a:ea typeface="+mn-ea"/>
-                <a:cs typeface="Arial" pitchFamily="34" charset="0"/>
-              </a:rPr>
-              <a:t>Methodology </a:t>
-            </a:r>
-          </a:p>
-          <a:p>
-            <a:pPr marL="308979" marR="0" lvl="0" indent="-308979" algn="l" defTabSz="914400" rtl="0" eaLnBrk="1" fontAlgn="base" latinLnBrk="0" hangingPunct="1">
-              <a:lnSpc>
-                <a:spcPct val="100000"/>
-              </a:lnSpc>
-              <a:spcBef>
-                <a:spcPts val="600"/>
-              </a:spcBef>
-              <a:spcAft>
-                <a:spcPct val="0"/>
-              </a:spcAft>
-              <a:buClr>
-                <a:srgbClr val="4E84C4"/>
-              </a:buClr>
-              <a:buSzTx/>
-              <a:buFont typeface="Wingdings" charset="2"/>
-              <a:buChar char="§"/>
-              <a:tabLst/>
-              <a:defRPr/>
-            </a:pPr>
-            <a:r>
-              <a:rPr kumimoji="0" lang="en-US" sz="1400" b="0" i="0" u="none" strike="noStrike" kern="1200" cap="none" spc="0" normalizeH="0" baseline="0" noProof="0" dirty="0">
-                <a:ln>
-                  <a:noFill/>
-                </a:ln>
-                <a:solidFill>
-                  <a:srgbClr val="000000"/>
-                </a:solidFill>
-                <a:effectLst/>
-                <a:uLnTx/>
-                <a:uFillTx/>
-                <a:latin typeface="Arial" pitchFamily="34" charset="0"/>
-                <a:ea typeface="+mn-ea"/>
-                <a:cs typeface="Arial" pitchFamily="34" charset="0"/>
-              </a:rPr>
-              <a:t>Day of </a:t>
-            </a:r>
-            <a:r>
-              <a:rPr lang="en-US" sz="1400" dirty="0">
-                <a:solidFill>
-                  <a:srgbClr val="000000"/>
-                </a:solidFill>
-              </a:rPr>
-              <a:t>Week </a:t>
-            </a:r>
-            <a:r>
-              <a:rPr kumimoji="0" lang="en-US" sz="1400" b="0" i="0" u="none" strike="noStrike" kern="1200" cap="none" spc="0" normalizeH="0" baseline="0" noProof="0" dirty="0">
-                <a:ln>
-                  <a:noFill/>
-                </a:ln>
-                <a:solidFill>
-                  <a:srgbClr val="000000"/>
-                </a:solidFill>
-                <a:effectLst/>
-                <a:uLnTx/>
-                <a:uFillTx/>
-                <a:latin typeface="Arial" pitchFamily="34" charset="0"/>
-                <a:ea typeface="+mn-ea"/>
-                <a:cs typeface="Arial" pitchFamily="34" charset="0"/>
-              </a:rPr>
-              <a:t>vs Crime</a:t>
-            </a:r>
-          </a:p>
-          <a:p>
-            <a:pPr marL="910007" marR="0" lvl="1" indent="-300514" algn="l" defTabSz="914400" rtl="0" eaLnBrk="1" fontAlgn="base" latinLnBrk="0" hangingPunct="1">
-              <a:lnSpc>
-                <a:spcPct val="100000"/>
-              </a:lnSpc>
-              <a:spcBef>
-                <a:spcPts val="600"/>
-              </a:spcBef>
-              <a:spcAft>
-                <a:spcPct val="0"/>
-              </a:spcAft>
-              <a:buClr>
-                <a:srgbClr val="4E84C4"/>
-              </a:buClr>
-              <a:buSzTx/>
-              <a:buFont typeface="Myriad Pro" pitchFamily="32" charset="0"/>
-              <a:buChar char="–"/>
-              <a:tabLst/>
-              <a:defRPr/>
-            </a:pPr>
-            <a:r>
-              <a:rPr kumimoji="0" lang="en-US" sz="1400" b="0" i="0" u="none" strike="noStrike" kern="1200" cap="none" spc="0" normalizeH="0" baseline="0" noProof="0" dirty="0">
-                <a:ln>
-                  <a:noFill/>
-                </a:ln>
-                <a:solidFill>
-                  <a:srgbClr val="000000"/>
-                </a:solidFill>
-                <a:effectLst/>
-                <a:uLnTx/>
-                <a:uFillTx/>
-                <a:latin typeface="Arial" pitchFamily="34" charset="0"/>
-                <a:ea typeface="+mn-ea"/>
-                <a:cs typeface="Arial" pitchFamily="34" charset="0"/>
-              </a:rPr>
-              <a:t>Findings</a:t>
-            </a:r>
-          </a:p>
-          <a:p>
-            <a:pPr marL="910007" marR="0" lvl="1" indent="-300514" algn="l" defTabSz="914400" rtl="0" eaLnBrk="1" fontAlgn="base" latinLnBrk="0" hangingPunct="1">
-              <a:lnSpc>
-                <a:spcPct val="100000"/>
-              </a:lnSpc>
-              <a:spcBef>
-                <a:spcPts val="600"/>
-              </a:spcBef>
-              <a:spcAft>
-                <a:spcPct val="0"/>
-              </a:spcAft>
-              <a:buClr>
-                <a:srgbClr val="4E84C4"/>
-              </a:buClr>
-              <a:buSzTx/>
-              <a:buFont typeface="Myriad Pro" pitchFamily="32" charset="0"/>
-              <a:buChar char="–"/>
-              <a:tabLst/>
-              <a:defRPr/>
-            </a:pPr>
-            <a:r>
-              <a:rPr kumimoji="0" lang="en-US" sz="1400" b="0" i="0" u="none" strike="noStrike" kern="1200" cap="none" spc="0" normalizeH="0" baseline="0" noProof="0" dirty="0">
-                <a:ln>
-                  <a:noFill/>
-                </a:ln>
-                <a:solidFill>
-                  <a:srgbClr val="000000"/>
-                </a:solidFill>
-                <a:effectLst/>
-                <a:uLnTx/>
-                <a:uFillTx/>
-                <a:latin typeface="Arial" pitchFamily="34" charset="0"/>
-                <a:ea typeface="+mn-ea"/>
-                <a:cs typeface="Arial" pitchFamily="34" charset="0"/>
-              </a:rPr>
-              <a:t>Conclusions</a:t>
-            </a:r>
-          </a:p>
-          <a:p>
-            <a:pPr marL="308979" marR="0" lvl="0" indent="-308979" algn="l" defTabSz="914400" rtl="0" eaLnBrk="1" fontAlgn="base" latinLnBrk="0" hangingPunct="1">
-              <a:lnSpc>
-                <a:spcPct val="100000"/>
-              </a:lnSpc>
-              <a:spcBef>
-                <a:spcPts val="600"/>
-              </a:spcBef>
-              <a:spcAft>
-                <a:spcPct val="0"/>
-              </a:spcAft>
-              <a:buClr>
-                <a:srgbClr val="4E84C4"/>
-              </a:buClr>
-              <a:buSzTx/>
-              <a:buFont typeface="Wingdings" charset="2"/>
-              <a:buChar char="§"/>
-              <a:tabLst/>
-              <a:defRPr/>
-            </a:pPr>
-            <a:r>
-              <a:rPr kumimoji="0" lang="en-US" sz="1400" b="0" i="0" u="none" strike="noStrike" kern="1200" cap="none" spc="0" normalizeH="0" baseline="0" noProof="0" dirty="0">
-                <a:ln>
-                  <a:noFill/>
-                </a:ln>
-                <a:solidFill>
-                  <a:srgbClr val="000000"/>
-                </a:solidFill>
-                <a:effectLst/>
-                <a:uLnTx/>
-                <a:uFillTx/>
-                <a:latin typeface="Arial" pitchFamily="34" charset="0"/>
-                <a:ea typeface="+mn-ea"/>
-                <a:cs typeface="Arial" pitchFamily="34" charset="0"/>
-              </a:rPr>
-              <a:t>Precipitation vs Crime</a:t>
-            </a:r>
-          </a:p>
-          <a:p>
-            <a:pPr marL="910007" marR="0" lvl="1" indent="-300514" algn="l" defTabSz="914400" rtl="0" eaLnBrk="1" fontAlgn="base" latinLnBrk="0" hangingPunct="1">
-              <a:lnSpc>
-                <a:spcPct val="100000"/>
-              </a:lnSpc>
-              <a:spcBef>
-                <a:spcPts val="600"/>
-              </a:spcBef>
-              <a:spcAft>
-                <a:spcPct val="0"/>
-              </a:spcAft>
-              <a:buClr>
-                <a:srgbClr val="4E84C4"/>
-              </a:buClr>
-              <a:buSzTx/>
-              <a:buFont typeface="Myriad Pro" pitchFamily="32" charset="0"/>
-              <a:buChar char="–"/>
-              <a:tabLst/>
-              <a:defRPr/>
-            </a:pPr>
-            <a:r>
-              <a:rPr kumimoji="0" lang="en-US" sz="1400" b="0" i="0" u="none" strike="noStrike" kern="1200" cap="none" spc="0" normalizeH="0" baseline="0" noProof="0" dirty="0">
-                <a:ln>
-                  <a:noFill/>
-                </a:ln>
-                <a:solidFill>
-                  <a:srgbClr val="000000"/>
-                </a:solidFill>
-                <a:effectLst/>
-                <a:uLnTx/>
-                <a:uFillTx/>
-                <a:latin typeface="Arial" pitchFamily="34" charset="0"/>
-                <a:ea typeface="+mn-ea"/>
-                <a:cs typeface="Arial" pitchFamily="34" charset="0"/>
-              </a:rPr>
-              <a:t>Findings</a:t>
-            </a:r>
-          </a:p>
-          <a:p>
-            <a:pPr marL="910007" marR="0" lvl="1" indent="-300514" algn="l" defTabSz="914400" rtl="0" eaLnBrk="1" fontAlgn="base" latinLnBrk="0" hangingPunct="1">
-              <a:lnSpc>
-                <a:spcPct val="100000"/>
-              </a:lnSpc>
-              <a:spcBef>
-                <a:spcPts val="600"/>
-              </a:spcBef>
-              <a:spcAft>
-                <a:spcPct val="0"/>
-              </a:spcAft>
-              <a:buClr>
-                <a:srgbClr val="4E84C4"/>
-              </a:buClr>
-              <a:buSzTx/>
-              <a:buFont typeface="Myriad Pro" pitchFamily="32" charset="0"/>
-              <a:buChar char="–"/>
-              <a:tabLst/>
-              <a:defRPr/>
-            </a:pPr>
-            <a:r>
-              <a:rPr kumimoji="0" lang="en-US" sz="1400" b="0" i="0" u="none" strike="noStrike" kern="1200" cap="none" spc="0" normalizeH="0" baseline="0" noProof="0" dirty="0">
-                <a:ln>
-                  <a:noFill/>
-                </a:ln>
-                <a:solidFill>
-                  <a:srgbClr val="000000"/>
-                </a:solidFill>
-                <a:effectLst/>
-                <a:uLnTx/>
-                <a:uFillTx/>
-                <a:latin typeface="Arial" pitchFamily="34" charset="0"/>
-                <a:ea typeface="+mn-ea"/>
-                <a:cs typeface="Arial" pitchFamily="34" charset="0"/>
-              </a:rPr>
-              <a:t>Conclusions</a:t>
-            </a:r>
-          </a:p>
-          <a:p>
-            <a:pPr marL="308979" marR="0" lvl="0" indent="-308979" algn="l" defTabSz="914400" rtl="0" eaLnBrk="1" fontAlgn="base" latinLnBrk="0" hangingPunct="1">
-              <a:lnSpc>
-                <a:spcPct val="100000"/>
-              </a:lnSpc>
-              <a:spcBef>
-                <a:spcPts val="600"/>
-              </a:spcBef>
-              <a:spcAft>
-                <a:spcPct val="0"/>
-              </a:spcAft>
-              <a:buClr>
-                <a:srgbClr val="4E84C4"/>
-              </a:buClr>
-              <a:buSzTx/>
-              <a:buFont typeface="Wingdings" charset="2"/>
-              <a:buChar char="§"/>
-              <a:tabLst/>
-              <a:defRPr/>
-            </a:pPr>
-            <a:r>
-              <a:rPr kumimoji="0" lang="en-US" sz="1400" b="0" i="0" u="none" strike="noStrike" kern="1200" cap="none" spc="0" normalizeH="0" baseline="0" noProof="0" dirty="0">
-                <a:ln>
-                  <a:noFill/>
-                </a:ln>
-                <a:solidFill>
-                  <a:srgbClr val="000000"/>
-                </a:solidFill>
-                <a:effectLst/>
-                <a:uLnTx/>
-                <a:uFillTx/>
-                <a:latin typeface="Arial" pitchFamily="34" charset="0"/>
-                <a:ea typeface="+mn-ea"/>
-                <a:cs typeface="Arial" pitchFamily="34" charset="0"/>
-              </a:rPr>
-              <a:t>Temperature vs Crime</a:t>
-            </a:r>
-          </a:p>
-          <a:p>
-            <a:pPr marL="910007" marR="0" lvl="1" indent="-300514" algn="l" defTabSz="914400" rtl="0" eaLnBrk="1" fontAlgn="base" latinLnBrk="0" hangingPunct="1">
-              <a:lnSpc>
-                <a:spcPct val="100000"/>
-              </a:lnSpc>
-              <a:spcBef>
-                <a:spcPts val="600"/>
-              </a:spcBef>
-              <a:spcAft>
-                <a:spcPct val="0"/>
-              </a:spcAft>
-              <a:buClr>
-                <a:srgbClr val="4E84C4"/>
-              </a:buClr>
-              <a:buSzTx/>
-              <a:buFont typeface="Myriad Pro" pitchFamily="32" charset="0"/>
-              <a:buChar char="–"/>
-              <a:tabLst/>
-              <a:defRPr/>
-            </a:pPr>
-            <a:r>
-              <a:rPr kumimoji="0" lang="en-US" sz="1400" b="0" i="0" u="none" strike="noStrike" kern="1200" cap="none" spc="0" normalizeH="0" baseline="0" noProof="0" dirty="0">
-                <a:ln>
-                  <a:noFill/>
-                </a:ln>
-                <a:solidFill>
-                  <a:srgbClr val="000000"/>
-                </a:solidFill>
-                <a:effectLst/>
-                <a:uLnTx/>
-                <a:uFillTx/>
-                <a:latin typeface="Arial" pitchFamily="34" charset="0"/>
-                <a:ea typeface="+mn-ea"/>
-                <a:cs typeface="Arial" pitchFamily="34" charset="0"/>
-              </a:rPr>
-              <a:t>Findings</a:t>
-            </a:r>
-          </a:p>
-          <a:p>
-            <a:pPr marL="910007" marR="0" lvl="1" indent="-300514" algn="l" defTabSz="914400" rtl="0" eaLnBrk="1" fontAlgn="base" latinLnBrk="0" hangingPunct="1">
-              <a:lnSpc>
-                <a:spcPct val="100000"/>
-              </a:lnSpc>
-              <a:spcBef>
-                <a:spcPts val="600"/>
-              </a:spcBef>
-              <a:spcAft>
-                <a:spcPct val="0"/>
-              </a:spcAft>
-              <a:buClr>
-                <a:srgbClr val="4E84C4"/>
-              </a:buClr>
-              <a:buSzTx/>
-              <a:buFont typeface="Myriad Pro" pitchFamily="32" charset="0"/>
-              <a:buChar char="–"/>
-              <a:tabLst/>
-              <a:defRPr/>
-            </a:pPr>
-            <a:r>
-              <a:rPr kumimoji="0" lang="en-US" sz="1400" b="0" i="0" u="none" strike="noStrike" kern="1200" cap="none" spc="0" normalizeH="0" baseline="0" noProof="0" dirty="0">
-                <a:ln>
-                  <a:noFill/>
-                </a:ln>
-                <a:solidFill>
-                  <a:srgbClr val="000000"/>
-                </a:solidFill>
-                <a:effectLst/>
-                <a:uLnTx/>
-                <a:uFillTx/>
-                <a:latin typeface="Arial" pitchFamily="34" charset="0"/>
-                <a:ea typeface="+mn-ea"/>
-                <a:cs typeface="Arial" pitchFamily="34" charset="0"/>
-              </a:rPr>
-              <a:t>Conclusions</a:t>
-            </a:r>
-          </a:p>
-          <a:p>
-            <a:pPr marL="308979" marR="0" lvl="0" indent="-308979" algn="l" defTabSz="914400" rtl="0" eaLnBrk="1" fontAlgn="base" latinLnBrk="0" hangingPunct="1">
-              <a:lnSpc>
-                <a:spcPct val="100000"/>
-              </a:lnSpc>
-              <a:spcBef>
-                <a:spcPts val="600"/>
-              </a:spcBef>
-              <a:spcAft>
-                <a:spcPct val="0"/>
-              </a:spcAft>
-              <a:buClr>
-                <a:srgbClr val="4E84C4"/>
-              </a:buClr>
-              <a:buSzTx/>
-              <a:buFont typeface="Wingdings" charset="2"/>
-              <a:buChar char="§"/>
-              <a:tabLst/>
-              <a:defRPr/>
-            </a:pPr>
-            <a:r>
-              <a:rPr kumimoji="0" lang="en-US" sz="1400" b="0" i="0" u="none" strike="noStrike" kern="1200" cap="none" spc="0" normalizeH="0" baseline="0" noProof="0" dirty="0">
-                <a:ln>
-                  <a:noFill/>
-                </a:ln>
-                <a:solidFill>
-                  <a:srgbClr val="000000"/>
-                </a:solidFill>
-                <a:effectLst/>
-                <a:uLnTx/>
-                <a:uFillTx/>
-                <a:latin typeface="Arial" pitchFamily="34" charset="0"/>
-                <a:ea typeface="+mn-ea"/>
-                <a:cs typeface="Arial" pitchFamily="34" charset="0"/>
-              </a:rPr>
-              <a:t>Moon Phase vs Crime</a:t>
-            </a:r>
-          </a:p>
-          <a:p>
-            <a:pPr marL="910007" marR="0" lvl="1" indent="-300514" algn="l" defTabSz="914400" rtl="0" eaLnBrk="1" fontAlgn="base" latinLnBrk="0" hangingPunct="1">
-              <a:lnSpc>
-                <a:spcPct val="100000"/>
-              </a:lnSpc>
-              <a:spcBef>
-                <a:spcPts val="600"/>
-              </a:spcBef>
-              <a:spcAft>
-                <a:spcPct val="0"/>
-              </a:spcAft>
-              <a:buClr>
-                <a:srgbClr val="4E84C4"/>
-              </a:buClr>
-              <a:buSzTx/>
-              <a:buFont typeface="Myriad Pro" pitchFamily="32" charset="0"/>
-              <a:buChar char="–"/>
-              <a:tabLst/>
-              <a:defRPr/>
-            </a:pPr>
-            <a:r>
-              <a:rPr kumimoji="0" lang="en-US" sz="1400" b="0" i="0" u="none" strike="noStrike" kern="1200" cap="none" spc="0" normalizeH="0" baseline="0" noProof="0" dirty="0">
-                <a:ln>
-                  <a:noFill/>
-                </a:ln>
-                <a:solidFill>
-                  <a:srgbClr val="000000"/>
-                </a:solidFill>
-                <a:effectLst/>
-                <a:uLnTx/>
-                <a:uFillTx/>
-                <a:latin typeface="Arial" pitchFamily="34" charset="0"/>
-                <a:ea typeface="+mn-ea"/>
-                <a:cs typeface="Arial" pitchFamily="34" charset="0"/>
-              </a:rPr>
-              <a:t>Findings</a:t>
-            </a:r>
-          </a:p>
-          <a:p>
-            <a:pPr marL="910007" marR="0" lvl="1" indent="-300514" algn="l" defTabSz="914400" rtl="0" eaLnBrk="1" fontAlgn="base" latinLnBrk="0" hangingPunct="1">
-              <a:lnSpc>
-                <a:spcPct val="100000"/>
-              </a:lnSpc>
-              <a:spcBef>
-                <a:spcPts val="600"/>
-              </a:spcBef>
-              <a:spcAft>
-                <a:spcPct val="0"/>
-              </a:spcAft>
-              <a:buClr>
-                <a:srgbClr val="4E84C4"/>
-              </a:buClr>
-              <a:buSzTx/>
-              <a:buFont typeface="Myriad Pro" pitchFamily="32" charset="0"/>
-              <a:buChar char="–"/>
-              <a:tabLst/>
-              <a:defRPr/>
-            </a:pPr>
-            <a:r>
-              <a:rPr kumimoji="0" lang="en-US" sz="1400" b="0" i="0" u="none" strike="noStrike" kern="1200" cap="none" spc="0" normalizeH="0" baseline="0" noProof="0" dirty="0">
-                <a:ln>
-                  <a:noFill/>
-                </a:ln>
-                <a:solidFill>
-                  <a:srgbClr val="000000"/>
-                </a:solidFill>
-                <a:effectLst/>
-                <a:uLnTx/>
-                <a:uFillTx/>
-                <a:latin typeface="Arial" pitchFamily="34" charset="0"/>
-                <a:ea typeface="+mn-ea"/>
-                <a:cs typeface="Arial" pitchFamily="34" charset="0"/>
-              </a:rPr>
-              <a:t>Conclusions</a:t>
-            </a:r>
-          </a:p>
-          <a:p>
-            <a:pPr marL="0" marR="0" lvl="0" indent="0" algn="l" defTabSz="914400" rtl="0" eaLnBrk="1" fontAlgn="base" latinLnBrk="0" hangingPunct="1">
-              <a:lnSpc>
-                <a:spcPct val="100000"/>
-              </a:lnSpc>
-              <a:spcBef>
-                <a:spcPts val="1600"/>
-              </a:spcBef>
-              <a:spcAft>
-                <a:spcPct val="0"/>
-              </a:spcAft>
-              <a:buClr>
-                <a:srgbClr val="4E84C4"/>
-              </a:buClr>
-              <a:buSzTx/>
-              <a:buFont typeface="Wingdings" charset="2"/>
-              <a:buNone/>
-              <a:tabLst/>
-              <a:defRPr/>
-            </a:pPr>
-            <a:endParaRPr kumimoji="0" lang="en-US" sz="1600" b="0" i="0" u="none" strike="noStrike" kern="1200" cap="none" spc="0" normalizeH="0" baseline="0" noProof="0" dirty="0">
-              <a:ln>
-                <a:noFill/>
-              </a:ln>
-              <a:solidFill>
-                <a:srgbClr val="000000"/>
-              </a:solidFill>
-              <a:effectLst/>
-              <a:uLnTx/>
-              <a:uFillTx/>
-              <a:latin typeface="Arial" pitchFamily="34" charset="0"/>
-              <a:ea typeface="+mn-ea"/>
-              <a:cs typeface="Arial" pitchFamily="34" charset="0"/>
-            </a:endParaRPr>
-          </a:p>
-        </p:txBody>
-      </p:sp>
-    </p:spTree>
-    <p:extLst>
-      <p:ext uri="{BB962C8B-B14F-4D97-AF65-F5344CB8AC3E}">
-        <p14:creationId xmlns:p14="http://schemas.microsoft.com/office/powerpoint/2010/main" val="2978358348"/>
-      </p:ext>
-    </p:extLst>
-  </p:cSld>
-  <p:clrMapOvr>
-    <a:masterClrMapping/>
-  </p:clrMapOvr>
-</p:sld>
-</file>
-
-<file path=ppt/slides/slide20.xml><?xml version="1.0" encoding="utf-8"?>
+<file path=ppt/slides/slide22.xml><?xml version="1.0" encoding="utf-8"?>
 <p:sld xmlns:a="http://schemas.openxmlformats.org/drawingml/2006/main" xmlns:r="http://schemas.openxmlformats.org/officeDocument/2006/relationships" xmlns:p="http://schemas.openxmlformats.org/presentationml/2006/main">
   <p:cSld>
     <p:spTree>
@@ -16722,7 +17150,7 @@
             <a:fld id="{D57F1E4F-1CFF-5643-939E-217C01CDF565}" type="slidenum">
               <a:rPr lang="en-US" smtClean="0"/>
               <a:pPr/>
-              <a:t>20</a:t>
+              <a:t>22</a:t>
             </a:fld>
             <a:endParaRPr lang="en-US" dirty="0"/>
           </a:p>
@@ -16741,7 +17169,7 @@
 </p:sld>
 </file>
 
-<file path=ppt/slides/slide21.xml><?xml version="1.0" encoding="utf-8"?>
+<file path=ppt/slides/slide23.xml><?xml version="1.0" encoding="utf-8"?>
 <p:sld xmlns:a="http://schemas.openxmlformats.org/drawingml/2006/main" xmlns:r="http://schemas.openxmlformats.org/officeDocument/2006/relationships" xmlns:p="http://schemas.openxmlformats.org/presentationml/2006/main">
   <p:cSld>
     <p:spTree>

</xml_diff>